<commit_message>
Update slide Killian + Slides intro
</commit_message>
<xml_diff>
--- a/report/Projet_classification_MLOps_Partie1_Eddie.pptx
+++ b/report/Projet_classification_MLOps_Partie1_Eddie.pptx
@@ -5,14 +5,17 @@
     <p:sldMasterId id="2147483666" r:id="rId4"/>
   </p:sldMasterIdLst>
   <p:notesMasterIdLst>
-    <p:notesMasterId r:id="rId7"/>
+    <p:notesMasterId r:id="rId10"/>
   </p:notesMasterIdLst>
   <p:handoutMasterIdLst>
-    <p:handoutMasterId r:id="rId8"/>
+    <p:handoutMasterId r:id="rId11"/>
   </p:handoutMasterIdLst>
   <p:sldIdLst>
     <p:sldId id="256" r:id="rId5"/>
     <p:sldId id="284" r:id="rId6"/>
+    <p:sldId id="285" r:id="rId7"/>
+    <p:sldId id="286" r:id="rId8"/>
+    <p:sldId id="287" r:id="rId9"/>
   </p:sldIdLst>
   <p:sldSz cx="12192000" cy="6858000"/>
   <p:notesSz cx="6858000" cy="9144000"/>
@@ -239,7 +242,7 @@
           <a:p>
             <a:fld id="{F352A77B-D33C-49B3-A83C-450AA2ED72B3}" type="datetimeFigureOut">
               <a:rPr lang="en-US" smtClean="0"/>
-              <a:t>2/7/2025</a:t>
+              <a:t>2/13/2025</a:t>
             </a:fld>
             <a:endParaRPr lang="en-US" dirty="0"/>
           </a:p>
@@ -416,7 +419,7 @@
           <a:p>
             <a:fld id="{E38D8F9A-F5CB-4EF8-A859-ED5E107B9763}" type="datetimeFigureOut">
               <a:rPr lang="en-US" smtClean="0"/>
-              <a:t>2/7/2025</a:t>
+              <a:t>2/13/2025</a:t>
             </a:fld>
             <a:endParaRPr lang="en-US" dirty="0"/>
           </a:p>
@@ -16821,8 +16824,8 @@
         </p:nvSpPr>
         <p:spPr>
           <a:xfrm>
-            <a:off x="838200" y="1198563"/>
-            <a:ext cx="11353800" cy="4900612"/>
+            <a:off x="838200" y="1198562"/>
+            <a:ext cx="11353800" cy="5437375"/>
           </a:xfrm>
         </p:spPr>
         <p:txBody>
@@ -16831,7 +16834,7 @@
           <a:p>
             <a:r>
               <a:rPr lang="fr-FR" dirty="0"/>
-              <a:t>Contexte Projet Data </a:t>
+              <a:t>Contexte Projet existant Data </a:t>
             </a:r>
             <a:r>
               <a:rPr lang="fr-FR" dirty="0" err="1"/>
@@ -16839,7 +16842,17 @@
             </a:r>
             <a:r>
               <a:rPr lang="fr-FR" dirty="0"/>
-              <a:t> =&gt; </a:t>
+              <a:t> </a:t>
+            </a:r>
+            <a:r>
+              <a:rPr lang="fr-FR" dirty="0">
+                <a:sym typeface="Wingdings" panose="05000000000000000000" pitchFamily="2" charset="2"/>
+              </a:rPr>
+              <a:t></a:t>
+            </a:r>
+            <a:r>
+              <a:rPr lang="fr-FR" dirty="0"/>
+              <a:t> Projet </a:t>
             </a:r>
             <a:r>
               <a:rPr lang="fr-FR" dirty="0" err="1"/>
@@ -16866,40 +16879,21 @@
             </a:r>
           </a:p>
           <a:p>
-            <a:r>
-              <a:rPr lang="fr-FR" dirty="0"/>
-              <a:t>Les données</a:t>
-            </a:r>
-          </a:p>
-          <a:p>
-            <a:pPr lvl="1"/>
-            <a:r>
-              <a:rPr lang="fr-FR" dirty="0"/>
-              <a:t>1608 images fournies par le mentor couvrant 23 types de documents</a:t>
-            </a:r>
-          </a:p>
-          <a:p>
-            <a:r>
-              <a:rPr lang="fr-FR" dirty="0"/>
-              <a:t>Typologie de problèmes adressés avec le Machine Learning</a:t>
-            </a:r>
-          </a:p>
-          <a:p>
-            <a:pPr lvl="1"/>
+            <a:pPr lvl="2"/>
             <a:r>
               <a:rPr lang="fr-FR" dirty="0"/>
               <a:t> Problème de Classification (multi-classes)</a:t>
             </a:r>
           </a:p>
           <a:p>
-            <a:pPr lvl="1"/>
+            <a:pPr lvl="2"/>
             <a:r>
               <a:rPr lang="fr-FR" dirty="0"/>
               <a:t> CV : Computer Vision</a:t>
             </a:r>
           </a:p>
           <a:p>
-            <a:pPr lvl="1"/>
+            <a:pPr lvl="2"/>
             <a:r>
               <a:rPr lang="fr-FR" dirty="0"/>
               <a:t> NLP : Natural </a:t>
@@ -16919,9 +16913,64 @@
             <a:endParaRPr lang="fr-FR" dirty="0"/>
           </a:p>
           <a:p>
+            <a:pPr lvl="1"/>
             <a:r>
               <a:rPr lang="fr-FR" dirty="0"/>
-              <a:t>Les objectifs du projet </a:t>
+              <a:t>Proposer plusieurs interfaces pour une agence d’</a:t>
+            </a:r>
+            <a:r>
+              <a:rPr lang="fr-FR" dirty="0" err="1"/>
+              <a:t>interim</a:t>
+            </a:r>
+            <a:endParaRPr lang="fr-FR" dirty="0"/>
+          </a:p>
+          <a:p>
+            <a:pPr lvl="2"/>
+            <a:r>
+              <a:rPr lang="fr-FR" dirty="0"/>
+              <a:t> Interface Utilisateur pour Classer un groupe d’images</a:t>
+            </a:r>
+          </a:p>
+          <a:p>
+            <a:pPr lvl="2"/>
+            <a:r>
+              <a:rPr lang="fr-FR" dirty="0"/>
+              <a:t> Interface Admin pour Lancer des entrainements de modèle sur des images classées</a:t>
+            </a:r>
+          </a:p>
+          <a:p>
+            <a:pPr lvl="2"/>
+            <a:r>
+              <a:rPr lang="fr-FR" dirty="0"/>
+              <a:t> Interface Admin pour Monitorer le système d’entrainement et de prédiction</a:t>
+            </a:r>
+          </a:p>
+          <a:p>
+            <a:r>
+              <a:rPr lang="fr-FR" dirty="0"/>
+              <a:t>Jeu de données</a:t>
+            </a:r>
+          </a:p>
+          <a:p>
+            <a:pPr lvl="1"/>
+            <a:r>
+              <a:rPr lang="fr-FR" dirty="0"/>
+              <a:t>Initialement - Data </a:t>
+            </a:r>
+            <a:r>
+              <a:rPr lang="fr-FR" dirty="0" err="1"/>
+              <a:t>Scientist</a:t>
+            </a:r>
+            <a:r>
+              <a:rPr lang="fr-FR" dirty="0"/>
+              <a:t>: 1608 images couvrant 23 types de documents</a:t>
+            </a:r>
+          </a:p>
+          <a:p>
+            <a:pPr lvl="1"/>
+            <a:r>
+              <a:rPr lang="fr-FR" dirty="0"/>
+              <a:t>Réduction </a:t>
             </a:r>
             <a:r>
               <a:rPr lang="fr-FR" dirty="0" err="1"/>
@@ -16929,18 +16978,8 @@
             </a:r>
             <a:r>
               <a:rPr lang="fr-FR" dirty="0"/>
-              <a:t> </a:t>
-            </a:r>
-          </a:p>
-          <a:p>
-            <a:pPr lvl="1"/>
-            <a:r>
-              <a:rPr lang="fr-FR" dirty="0"/>
-              <a:t>…</a:t>
-            </a:r>
-          </a:p>
-          <a:p>
-            <a:endParaRPr lang="fr-FR" dirty="0"/>
+              <a:t>: ~200 images « propre » pour 3 catégories (Facture, ID, CV)</a:t>
+            </a:r>
           </a:p>
         </p:txBody>
       </p:sp>
@@ -16948,6 +16987,1230 @@
     <p:extLst>
       <p:ext uri="{BB962C8B-B14F-4D97-AF65-F5344CB8AC3E}">
         <p14:creationId xmlns:p14="http://schemas.microsoft.com/office/powerpoint/2010/main" val="3653425637"/>
+      </p:ext>
+    </p:extLst>
+  </p:cSld>
+  <p:clrMapOvr>
+    <a:masterClrMapping/>
+  </p:clrMapOvr>
+  <p:timing>
+    <p:tnLst>
+      <p:par>
+        <p:cTn id="1" dur="indefinite" restart="never" nodeType="tmRoot">
+          <p:childTnLst>
+            <p:seq concurrent="1" nextAc="seek">
+              <p:cTn id="2" dur="indefinite" nodeType="mainSeq">
+                <p:childTnLst>
+                  <p:par>
+                    <p:cTn id="3" fill="hold">
+                      <p:stCondLst>
+                        <p:cond delay="indefinite"/>
+                      </p:stCondLst>
+                      <p:childTnLst>
+                        <p:par>
+                          <p:cTn id="4" fill="hold">
+                            <p:stCondLst>
+                              <p:cond delay="0"/>
+                            </p:stCondLst>
+                            <p:childTnLst>
+                              <p:par>
+                                <p:cTn id="5" presetID="1" presetClass="entr" presetSubtype="0" fill="hold" nodeType="clickEffect">
+                                  <p:stCondLst>
+                                    <p:cond delay="0"/>
+                                  </p:stCondLst>
+                                  <p:childTnLst>
+                                    <p:set>
+                                      <p:cBhvr>
+                                        <p:cTn id="6" dur="1" fill="hold">
+                                          <p:stCondLst>
+                                            <p:cond delay="0"/>
+                                          </p:stCondLst>
+                                        </p:cTn>
+                                        <p:tgtEl>
+                                          <p:spTgt spid="6">
+                                            <p:txEl>
+                                              <p:pRg st="10" end="10"/>
+                                            </p:txEl>
+                                          </p:spTgt>
+                                        </p:tgtEl>
+                                        <p:attrNameLst>
+                                          <p:attrName>style.visibility</p:attrName>
+                                        </p:attrNameLst>
+                                      </p:cBhvr>
+                                      <p:to>
+                                        <p:strVal val="visible"/>
+                                      </p:to>
+                                    </p:set>
+                                  </p:childTnLst>
+                                </p:cTn>
+                              </p:par>
+                              <p:par>
+                                <p:cTn id="7" presetID="1" presetClass="entr" presetSubtype="0" fill="hold" nodeType="withEffect">
+                                  <p:stCondLst>
+                                    <p:cond delay="0"/>
+                                  </p:stCondLst>
+                                  <p:childTnLst>
+                                    <p:set>
+                                      <p:cBhvr>
+                                        <p:cTn id="8" dur="1" fill="hold">
+                                          <p:stCondLst>
+                                            <p:cond delay="0"/>
+                                          </p:stCondLst>
+                                        </p:cTn>
+                                        <p:tgtEl>
+                                          <p:spTgt spid="6">
+                                            <p:txEl>
+                                              <p:pRg st="11" end="11"/>
+                                            </p:txEl>
+                                          </p:spTgt>
+                                        </p:tgtEl>
+                                        <p:attrNameLst>
+                                          <p:attrName>style.visibility</p:attrName>
+                                        </p:attrNameLst>
+                                      </p:cBhvr>
+                                      <p:to>
+                                        <p:strVal val="visible"/>
+                                      </p:to>
+                                    </p:set>
+                                  </p:childTnLst>
+                                </p:cTn>
+                              </p:par>
+                              <p:par>
+                                <p:cTn id="9" presetID="1" presetClass="entr" presetSubtype="0" fill="hold" nodeType="withEffect">
+                                  <p:stCondLst>
+                                    <p:cond delay="0"/>
+                                  </p:stCondLst>
+                                  <p:childTnLst>
+                                    <p:set>
+                                      <p:cBhvr>
+                                        <p:cTn id="10" dur="1" fill="hold">
+                                          <p:stCondLst>
+                                            <p:cond delay="0"/>
+                                          </p:stCondLst>
+                                        </p:cTn>
+                                        <p:tgtEl>
+                                          <p:spTgt spid="6">
+                                            <p:txEl>
+                                              <p:pRg st="12" end="12"/>
+                                            </p:txEl>
+                                          </p:spTgt>
+                                        </p:tgtEl>
+                                        <p:attrNameLst>
+                                          <p:attrName>style.visibility</p:attrName>
+                                        </p:attrNameLst>
+                                      </p:cBhvr>
+                                      <p:to>
+                                        <p:strVal val="visible"/>
+                                      </p:to>
+                                    </p:set>
+                                  </p:childTnLst>
+                                </p:cTn>
+                              </p:par>
+                            </p:childTnLst>
+                          </p:cTn>
+                        </p:par>
+                      </p:childTnLst>
+                    </p:cTn>
+                  </p:par>
+                </p:childTnLst>
+              </p:cTn>
+              <p:prevCondLst>
+                <p:cond evt="onPrev" delay="0">
+                  <p:tgtEl>
+                    <p:sldTgt/>
+                  </p:tgtEl>
+                </p:cond>
+              </p:prevCondLst>
+              <p:nextCondLst>
+                <p:cond evt="onNext" delay="0">
+                  <p:tgtEl>
+                    <p:sldTgt/>
+                  </p:tgtEl>
+                </p:cond>
+              </p:nextCondLst>
+            </p:seq>
+          </p:childTnLst>
+        </p:cTn>
+      </p:par>
+    </p:tnLst>
+  </p:timing>
+</p:sld>
+</file>
+
+<file path=ppt/slides/slide3.xml><?xml version="1.0" encoding="utf-8"?>
+<p:sld xmlns:a="http://schemas.openxmlformats.org/drawingml/2006/main" xmlns:r="http://schemas.openxmlformats.org/officeDocument/2006/relationships" xmlns:p="http://schemas.openxmlformats.org/presentationml/2006/main">
+  <p:cSld>
+    <p:spTree>
+      <p:nvGrpSpPr>
+        <p:cNvPr id="1" name="">
+          <a:extLst>
+            <a:ext uri="{FF2B5EF4-FFF2-40B4-BE49-F238E27FC236}">
+              <a16:creationId xmlns:a16="http://schemas.microsoft.com/office/drawing/2014/main" id="{9D93705F-D2C3-7F8D-CD2F-CEA3E0ADB1B8}"/>
+            </a:ext>
+          </a:extLst>
+        </p:cNvPr>
+        <p:cNvGrpSpPr/>
+        <p:nvPr/>
+      </p:nvGrpSpPr>
+      <p:grpSpPr>
+        <a:xfrm>
+          <a:off x="0" y="0"/>
+          <a:ext cx="0" cy="0"/>
+          <a:chOff x="0" y="0"/>
+          <a:chExt cx="0" cy="0"/>
+        </a:xfrm>
+      </p:grpSpPr>
+      <p:sp>
+        <p:nvSpPr>
+          <p:cNvPr id="2" name="Titre 1">
+            <a:extLst>
+              <a:ext uri="{FF2B5EF4-FFF2-40B4-BE49-F238E27FC236}">
+                <a16:creationId xmlns:a16="http://schemas.microsoft.com/office/drawing/2014/main" id="{94644550-ADFB-5FFA-7056-80F7EA053620}"/>
+              </a:ext>
+            </a:extLst>
+          </p:cNvPr>
+          <p:cNvSpPr>
+            <a:spLocks noGrp="1"/>
+          </p:cNvSpPr>
+          <p:nvPr>
+            <p:ph type="title"/>
+          </p:nvPr>
+        </p:nvSpPr>
+        <p:spPr>
+          <a:xfrm>
+            <a:off x="838200" y="222062"/>
+            <a:ext cx="10963274" cy="583781"/>
+          </a:xfrm>
+        </p:spPr>
+        <p:txBody>
+          <a:bodyPr/>
+          <a:lstStyle/>
+          <a:p>
+            <a:r>
+              <a:rPr lang="fr-FR" dirty="0"/>
+              <a:t>Modèles et Nettoyage jeu de données</a:t>
+            </a:r>
+            <a:endParaRPr lang="en-US" dirty="0"/>
+          </a:p>
+        </p:txBody>
+      </p:sp>
+      <p:sp>
+        <p:nvSpPr>
+          <p:cNvPr id="3" name="Espace réservé de la date 2">
+            <a:extLst>
+              <a:ext uri="{FF2B5EF4-FFF2-40B4-BE49-F238E27FC236}">
+                <a16:creationId xmlns:a16="http://schemas.microsoft.com/office/drawing/2014/main" id="{1AEC22A6-AAC5-7614-9024-B6F95846BDDB}"/>
+              </a:ext>
+            </a:extLst>
+          </p:cNvPr>
+          <p:cNvSpPr>
+            <a:spLocks noGrp="1"/>
+          </p:cNvSpPr>
+          <p:nvPr>
+            <p:ph type="dt" sz="half" idx="10"/>
+          </p:nvPr>
+        </p:nvSpPr>
+        <p:spPr>
+          <a:xfrm>
+            <a:off x="838200" y="6356350"/>
+            <a:ext cx="2743200" cy="365125"/>
+          </a:xfrm>
+        </p:spPr>
+        <p:txBody>
+          <a:bodyPr/>
+          <a:lstStyle/>
+          <a:p>
+            <a:r>
+              <a:rPr lang="en-US"/>
+              <a:t>2024</a:t>
+            </a:r>
+            <a:endParaRPr lang="en-US" dirty="0"/>
+          </a:p>
+        </p:txBody>
+      </p:sp>
+      <p:sp>
+        <p:nvSpPr>
+          <p:cNvPr id="4" name="Espace réservé du pied de page 3">
+            <a:extLst>
+              <a:ext uri="{FF2B5EF4-FFF2-40B4-BE49-F238E27FC236}">
+                <a16:creationId xmlns:a16="http://schemas.microsoft.com/office/drawing/2014/main" id="{D8268EF5-3FEF-2525-6A8D-5B3C0342EA11}"/>
+              </a:ext>
+            </a:extLst>
+          </p:cNvPr>
+          <p:cNvSpPr>
+            <a:spLocks noGrp="1"/>
+          </p:cNvSpPr>
+          <p:nvPr>
+            <p:ph type="ftr" sz="quarter" idx="11"/>
+          </p:nvPr>
+        </p:nvSpPr>
+        <p:spPr>
+          <a:xfrm>
+            <a:off x="4038600" y="6356350"/>
+            <a:ext cx="4114800" cy="365125"/>
+          </a:xfrm>
+        </p:spPr>
+        <p:txBody>
+          <a:bodyPr/>
+          <a:lstStyle/>
+          <a:p>
+            <a:r>
+              <a:rPr lang="en-US"/>
+              <a:t>Projet classification de documents</a:t>
+            </a:r>
+            <a:endParaRPr lang="en-US" dirty="0"/>
+          </a:p>
+        </p:txBody>
+      </p:sp>
+      <p:sp>
+        <p:nvSpPr>
+          <p:cNvPr id="5" name="Espace réservé du numéro de diapositive 4">
+            <a:extLst>
+              <a:ext uri="{FF2B5EF4-FFF2-40B4-BE49-F238E27FC236}">
+                <a16:creationId xmlns:a16="http://schemas.microsoft.com/office/drawing/2014/main" id="{9FAE9B69-7062-0F7C-E5E2-F3A90CDC6E42}"/>
+              </a:ext>
+            </a:extLst>
+          </p:cNvPr>
+          <p:cNvSpPr>
+            <a:spLocks noGrp="1"/>
+          </p:cNvSpPr>
+          <p:nvPr>
+            <p:ph type="sldNum" sz="quarter" idx="12"/>
+          </p:nvPr>
+        </p:nvSpPr>
+        <p:spPr>
+          <a:xfrm>
+            <a:off x="8610600" y="6356350"/>
+            <a:ext cx="2743200" cy="365125"/>
+          </a:xfrm>
+        </p:spPr>
+        <p:txBody>
+          <a:bodyPr/>
+          <a:lstStyle/>
+          <a:p>
+            <a:fld id="{B5CEABB6-07DC-46E8-9B57-56EC44A396E5}" type="slidenum">
+              <a:rPr lang="en-US" smtClean="0"/>
+              <a:pPr/>
+              <a:t>3</a:t>
+            </a:fld>
+            <a:endParaRPr lang="en-US" dirty="0"/>
+          </a:p>
+        </p:txBody>
+      </p:sp>
+      <p:sp>
+        <p:nvSpPr>
+          <p:cNvPr id="6" name="Espace réservé du contenu 5">
+            <a:extLst>
+              <a:ext uri="{FF2B5EF4-FFF2-40B4-BE49-F238E27FC236}">
+                <a16:creationId xmlns:a16="http://schemas.microsoft.com/office/drawing/2014/main" id="{7FB3C0B4-7A22-6693-0B35-901B65C4D401}"/>
+              </a:ext>
+            </a:extLst>
+          </p:cNvPr>
+          <p:cNvSpPr>
+            <a:spLocks noGrp="1"/>
+          </p:cNvSpPr>
+          <p:nvPr>
+            <p:ph sz="quarter" idx="16"/>
+          </p:nvPr>
+        </p:nvSpPr>
+        <p:spPr>
+          <a:xfrm>
+            <a:off x="838200" y="1198562"/>
+            <a:ext cx="11353800" cy="5437375"/>
+          </a:xfrm>
+        </p:spPr>
+        <p:txBody>
+          <a:bodyPr/>
+          <a:lstStyle/>
+          <a:p>
+            <a:r>
+              <a:rPr lang="fr-FR" dirty="0"/>
+              <a:t>Pour le projet Data </a:t>
+            </a:r>
+            <a:r>
+              <a:rPr lang="fr-FR" dirty="0" err="1"/>
+              <a:t>Scientist</a:t>
+            </a:r>
+            <a:r>
+              <a:rPr lang="fr-FR" dirty="0"/>
+              <a:t>, nous avions terminé avec 3 modèles</a:t>
+            </a:r>
+          </a:p>
+          <a:p>
+            <a:pPr lvl="1"/>
+            <a:r>
+              <a:rPr lang="fr-FR" dirty="0"/>
+              <a:t> Modèle OCR (modèle </a:t>
+            </a:r>
+            <a:r>
+              <a:rPr lang="fr-FR" dirty="0" err="1"/>
+              <a:t>deep-learning</a:t>
+            </a:r>
+            <a:r>
+              <a:rPr lang="fr-FR" dirty="0"/>
+              <a:t> Doc-TR optimisé) </a:t>
+            </a:r>
+            <a:r>
+              <a:rPr lang="fr-FR" dirty="0">
+                <a:sym typeface="Wingdings" panose="05000000000000000000" pitchFamily="2" charset="2"/>
+              </a:rPr>
+              <a:t> Texte océrisé</a:t>
+            </a:r>
+            <a:endParaRPr lang="fr-FR" dirty="0"/>
+          </a:p>
+          <a:p>
+            <a:pPr lvl="1"/>
+            <a:r>
+              <a:rPr lang="fr-FR" dirty="0"/>
+              <a:t> Modèle visuel (uniquement </a:t>
+            </a:r>
+            <a:r>
+              <a:rPr lang="fr-FR" dirty="0" err="1"/>
+              <a:t>deep-learning</a:t>
+            </a:r>
+            <a:r>
+              <a:rPr lang="fr-FR" dirty="0"/>
+              <a:t> sur analyse des aspects graphiques)</a:t>
+            </a:r>
+          </a:p>
+          <a:p>
+            <a:pPr lvl="1"/>
+            <a:r>
+              <a:rPr lang="fr-FR" dirty="0"/>
+              <a:t> Modèle hybride (architecture neuronale) à 2 entrées : textes océrisés + images</a:t>
+            </a:r>
+          </a:p>
+          <a:p>
+            <a:r>
+              <a:rPr lang="fr-FR" dirty="0"/>
+              <a:t>Pour le projet </a:t>
+            </a:r>
+            <a:r>
+              <a:rPr lang="fr-FR" dirty="0" err="1"/>
+              <a:t>MLOps</a:t>
+            </a:r>
+            <a:endParaRPr lang="fr-FR" dirty="0"/>
+          </a:p>
+          <a:p>
+            <a:pPr lvl="1"/>
+            <a:r>
+              <a:rPr lang="fr-FR" dirty="0"/>
+              <a:t> Modèle OCR réutilisé en l’état </a:t>
+            </a:r>
+            <a:r>
+              <a:rPr lang="fr-FR" dirty="0">
+                <a:sym typeface="Wingdings" panose="05000000000000000000" pitchFamily="2" charset="2"/>
+              </a:rPr>
+              <a:t> </a:t>
+            </a:r>
+            <a:r>
+              <a:rPr lang="fr-FR" dirty="0"/>
+              <a:t>Docker indépendant déployé sur </a:t>
+            </a:r>
+            <a:r>
+              <a:rPr lang="fr-FR" dirty="0" err="1"/>
+              <a:t>DockerHub</a:t>
+            </a:r>
+            <a:endParaRPr lang="fr-FR" dirty="0"/>
+          </a:p>
+          <a:p>
+            <a:pPr lvl="1"/>
+            <a:r>
+              <a:rPr lang="fr-FR" dirty="0"/>
+              <a:t> Modèle simple </a:t>
+            </a:r>
+            <a:r>
+              <a:rPr lang="fr-FR" dirty="0" err="1"/>
+              <a:t>LogisticRegression</a:t>
+            </a:r>
+            <a:r>
+              <a:rPr lang="fr-FR" dirty="0"/>
+              <a:t> basé sur le texte océrisé</a:t>
+            </a:r>
+          </a:p>
+          <a:p>
+            <a:r>
+              <a:rPr lang="fr-FR" dirty="0"/>
+              <a:t>Récupération du nettoyage des données déjà effectuées</a:t>
+            </a:r>
+          </a:p>
+          <a:p>
+            <a:pPr lvl="1"/>
+            <a:r>
+              <a:rPr lang="fr-FR" dirty="0"/>
+              <a:t> Suppression des images non pertinentes ou de mauvaise qualité</a:t>
+            </a:r>
+          </a:p>
+          <a:p>
+            <a:pPr lvl="1"/>
+            <a:r>
+              <a:rPr lang="fr-FR" dirty="0"/>
+              <a:t> Nettoyage du texte océrisé</a:t>
+            </a:r>
+          </a:p>
+          <a:p>
+            <a:pPr lvl="1"/>
+            <a:r>
+              <a:rPr lang="fr-FR" dirty="0"/>
+              <a:t> Lemmatisation / </a:t>
+            </a:r>
+            <a:r>
+              <a:rPr lang="fr-FR" dirty="0" err="1"/>
+              <a:t>Remove</a:t>
+            </a:r>
+            <a:r>
+              <a:rPr lang="fr-FR" dirty="0"/>
+              <a:t> stop </a:t>
+            </a:r>
+            <a:r>
+              <a:rPr lang="fr-FR" dirty="0" err="1"/>
+              <a:t>words</a:t>
+            </a:r>
+            <a:endParaRPr lang="fr-FR" dirty="0"/>
+          </a:p>
+          <a:p>
+            <a:r>
+              <a:rPr lang="fr-FR" dirty="0"/>
+              <a:t>Récupération des fonctions de vectorisation du texte océrisé (TF-IDF)</a:t>
+            </a:r>
+          </a:p>
+        </p:txBody>
+      </p:sp>
+    </p:spTree>
+    <p:extLst>
+      <p:ext uri="{BB962C8B-B14F-4D97-AF65-F5344CB8AC3E}">
+        <p14:creationId xmlns:p14="http://schemas.microsoft.com/office/powerpoint/2010/main" val="1525133706"/>
+      </p:ext>
+    </p:extLst>
+  </p:cSld>
+  <p:clrMapOvr>
+    <a:masterClrMapping/>
+  </p:clrMapOvr>
+  <p:timing>
+    <p:tnLst>
+      <p:par>
+        <p:cTn id="1" dur="indefinite" restart="never" nodeType="tmRoot">
+          <p:childTnLst>
+            <p:seq concurrent="1" nextAc="seek">
+              <p:cTn id="2" dur="indefinite" nodeType="mainSeq">
+                <p:childTnLst>
+                  <p:par>
+                    <p:cTn id="3" fill="hold">
+                      <p:stCondLst>
+                        <p:cond delay="indefinite"/>
+                      </p:stCondLst>
+                      <p:childTnLst>
+                        <p:par>
+                          <p:cTn id="4" fill="hold">
+                            <p:stCondLst>
+                              <p:cond delay="0"/>
+                            </p:stCondLst>
+                            <p:childTnLst>
+                              <p:par>
+                                <p:cTn id="5" presetID="1" presetClass="entr" presetSubtype="0" fill="hold" nodeType="clickEffect">
+                                  <p:stCondLst>
+                                    <p:cond delay="0"/>
+                                  </p:stCondLst>
+                                  <p:childTnLst>
+                                    <p:set>
+                                      <p:cBhvr>
+                                        <p:cTn id="6" dur="1" fill="hold">
+                                          <p:stCondLst>
+                                            <p:cond delay="0"/>
+                                          </p:stCondLst>
+                                        </p:cTn>
+                                        <p:tgtEl>
+                                          <p:spTgt spid="6">
+                                            <p:txEl>
+                                              <p:pRg st="7" end="7"/>
+                                            </p:txEl>
+                                          </p:spTgt>
+                                        </p:tgtEl>
+                                        <p:attrNameLst>
+                                          <p:attrName>style.visibility</p:attrName>
+                                        </p:attrNameLst>
+                                      </p:cBhvr>
+                                      <p:to>
+                                        <p:strVal val="visible"/>
+                                      </p:to>
+                                    </p:set>
+                                  </p:childTnLst>
+                                </p:cTn>
+                              </p:par>
+                              <p:par>
+                                <p:cTn id="7" presetID="1" presetClass="entr" presetSubtype="0" fill="hold" nodeType="withEffect">
+                                  <p:stCondLst>
+                                    <p:cond delay="0"/>
+                                  </p:stCondLst>
+                                  <p:childTnLst>
+                                    <p:set>
+                                      <p:cBhvr>
+                                        <p:cTn id="8" dur="1" fill="hold">
+                                          <p:stCondLst>
+                                            <p:cond delay="0"/>
+                                          </p:stCondLst>
+                                        </p:cTn>
+                                        <p:tgtEl>
+                                          <p:spTgt spid="6">
+                                            <p:txEl>
+                                              <p:pRg st="8" end="8"/>
+                                            </p:txEl>
+                                          </p:spTgt>
+                                        </p:tgtEl>
+                                        <p:attrNameLst>
+                                          <p:attrName>style.visibility</p:attrName>
+                                        </p:attrNameLst>
+                                      </p:cBhvr>
+                                      <p:to>
+                                        <p:strVal val="visible"/>
+                                      </p:to>
+                                    </p:set>
+                                  </p:childTnLst>
+                                </p:cTn>
+                              </p:par>
+                              <p:par>
+                                <p:cTn id="9" presetID="1" presetClass="entr" presetSubtype="0" fill="hold" nodeType="withEffect">
+                                  <p:stCondLst>
+                                    <p:cond delay="0"/>
+                                  </p:stCondLst>
+                                  <p:childTnLst>
+                                    <p:set>
+                                      <p:cBhvr>
+                                        <p:cTn id="10" dur="1" fill="hold">
+                                          <p:stCondLst>
+                                            <p:cond delay="0"/>
+                                          </p:stCondLst>
+                                        </p:cTn>
+                                        <p:tgtEl>
+                                          <p:spTgt spid="6">
+                                            <p:txEl>
+                                              <p:pRg st="9" end="9"/>
+                                            </p:txEl>
+                                          </p:spTgt>
+                                        </p:tgtEl>
+                                        <p:attrNameLst>
+                                          <p:attrName>style.visibility</p:attrName>
+                                        </p:attrNameLst>
+                                      </p:cBhvr>
+                                      <p:to>
+                                        <p:strVal val="visible"/>
+                                      </p:to>
+                                    </p:set>
+                                  </p:childTnLst>
+                                </p:cTn>
+                              </p:par>
+                              <p:par>
+                                <p:cTn id="11" presetID="1" presetClass="entr" presetSubtype="0" fill="hold" nodeType="withEffect">
+                                  <p:stCondLst>
+                                    <p:cond delay="0"/>
+                                  </p:stCondLst>
+                                  <p:childTnLst>
+                                    <p:set>
+                                      <p:cBhvr>
+                                        <p:cTn id="12" dur="1" fill="hold">
+                                          <p:stCondLst>
+                                            <p:cond delay="0"/>
+                                          </p:stCondLst>
+                                        </p:cTn>
+                                        <p:tgtEl>
+                                          <p:spTgt spid="6">
+                                            <p:txEl>
+                                              <p:pRg st="10" end="10"/>
+                                            </p:txEl>
+                                          </p:spTgt>
+                                        </p:tgtEl>
+                                        <p:attrNameLst>
+                                          <p:attrName>style.visibility</p:attrName>
+                                        </p:attrNameLst>
+                                      </p:cBhvr>
+                                      <p:to>
+                                        <p:strVal val="visible"/>
+                                      </p:to>
+                                    </p:set>
+                                  </p:childTnLst>
+                                </p:cTn>
+                              </p:par>
+                              <p:par>
+                                <p:cTn id="13" presetID="1" presetClass="entr" presetSubtype="0" fill="hold" nodeType="withEffect">
+                                  <p:stCondLst>
+                                    <p:cond delay="0"/>
+                                  </p:stCondLst>
+                                  <p:childTnLst>
+                                    <p:set>
+                                      <p:cBhvr>
+                                        <p:cTn id="14" dur="1" fill="hold">
+                                          <p:stCondLst>
+                                            <p:cond delay="0"/>
+                                          </p:stCondLst>
+                                        </p:cTn>
+                                        <p:tgtEl>
+                                          <p:spTgt spid="6">
+                                            <p:txEl>
+                                              <p:pRg st="11" end="11"/>
+                                            </p:txEl>
+                                          </p:spTgt>
+                                        </p:tgtEl>
+                                        <p:attrNameLst>
+                                          <p:attrName>style.visibility</p:attrName>
+                                        </p:attrNameLst>
+                                      </p:cBhvr>
+                                      <p:to>
+                                        <p:strVal val="visible"/>
+                                      </p:to>
+                                    </p:set>
+                                  </p:childTnLst>
+                                </p:cTn>
+                              </p:par>
+                            </p:childTnLst>
+                          </p:cTn>
+                        </p:par>
+                      </p:childTnLst>
+                    </p:cTn>
+                  </p:par>
+                </p:childTnLst>
+              </p:cTn>
+              <p:prevCondLst>
+                <p:cond evt="onPrev" delay="0">
+                  <p:tgtEl>
+                    <p:sldTgt/>
+                  </p:tgtEl>
+                </p:cond>
+              </p:prevCondLst>
+              <p:nextCondLst>
+                <p:cond evt="onNext" delay="0">
+                  <p:tgtEl>
+                    <p:sldTgt/>
+                  </p:tgtEl>
+                </p:cond>
+              </p:nextCondLst>
+            </p:seq>
+          </p:childTnLst>
+        </p:cTn>
+      </p:par>
+    </p:tnLst>
+  </p:timing>
+</p:sld>
+</file>
+
+<file path=ppt/slides/slide4.xml><?xml version="1.0" encoding="utf-8"?>
+<p:sld xmlns:a="http://schemas.openxmlformats.org/drawingml/2006/main" xmlns:r="http://schemas.openxmlformats.org/officeDocument/2006/relationships" xmlns:p="http://schemas.openxmlformats.org/presentationml/2006/main">
+  <p:cSld>
+    <p:spTree>
+      <p:nvGrpSpPr>
+        <p:cNvPr id="1" name="">
+          <a:extLst>
+            <a:ext uri="{FF2B5EF4-FFF2-40B4-BE49-F238E27FC236}">
+              <a16:creationId xmlns:a16="http://schemas.microsoft.com/office/drawing/2014/main" id="{5BF829F3-B6C5-9DFE-53BB-39AD4BED3EAE}"/>
+            </a:ext>
+          </a:extLst>
+        </p:cNvPr>
+        <p:cNvGrpSpPr/>
+        <p:nvPr/>
+      </p:nvGrpSpPr>
+      <p:grpSpPr>
+        <a:xfrm>
+          <a:off x="0" y="0"/>
+          <a:ext cx="0" cy="0"/>
+          <a:chOff x="0" y="0"/>
+          <a:chExt cx="0" cy="0"/>
+        </a:xfrm>
+      </p:grpSpPr>
+      <p:sp>
+        <p:nvSpPr>
+          <p:cNvPr id="2" name="Titre 1">
+            <a:extLst>
+              <a:ext uri="{FF2B5EF4-FFF2-40B4-BE49-F238E27FC236}">
+                <a16:creationId xmlns:a16="http://schemas.microsoft.com/office/drawing/2014/main" id="{0E83583A-DC23-D09D-A2D1-38ADAD16FF2D}"/>
+              </a:ext>
+            </a:extLst>
+          </p:cNvPr>
+          <p:cNvSpPr>
+            <a:spLocks noGrp="1"/>
+          </p:cNvSpPr>
+          <p:nvPr>
+            <p:ph type="title"/>
+          </p:nvPr>
+        </p:nvSpPr>
+        <p:spPr>
+          <a:xfrm>
+            <a:off x="838200" y="222062"/>
+            <a:ext cx="10963274" cy="583781"/>
+          </a:xfrm>
+        </p:spPr>
+        <p:txBody>
+          <a:bodyPr/>
+          <a:lstStyle/>
+          <a:p>
+            <a:r>
+              <a:rPr lang="fr-FR" dirty="0"/>
+              <a:t>Vue d’ensemble du projet</a:t>
+            </a:r>
+            <a:endParaRPr lang="en-US" dirty="0"/>
+          </a:p>
+        </p:txBody>
+      </p:sp>
+      <p:sp>
+        <p:nvSpPr>
+          <p:cNvPr id="3" name="Espace réservé de la date 2">
+            <a:extLst>
+              <a:ext uri="{FF2B5EF4-FFF2-40B4-BE49-F238E27FC236}">
+                <a16:creationId xmlns:a16="http://schemas.microsoft.com/office/drawing/2014/main" id="{BA3FDF07-89BB-B5F2-789D-155303C7EAF7}"/>
+              </a:ext>
+            </a:extLst>
+          </p:cNvPr>
+          <p:cNvSpPr>
+            <a:spLocks noGrp="1"/>
+          </p:cNvSpPr>
+          <p:nvPr>
+            <p:ph type="dt" sz="half" idx="10"/>
+          </p:nvPr>
+        </p:nvSpPr>
+        <p:spPr>
+          <a:xfrm>
+            <a:off x="838200" y="6356350"/>
+            <a:ext cx="2743200" cy="365125"/>
+          </a:xfrm>
+        </p:spPr>
+        <p:txBody>
+          <a:bodyPr/>
+          <a:lstStyle/>
+          <a:p>
+            <a:r>
+              <a:rPr lang="en-US"/>
+              <a:t>2024</a:t>
+            </a:r>
+            <a:endParaRPr lang="en-US" dirty="0"/>
+          </a:p>
+        </p:txBody>
+      </p:sp>
+      <p:sp>
+        <p:nvSpPr>
+          <p:cNvPr id="4" name="Espace réservé du pied de page 3">
+            <a:extLst>
+              <a:ext uri="{FF2B5EF4-FFF2-40B4-BE49-F238E27FC236}">
+                <a16:creationId xmlns:a16="http://schemas.microsoft.com/office/drawing/2014/main" id="{58A13379-2586-57B0-8399-CD90631C1706}"/>
+              </a:ext>
+            </a:extLst>
+          </p:cNvPr>
+          <p:cNvSpPr>
+            <a:spLocks noGrp="1"/>
+          </p:cNvSpPr>
+          <p:nvPr>
+            <p:ph type="ftr" sz="quarter" idx="11"/>
+          </p:nvPr>
+        </p:nvSpPr>
+        <p:spPr>
+          <a:xfrm>
+            <a:off x="4038600" y="6356350"/>
+            <a:ext cx="4114800" cy="365125"/>
+          </a:xfrm>
+        </p:spPr>
+        <p:txBody>
+          <a:bodyPr/>
+          <a:lstStyle/>
+          <a:p>
+            <a:r>
+              <a:rPr lang="en-US"/>
+              <a:t>Projet classification de documents</a:t>
+            </a:r>
+            <a:endParaRPr lang="en-US" dirty="0"/>
+          </a:p>
+        </p:txBody>
+      </p:sp>
+      <p:sp>
+        <p:nvSpPr>
+          <p:cNvPr id="5" name="Espace réservé du numéro de diapositive 4">
+            <a:extLst>
+              <a:ext uri="{FF2B5EF4-FFF2-40B4-BE49-F238E27FC236}">
+                <a16:creationId xmlns:a16="http://schemas.microsoft.com/office/drawing/2014/main" id="{778E5512-AE7C-5723-792D-5C62B338570B}"/>
+              </a:ext>
+            </a:extLst>
+          </p:cNvPr>
+          <p:cNvSpPr>
+            <a:spLocks noGrp="1"/>
+          </p:cNvSpPr>
+          <p:nvPr>
+            <p:ph type="sldNum" sz="quarter" idx="12"/>
+          </p:nvPr>
+        </p:nvSpPr>
+        <p:spPr>
+          <a:xfrm>
+            <a:off x="8610600" y="6356350"/>
+            <a:ext cx="2743200" cy="365125"/>
+          </a:xfrm>
+        </p:spPr>
+        <p:txBody>
+          <a:bodyPr/>
+          <a:lstStyle/>
+          <a:p>
+            <a:fld id="{B5CEABB6-07DC-46E8-9B57-56EC44A396E5}" type="slidenum">
+              <a:rPr lang="en-US" smtClean="0"/>
+              <a:pPr/>
+              <a:t>4</a:t>
+            </a:fld>
+            <a:endParaRPr lang="en-US" dirty="0"/>
+          </a:p>
+        </p:txBody>
+      </p:sp>
+      <p:pic>
+        <p:nvPicPr>
+          <p:cNvPr id="1026" name="Picture 2">
+            <a:extLst>
+              <a:ext uri="{FF2B5EF4-FFF2-40B4-BE49-F238E27FC236}">
+                <a16:creationId xmlns:a16="http://schemas.microsoft.com/office/drawing/2014/main" id="{FB54342D-2402-D435-6C9A-7899B21DF810}"/>
+              </a:ext>
+            </a:extLst>
+          </p:cNvPr>
+          <p:cNvPicPr>
+            <a:picLocks noChangeAspect="1" noChangeArrowheads="1"/>
+          </p:cNvPicPr>
+          <p:nvPr/>
+        </p:nvPicPr>
+        <p:blipFill>
+          <a:blip r:embed="rId2">
+            <a:extLst>
+              <a:ext uri="{28A0092B-C50C-407E-A947-70E740481C1C}">
+                <a14:useLocalDpi xmlns:a14="http://schemas.microsoft.com/office/drawing/2010/main" val="0"/>
+              </a:ext>
+            </a:extLst>
+          </a:blip>
+          <a:srcRect/>
+          <a:stretch>
+            <a:fillRect/>
+          </a:stretch>
+        </p:blipFill>
+        <p:spPr bwMode="auto">
+          <a:xfrm>
+            <a:off x="3355942" y="739854"/>
+            <a:ext cx="5716289" cy="5934720"/>
+          </a:xfrm>
+          <a:prstGeom prst="rect">
+            <a:avLst/>
+          </a:prstGeom>
+          <a:noFill/>
+          <a:extLst>
+            <a:ext uri="{909E8E84-426E-40DD-AFC4-6F175D3DCCD1}">
+              <a14:hiddenFill xmlns:a14="http://schemas.microsoft.com/office/drawing/2010/main">
+                <a:solidFill>
+                  <a:srgbClr val="FFFFFF"/>
+                </a:solidFill>
+              </a14:hiddenFill>
+            </a:ext>
+          </a:extLst>
+        </p:spPr>
+      </p:pic>
+    </p:spTree>
+    <p:extLst>
+      <p:ext uri="{BB962C8B-B14F-4D97-AF65-F5344CB8AC3E}">
+        <p14:creationId xmlns:p14="http://schemas.microsoft.com/office/powerpoint/2010/main" val="979997633"/>
+      </p:ext>
+    </p:extLst>
+  </p:cSld>
+  <p:clrMapOvr>
+    <a:masterClrMapping/>
+  </p:clrMapOvr>
+</p:sld>
+</file>
+
+<file path=ppt/slides/slide5.xml><?xml version="1.0" encoding="utf-8"?>
+<p:sld xmlns:a="http://schemas.openxmlformats.org/drawingml/2006/main" xmlns:r="http://schemas.openxmlformats.org/officeDocument/2006/relationships" xmlns:p="http://schemas.openxmlformats.org/presentationml/2006/main">
+  <p:cSld>
+    <p:spTree>
+      <p:nvGrpSpPr>
+        <p:cNvPr id="1" name="">
+          <a:extLst>
+            <a:ext uri="{FF2B5EF4-FFF2-40B4-BE49-F238E27FC236}">
+              <a16:creationId xmlns:a16="http://schemas.microsoft.com/office/drawing/2014/main" id="{B89AE269-3CB1-F0DB-E007-3A7E1F60E73F}"/>
+            </a:ext>
+          </a:extLst>
+        </p:cNvPr>
+        <p:cNvGrpSpPr/>
+        <p:nvPr/>
+      </p:nvGrpSpPr>
+      <p:grpSpPr>
+        <a:xfrm>
+          <a:off x="0" y="0"/>
+          <a:ext cx="0" cy="0"/>
+          <a:chOff x="0" y="0"/>
+          <a:chExt cx="0" cy="0"/>
+        </a:xfrm>
+      </p:grpSpPr>
+      <p:sp>
+        <p:nvSpPr>
+          <p:cNvPr id="2" name="Titre 1">
+            <a:extLst>
+              <a:ext uri="{FF2B5EF4-FFF2-40B4-BE49-F238E27FC236}">
+                <a16:creationId xmlns:a16="http://schemas.microsoft.com/office/drawing/2014/main" id="{D63A54A9-10D1-7874-F1BB-F009FF6E386D}"/>
+              </a:ext>
+            </a:extLst>
+          </p:cNvPr>
+          <p:cNvSpPr>
+            <a:spLocks noGrp="1"/>
+          </p:cNvSpPr>
+          <p:nvPr>
+            <p:ph type="title"/>
+          </p:nvPr>
+        </p:nvSpPr>
+        <p:spPr>
+          <a:xfrm>
+            <a:off x="838200" y="222062"/>
+            <a:ext cx="10963274" cy="583781"/>
+          </a:xfrm>
+        </p:spPr>
+        <p:txBody>
+          <a:bodyPr/>
+          <a:lstStyle/>
+          <a:p>
+            <a:r>
+              <a:rPr lang="fr-FR" dirty="0"/>
+              <a:t>Plan de la présentation</a:t>
+            </a:r>
+            <a:endParaRPr lang="en-US" dirty="0"/>
+          </a:p>
+        </p:txBody>
+      </p:sp>
+      <p:sp>
+        <p:nvSpPr>
+          <p:cNvPr id="3" name="Espace réservé de la date 2">
+            <a:extLst>
+              <a:ext uri="{FF2B5EF4-FFF2-40B4-BE49-F238E27FC236}">
+                <a16:creationId xmlns:a16="http://schemas.microsoft.com/office/drawing/2014/main" id="{DFF8A72F-FC5B-385E-0CF0-ACF10C404048}"/>
+              </a:ext>
+            </a:extLst>
+          </p:cNvPr>
+          <p:cNvSpPr>
+            <a:spLocks noGrp="1"/>
+          </p:cNvSpPr>
+          <p:nvPr>
+            <p:ph type="dt" sz="half" idx="10"/>
+          </p:nvPr>
+        </p:nvSpPr>
+        <p:spPr>
+          <a:xfrm>
+            <a:off x="838200" y="6356350"/>
+            <a:ext cx="2743200" cy="365125"/>
+          </a:xfrm>
+        </p:spPr>
+        <p:txBody>
+          <a:bodyPr/>
+          <a:lstStyle/>
+          <a:p>
+            <a:r>
+              <a:rPr lang="en-US"/>
+              <a:t>2024</a:t>
+            </a:r>
+            <a:endParaRPr lang="en-US" dirty="0"/>
+          </a:p>
+        </p:txBody>
+      </p:sp>
+      <p:sp>
+        <p:nvSpPr>
+          <p:cNvPr id="4" name="Espace réservé du pied de page 3">
+            <a:extLst>
+              <a:ext uri="{FF2B5EF4-FFF2-40B4-BE49-F238E27FC236}">
+                <a16:creationId xmlns:a16="http://schemas.microsoft.com/office/drawing/2014/main" id="{F5B66F39-801D-885B-5D57-17B05E8667C2}"/>
+              </a:ext>
+            </a:extLst>
+          </p:cNvPr>
+          <p:cNvSpPr>
+            <a:spLocks noGrp="1"/>
+          </p:cNvSpPr>
+          <p:nvPr>
+            <p:ph type="ftr" sz="quarter" idx="11"/>
+          </p:nvPr>
+        </p:nvSpPr>
+        <p:spPr>
+          <a:xfrm>
+            <a:off x="4038600" y="6356350"/>
+            <a:ext cx="4114800" cy="365125"/>
+          </a:xfrm>
+        </p:spPr>
+        <p:txBody>
+          <a:bodyPr/>
+          <a:lstStyle/>
+          <a:p>
+            <a:r>
+              <a:rPr lang="en-US"/>
+              <a:t>Projet classification de documents</a:t>
+            </a:r>
+            <a:endParaRPr lang="en-US" dirty="0"/>
+          </a:p>
+        </p:txBody>
+      </p:sp>
+      <p:sp>
+        <p:nvSpPr>
+          <p:cNvPr id="5" name="Espace réservé du numéro de diapositive 4">
+            <a:extLst>
+              <a:ext uri="{FF2B5EF4-FFF2-40B4-BE49-F238E27FC236}">
+                <a16:creationId xmlns:a16="http://schemas.microsoft.com/office/drawing/2014/main" id="{7195292C-5DFC-50B2-C2B5-413FC09DA38E}"/>
+              </a:ext>
+            </a:extLst>
+          </p:cNvPr>
+          <p:cNvSpPr>
+            <a:spLocks noGrp="1"/>
+          </p:cNvSpPr>
+          <p:nvPr>
+            <p:ph type="sldNum" sz="quarter" idx="12"/>
+          </p:nvPr>
+        </p:nvSpPr>
+        <p:spPr>
+          <a:xfrm>
+            <a:off x="8610600" y="6356350"/>
+            <a:ext cx="2743200" cy="365125"/>
+          </a:xfrm>
+        </p:spPr>
+        <p:txBody>
+          <a:bodyPr/>
+          <a:lstStyle/>
+          <a:p>
+            <a:fld id="{B5CEABB6-07DC-46E8-9B57-56EC44A396E5}" type="slidenum">
+              <a:rPr lang="en-US" smtClean="0"/>
+              <a:pPr/>
+              <a:t>5</a:t>
+            </a:fld>
+            <a:endParaRPr lang="en-US" dirty="0"/>
+          </a:p>
+        </p:txBody>
+      </p:sp>
+      <p:sp>
+        <p:nvSpPr>
+          <p:cNvPr id="6" name="Espace réservé du contenu 5">
+            <a:extLst>
+              <a:ext uri="{FF2B5EF4-FFF2-40B4-BE49-F238E27FC236}">
+                <a16:creationId xmlns:a16="http://schemas.microsoft.com/office/drawing/2014/main" id="{2C63056B-A839-1CF6-2D0A-C4EA9B518EA6}"/>
+              </a:ext>
+            </a:extLst>
+          </p:cNvPr>
+          <p:cNvSpPr>
+            <a:spLocks noGrp="1"/>
+          </p:cNvSpPr>
+          <p:nvPr>
+            <p:ph sz="quarter" idx="16"/>
+          </p:nvPr>
+        </p:nvSpPr>
+        <p:spPr>
+          <a:xfrm>
+            <a:off x="838200" y="1198563"/>
+            <a:ext cx="11353800" cy="5315360"/>
+          </a:xfrm>
+        </p:spPr>
+        <p:txBody>
+          <a:bodyPr/>
+          <a:lstStyle/>
+          <a:p>
+            <a:r>
+              <a:rPr lang="fr-FR" sz="2400" dirty="0"/>
+              <a:t>Training</a:t>
+            </a:r>
+          </a:p>
+          <a:p>
+            <a:pPr lvl="1"/>
+            <a:r>
+              <a:rPr lang="fr-FR" dirty="0"/>
+              <a:t>Pipeline Training</a:t>
+            </a:r>
+          </a:p>
+          <a:p>
+            <a:pPr lvl="1"/>
+            <a:r>
+              <a:rPr lang="fr-FR" dirty="0"/>
+              <a:t>Monitoring</a:t>
+            </a:r>
+          </a:p>
+          <a:p>
+            <a:r>
+              <a:rPr lang="fr-FR" sz="2400" dirty="0"/>
+              <a:t>Prédiction</a:t>
+            </a:r>
+          </a:p>
+          <a:p>
+            <a:pPr lvl="1"/>
+            <a:r>
+              <a:rPr lang="fr-FR" dirty="0"/>
+              <a:t>Pipeline </a:t>
+            </a:r>
+            <a:r>
+              <a:rPr lang="fr-FR" dirty="0" err="1"/>
+              <a:t>Predict</a:t>
+            </a:r>
+            <a:endParaRPr lang="fr-FR" dirty="0"/>
+          </a:p>
+          <a:p>
+            <a:pPr lvl="1"/>
+            <a:r>
+              <a:rPr lang="fr-FR" dirty="0"/>
+              <a:t>Interface User pour les prédictions</a:t>
+            </a:r>
+          </a:p>
+          <a:p>
+            <a:pPr lvl="1"/>
+            <a:r>
+              <a:rPr lang="fr-FR" dirty="0"/>
+              <a:t>Gestion du feedback utilisateur</a:t>
+            </a:r>
+          </a:p>
+          <a:p>
+            <a:r>
+              <a:rPr lang="fr-FR" sz="2400" dirty="0"/>
+              <a:t>Déploiement </a:t>
+            </a:r>
+            <a:r>
+              <a:rPr lang="fr-FR" sz="2400" dirty="0" err="1"/>
+              <a:t>MLOps</a:t>
+            </a:r>
+            <a:endParaRPr lang="fr-FR" sz="2400" dirty="0"/>
+          </a:p>
+          <a:p>
+            <a:pPr lvl="1"/>
+            <a:r>
+              <a:rPr lang="fr-FR" dirty="0"/>
+              <a:t>CI : Jenkins</a:t>
+            </a:r>
+          </a:p>
+          <a:p>
+            <a:pPr lvl="1"/>
+            <a:r>
+              <a:rPr lang="fr-FR" dirty="0"/>
+              <a:t>CD : </a:t>
+            </a:r>
+            <a:r>
+              <a:rPr lang="fr-FR" dirty="0" err="1"/>
+              <a:t>Argo</a:t>
+            </a:r>
+            <a:endParaRPr lang="fr-FR" dirty="0"/>
+          </a:p>
+          <a:p>
+            <a:pPr lvl="1"/>
+            <a:r>
+              <a:rPr lang="fr-FR" dirty="0"/>
+              <a:t>Déploiement des dockers sur </a:t>
+            </a:r>
+            <a:r>
+              <a:rPr lang="fr-FR" dirty="0" err="1"/>
+              <a:t>Kubernetes</a:t>
+            </a:r>
+            <a:endParaRPr lang="fr-FR" dirty="0"/>
+          </a:p>
+          <a:p>
+            <a:pPr lvl="1"/>
+            <a:r>
+              <a:rPr lang="fr-FR" dirty="0"/>
+              <a:t>API Gateway</a:t>
+            </a:r>
+          </a:p>
+          <a:p>
+            <a:pPr lvl="1"/>
+            <a:r>
+              <a:rPr lang="fr-FR" dirty="0"/>
+              <a:t>Sécurisation de l’architecture</a:t>
+            </a:r>
+          </a:p>
+        </p:txBody>
+      </p:sp>
+    </p:spTree>
+    <p:extLst>
+      <p:ext uri="{BB962C8B-B14F-4D97-AF65-F5344CB8AC3E}">
+        <p14:creationId xmlns:p14="http://schemas.microsoft.com/office/powerpoint/2010/main" val="4229699463"/>
       </p:ext>
     </p:extLst>
   </p:cSld>
@@ -17749,23 +19012,12 @@
 </file>
 
 <file path=customXml/item1.xml><?xml version="1.0" encoding="utf-8"?>
-<p:properties xmlns:p="http://schemas.microsoft.com/office/2006/metadata/properties" xmlns:xsi="http://www.w3.org/2001/XMLSchema-instance" xmlns:pc="http://schemas.microsoft.com/office/infopath/2007/PartnerControls">
-  <documentManagement>
-    <_ip_UnifiedCompliancePolicyUIAction xmlns="http://schemas.microsoft.com/sharepoint/v3" xsi:nil="true"/>
-    <Image xmlns="71af3243-3dd4-4a8d-8c0d-dd76da1f02a5">
-      <Url xsi:nil="true"/>
-      <Description xsi:nil="true"/>
-    </Image>
-    <Status xmlns="71af3243-3dd4-4a8d-8c0d-dd76da1f02a5">Not started</Status>
-    <Background xmlns="71af3243-3dd4-4a8d-8c0d-dd76da1f02a5">false</Background>
-    <_ip_UnifiedCompliancePolicyProperties xmlns="http://schemas.microsoft.com/sharepoint/v3" xsi:nil="true"/>
-    <ImageTagsTaxHTField xmlns="71af3243-3dd4-4a8d-8c0d-dd76da1f02a5">
-      <Terms xmlns="http://schemas.microsoft.com/office/infopath/2007/PartnerControls"/>
-    </ImageTagsTaxHTField>
-    <TaxCatchAll xmlns="230e9df3-be65-4c73-a93b-d1236ebd677e" xsi:nil="true"/>
-    <MediaServiceKeyPoints xmlns="71af3243-3dd4-4a8d-8c0d-dd76da1f02a5" xsi:nil="true"/>
-  </documentManagement>
-</p:properties>
+<?mso-contentType ?>
+<FormTemplates xmlns="http://schemas.microsoft.com/sharepoint/v3/contenttype/forms">
+  <Display>DocumentLibraryForm</Display>
+  <Edit>DocumentLibraryForm</Edit>
+  <New>DocumentLibraryForm</New>
+</FormTemplates>
 </file>
 
 <file path=customXml/item2.xml><?xml version="1.0" encoding="utf-8"?>
@@ -18075,22 +19327,29 @@
 </file>
 
 <file path=customXml/item3.xml><?xml version="1.0" encoding="utf-8"?>
-<?mso-contentType ?>
-<FormTemplates xmlns="http://schemas.microsoft.com/sharepoint/v3/contenttype/forms">
-  <Display>DocumentLibraryForm</Display>
-  <Edit>DocumentLibraryForm</Edit>
-  <New>DocumentLibraryForm</New>
-</FormTemplates>
+<p:properties xmlns:p="http://schemas.microsoft.com/office/2006/metadata/properties" xmlns:xsi="http://www.w3.org/2001/XMLSchema-instance" xmlns:pc="http://schemas.microsoft.com/office/infopath/2007/PartnerControls">
+  <documentManagement>
+    <_ip_UnifiedCompliancePolicyUIAction xmlns="http://schemas.microsoft.com/sharepoint/v3" xsi:nil="true"/>
+    <Image xmlns="71af3243-3dd4-4a8d-8c0d-dd76da1f02a5">
+      <Url xsi:nil="true"/>
+      <Description xsi:nil="true"/>
+    </Image>
+    <Status xmlns="71af3243-3dd4-4a8d-8c0d-dd76da1f02a5">Not started</Status>
+    <Background xmlns="71af3243-3dd4-4a8d-8c0d-dd76da1f02a5">false</Background>
+    <_ip_UnifiedCompliancePolicyProperties xmlns="http://schemas.microsoft.com/sharepoint/v3" xsi:nil="true"/>
+    <ImageTagsTaxHTField xmlns="71af3243-3dd4-4a8d-8c0d-dd76da1f02a5">
+      <Terms xmlns="http://schemas.microsoft.com/office/infopath/2007/PartnerControls"/>
+    </ImageTagsTaxHTField>
+    <TaxCatchAll xmlns="230e9df3-be65-4c73-a93b-d1236ebd677e" xsi:nil="true"/>
+    <MediaServiceKeyPoints xmlns="71af3243-3dd4-4a8d-8c0d-dd76da1f02a5" xsi:nil="true"/>
+  </documentManagement>
+</p:properties>
 </file>
 
 <file path=customXml/itemProps1.xml><?xml version="1.0" encoding="utf-8"?>
-<ds:datastoreItem xmlns:ds="http://schemas.openxmlformats.org/officeDocument/2006/customXml" ds:itemID="{6EA97235-BEC4-4F82-87A8-2F5DAD53B5F9}">
+<ds:datastoreItem xmlns:ds="http://schemas.openxmlformats.org/officeDocument/2006/customXml" ds:itemID="{79BF405E-7930-4D5C-ABB3-493E9D6D6CEA}">
   <ds:schemaRefs>
-    <ds:schemaRef ds:uri="http://schemas.microsoft.com/office/2006/metadata/properties"/>
-    <ds:schemaRef ds:uri="http://schemas.microsoft.com/office/infopath/2007/PartnerControls"/>
-    <ds:schemaRef ds:uri="http://schemas.microsoft.com/sharepoint/v3"/>
-    <ds:schemaRef ds:uri="71af3243-3dd4-4a8d-8c0d-dd76da1f02a5"/>
-    <ds:schemaRef ds:uri="230e9df3-be65-4c73-a93b-d1236ebd677e"/>
+    <ds:schemaRef ds:uri="http://schemas.microsoft.com/sharepoint/v3/contenttype/forms"/>
   </ds:schemaRefs>
 </ds:datastoreItem>
 </file>
@@ -18117,9 +19376,13 @@
 </file>
 
 <file path=customXml/itemProps3.xml><?xml version="1.0" encoding="utf-8"?>
-<ds:datastoreItem xmlns:ds="http://schemas.openxmlformats.org/officeDocument/2006/customXml" ds:itemID="{79BF405E-7930-4D5C-ABB3-493E9D6D6CEA}">
+<ds:datastoreItem xmlns:ds="http://schemas.openxmlformats.org/officeDocument/2006/customXml" ds:itemID="{6EA97235-BEC4-4F82-87A8-2F5DAD53B5F9}">
   <ds:schemaRefs>
-    <ds:schemaRef ds:uri="http://schemas.microsoft.com/sharepoint/v3/contenttype/forms"/>
+    <ds:schemaRef ds:uri="http://schemas.microsoft.com/office/2006/metadata/properties"/>
+    <ds:schemaRef ds:uri="http://schemas.microsoft.com/office/infopath/2007/PartnerControls"/>
+    <ds:schemaRef ds:uri="http://schemas.microsoft.com/sharepoint/v3"/>
+    <ds:schemaRef ds:uri="71af3243-3dd4-4a8d-8c0d-dd76da1f02a5"/>
+    <ds:schemaRef ds:uri="230e9df3-be65-4c73-a93b-d1236ebd677e"/>
   </ds:schemaRefs>
 </ds:datastoreItem>
 </file>

</xml_diff>

<commit_message>
reprise slides Aymen et Intro
</commit_message>
<xml_diff>
--- a/report/Projet_classification_MLOps_Partie1_Eddie.pptx
+++ b/report/Projet_classification_MLOps_Partie1_Eddie.pptx
@@ -17445,14 +17445,14 @@
             <a:pPr lvl="1"/>
             <a:r>
               <a:rPr lang="fr-FR" dirty="0"/>
-              <a:t> Nettoyage du texte océrisé</a:t>
+              <a:t> Fonctions de Nettoyage du texte océrisé</a:t>
             </a:r>
           </a:p>
           <a:p>
             <a:pPr lvl="1"/>
             <a:r>
               <a:rPr lang="fr-FR" dirty="0"/>
-              <a:t> Lemmatisation / </a:t>
+              <a:t> Fonctions de Lemmatisation / </a:t>
             </a:r>
             <a:r>
               <a:rPr lang="fr-FR" dirty="0" err="1"/>

</xml_diff>

<commit_message>
maj suite à meeting avec Seb
</commit_message>
<xml_diff>
--- a/report/Projet_classification_MLOps_Partie1_Eddie.pptx
+++ b/report/Projet_classification_MLOps_Partie1_Eddie.pptx
@@ -5,17 +5,18 @@
     <p:sldMasterId id="2147483666" r:id="rId4"/>
   </p:sldMasterIdLst>
   <p:notesMasterIdLst>
-    <p:notesMasterId r:id="rId10"/>
+    <p:notesMasterId r:id="rId11"/>
   </p:notesMasterIdLst>
   <p:handoutMasterIdLst>
-    <p:handoutMasterId r:id="rId11"/>
+    <p:handoutMasterId r:id="rId12"/>
   </p:handoutMasterIdLst>
   <p:sldIdLst>
     <p:sldId id="256" r:id="rId5"/>
-    <p:sldId id="284" r:id="rId6"/>
-    <p:sldId id="285" r:id="rId7"/>
+    <p:sldId id="289" r:id="rId6"/>
+    <p:sldId id="284" r:id="rId7"/>
     <p:sldId id="286" r:id="rId8"/>
-    <p:sldId id="287" r:id="rId9"/>
+    <p:sldId id="290" r:id="rId9"/>
+    <p:sldId id="285" r:id="rId10"/>
   </p:sldIdLst>
   <p:sldSz cx="12192000" cy="6858000"/>
   <p:notesSz cx="6858000" cy="9144000"/>
@@ -16654,6 +16655,271 @@
         <p:cNvPr id="1" name="">
           <a:extLst>
             <a:ext uri="{FF2B5EF4-FFF2-40B4-BE49-F238E27FC236}">
+              <a16:creationId xmlns:a16="http://schemas.microsoft.com/office/drawing/2014/main" id="{0A6C99E7-28D1-1863-B843-BDB1BA72BEF8}"/>
+            </a:ext>
+          </a:extLst>
+        </p:cNvPr>
+        <p:cNvGrpSpPr/>
+        <p:nvPr/>
+      </p:nvGrpSpPr>
+      <p:grpSpPr>
+        <a:xfrm>
+          <a:off x="0" y="0"/>
+          <a:ext cx="0" cy="0"/>
+          <a:chOff x="0" y="0"/>
+          <a:chExt cx="0" cy="0"/>
+        </a:xfrm>
+      </p:grpSpPr>
+      <p:sp>
+        <p:nvSpPr>
+          <p:cNvPr id="2" name="Titre 1">
+            <a:extLst>
+              <a:ext uri="{FF2B5EF4-FFF2-40B4-BE49-F238E27FC236}">
+                <a16:creationId xmlns:a16="http://schemas.microsoft.com/office/drawing/2014/main" id="{BCE18273-212A-F2AE-D06C-5D55F27BA295}"/>
+              </a:ext>
+            </a:extLst>
+          </p:cNvPr>
+          <p:cNvSpPr>
+            <a:spLocks noGrp="1"/>
+          </p:cNvSpPr>
+          <p:nvPr>
+            <p:ph type="title"/>
+          </p:nvPr>
+        </p:nvSpPr>
+        <p:spPr>
+          <a:xfrm>
+            <a:off x="838200" y="222062"/>
+            <a:ext cx="10963274" cy="583781"/>
+          </a:xfrm>
+        </p:spPr>
+        <p:txBody>
+          <a:bodyPr/>
+          <a:lstStyle/>
+          <a:p>
+            <a:r>
+              <a:rPr lang="fr-FR" dirty="0"/>
+              <a:t>Plan de la présentation</a:t>
+            </a:r>
+            <a:endParaRPr lang="en-US" dirty="0"/>
+          </a:p>
+        </p:txBody>
+      </p:sp>
+      <p:sp>
+        <p:nvSpPr>
+          <p:cNvPr id="3" name="Espace réservé de la date 2">
+            <a:extLst>
+              <a:ext uri="{FF2B5EF4-FFF2-40B4-BE49-F238E27FC236}">
+                <a16:creationId xmlns:a16="http://schemas.microsoft.com/office/drawing/2014/main" id="{A9D7426C-AC89-D4F1-1CAC-0DFCA9D672FA}"/>
+              </a:ext>
+            </a:extLst>
+          </p:cNvPr>
+          <p:cNvSpPr>
+            <a:spLocks noGrp="1"/>
+          </p:cNvSpPr>
+          <p:nvPr>
+            <p:ph type="dt" sz="half" idx="10"/>
+          </p:nvPr>
+        </p:nvSpPr>
+        <p:spPr>
+          <a:xfrm>
+            <a:off x="838200" y="6356350"/>
+            <a:ext cx="2743200" cy="365125"/>
+          </a:xfrm>
+        </p:spPr>
+        <p:txBody>
+          <a:bodyPr/>
+          <a:lstStyle/>
+          <a:p>
+            <a:r>
+              <a:rPr lang="en-US"/>
+              <a:t>2024</a:t>
+            </a:r>
+            <a:endParaRPr lang="en-US" dirty="0"/>
+          </a:p>
+        </p:txBody>
+      </p:sp>
+      <p:sp>
+        <p:nvSpPr>
+          <p:cNvPr id="4" name="Espace réservé du pied de page 3">
+            <a:extLst>
+              <a:ext uri="{FF2B5EF4-FFF2-40B4-BE49-F238E27FC236}">
+                <a16:creationId xmlns:a16="http://schemas.microsoft.com/office/drawing/2014/main" id="{90746791-CA99-DF79-0910-02C52AF774DE}"/>
+              </a:ext>
+            </a:extLst>
+          </p:cNvPr>
+          <p:cNvSpPr>
+            <a:spLocks noGrp="1"/>
+          </p:cNvSpPr>
+          <p:nvPr>
+            <p:ph type="ftr" sz="quarter" idx="11"/>
+          </p:nvPr>
+        </p:nvSpPr>
+        <p:spPr>
+          <a:xfrm>
+            <a:off x="4038600" y="6356350"/>
+            <a:ext cx="4114800" cy="365125"/>
+          </a:xfrm>
+        </p:spPr>
+        <p:txBody>
+          <a:bodyPr/>
+          <a:lstStyle/>
+          <a:p>
+            <a:r>
+              <a:rPr lang="en-US"/>
+              <a:t>Projet classification de documents</a:t>
+            </a:r>
+            <a:endParaRPr lang="en-US" dirty="0"/>
+          </a:p>
+        </p:txBody>
+      </p:sp>
+      <p:sp>
+        <p:nvSpPr>
+          <p:cNvPr id="5" name="Espace réservé du numéro de diapositive 4">
+            <a:extLst>
+              <a:ext uri="{FF2B5EF4-FFF2-40B4-BE49-F238E27FC236}">
+                <a16:creationId xmlns:a16="http://schemas.microsoft.com/office/drawing/2014/main" id="{A3D6B29D-9783-626C-C979-1CB7066ADACD}"/>
+              </a:ext>
+            </a:extLst>
+          </p:cNvPr>
+          <p:cNvSpPr>
+            <a:spLocks noGrp="1"/>
+          </p:cNvSpPr>
+          <p:nvPr>
+            <p:ph type="sldNum" sz="quarter" idx="12"/>
+          </p:nvPr>
+        </p:nvSpPr>
+        <p:spPr>
+          <a:xfrm>
+            <a:off x="8610600" y="6356350"/>
+            <a:ext cx="2743200" cy="365125"/>
+          </a:xfrm>
+        </p:spPr>
+        <p:txBody>
+          <a:bodyPr/>
+          <a:lstStyle/>
+          <a:p>
+            <a:fld id="{B5CEABB6-07DC-46E8-9B57-56EC44A396E5}" type="slidenum">
+              <a:rPr lang="en-US" smtClean="0"/>
+              <a:pPr/>
+              <a:t>2</a:t>
+            </a:fld>
+            <a:endParaRPr lang="en-US" dirty="0"/>
+          </a:p>
+        </p:txBody>
+      </p:sp>
+      <p:sp>
+        <p:nvSpPr>
+          <p:cNvPr id="6" name="Espace réservé du contenu 5">
+            <a:extLst>
+              <a:ext uri="{FF2B5EF4-FFF2-40B4-BE49-F238E27FC236}">
+                <a16:creationId xmlns:a16="http://schemas.microsoft.com/office/drawing/2014/main" id="{FFA3E202-4659-00EF-1638-0CEE05105C9E}"/>
+              </a:ext>
+            </a:extLst>
+          </p:cNvPr>
+          <p:cNvSpPr>
+            <a:spLocks noGrp="1"/>
+          </p:cNvSpPr>
+          <p:nvPr>
+            <p:ph sz="quarter" idx="16"/>
+          </p:nvPr>
+        </p:nvSpPr>
+        <p:spPr>
+          <a:xfrm>
+            <a:off x="838200" y="1199072"/>
+            <a:ext cx="10963274" cy="4899803"/>
+          </a:xfrm>
+        </p:spPr>
+        <p:txBody>
+          <a:bodyPr/>
+          <a:lstStyle/>
+          <a:p>
+            <a:r>
+              <a:rPr lang="fr-FR" dirty="0"/>
+              <a:t>Introduction &amp; Démo</a:t>
+            </a:r>
+          </a:p>
+          <a:p>
+            <a:r>
+              <a:rPr lang="fr-FR" dirty="0"/>
+              <a:t>Modèles et jeu de données</a:t>
+            </a:r>
+          </a:p>
+          <a:p>
+            <a:r>
+              <a:rPr lang="fr-FR" dirty="0"/>
+              <a:t>Pipeline Training &amp; Monitoring</a:t>
+            </a:r>
+          </a:p>
+          <a:p>
+            <a:pPr lvl="1"/>
+            <a:r>
+              <a:rPr lang="fr-FR" dirty="0"/>
+              <a:t>Ajouter un slide sur le versioning des données et des modèles</a:t>
+            </a:r>
+          </a:p>
+          <a:p>
+            <a:r>
+              <a:rPr lang="fr-FR" dirty="0"/>
+              <a:t>Pipeline Prédiction &amp; Feedback User</a:t>
+            </a:r>
+          </a:p>
+          <a:p>
+            <a:r>
+              <a:rPr lang="fr-FR" dirty="0"/>
+              <a:t>Déploiement </a:t>
+            </a:r>
+            <a:r>
+              <a:rPr lang="fr-FR" dirty="0" err="1"/>
+              <a:t>MLOps</a:t>
+            </a:r>
+            <a:r>
+              <a:rPr lang="fr-FR" dirty="0"/>
+              <a:t> (CI/CD, </a:t>
+            </a:r>
+            <a:r>
+              <a:rPr lang="fr-FR" dirty="0" err="1"/>
+              <a:t>Kubernetes</a:t>
+            </a:r>
+            <a:r>
+              <a:rPr lang="fr-FR" dirty="0"/>
+              <a:t>, Sécurisation)</a:t>
+            </a:r>
+          </a:p>
+          <a:p>
+            <a:pPr lvl="1"/>
+            <a:r>
+              <a:rPr lang="fr-FR" dirty="0"/>
+              <a:t>Ajouter un slide sur le versioning entre Repo Code et Repo </a:t>
+            </a:r>
+            <a:r>
+              <a:rPr lang="fr-FR" dirty="0" err="1"/>
+              <a:t>Deploiement</a:t>
+            </a:r>
+            <a:endParaRPr lang="fr-FR" dirty="0"/>
+          </a:p>
+        </p:txBody>
+      </p:sp>
+    </p:spTree>
+    <p:extLst>
+      <p:ext uri="{BB962C8B-B14F-4D97-AF65-F5344CB8AC3E}">
+        <p14:creationId xmlns:p14="http://schemas.microsoft.com/office/powerpoint/2010/main" val="502873019"/>
+      </p:ext>
+    </p:extLst>
+  </p:cSld>
+  <p:clrMapOvr>
+    <a:masterClrMapping/>
+  </p:clrMapOvr>
+</p:sld>
+</file>
+
+<file path=ppt/slides/slide3.xml><?xml version="1.0" encoding="utf-8"?>
+<p:sld xmlns:a="http://schemas.openxmlformats.org/drawingml/2006/main" xmlns:r="http://schemas.openxmlformats.org/officeDocument/2006/relationships" xmlns:p="http://schemas.openxmlformats.org/presentationml/2006/main">
+  <p:cSld>
+    <p:spTree>
+      <p:nvGrpSpPr>
+        <p:cNvPr id="1" name="">
+          <a:extLst>
+            <a:ext uri="{FF2B5EF4-FFF2-40B4-BE49-F238E27FC236}">
               <a16:creationId xmlns:a16="http://schemas.microsoft.com/office/drawing/2014/main" id="{73C83456-AC12-C271-75BB-B241BEBD5288}"/>
             </a:ext>
           </a:extLst>
@@ -16800,7 +17066,7 @@
             <a:fld id="{B5CEABB6-07DC-46E8-9B57-56EC44A396E5}" type="slidenum">
               <a:rPr lang="en-US" smtClean="0"/>
               <a:pPr/>
-              <a:t>2</a:t>
+              <a:t>3</a:t>
             </a:fld>
             <a:endParaRPr lang="en-US" dirty="0"/>
           </a:p>
@@ -16825,7 +17091,7 @@
         <p:spPr>
           <a:xfrm>
             <a:off x="838200" y="1198562"/>
-            <a:ext cx="11353800" cy="5437375"/>
+            <a:ext cx="11114988" cy="5079689"/>
           </a:xfrm>
         </p:spPr>
         <p:txBody>
@@ -16834,7 +17100,7 @@
           <a:p>
             <a:r>
               <a:rPr lang="fr-FR" dirty="0"/>
-              <a:t>Contexte Projet existant Data </a:t>
+              <a:t>Projet existant Data-</a:t>
             </a:r>
             <a:r>
               <a:rPr lang="fr-FR" dirty="0" err="1"/>
@@ -16848,11 +17114,11 @@
               <a:rPr lang="fr-FR" dirty="0">
                 <a:sym typeface="Wingdings" panose="05000000000000000000" pitchFamily="2" charset="2"/>
               </a:rPr>
-              <a:t></a:t>
+              <a:t>transformé en p</a:t>
             </a:r>
             <a:r>
               <a:rPr lang="fr-FR" dirty="0"/>
-              <a:t> Projet </a:t>
+              <a:t>rojet </a:t>
             </a:r>
             <a:r>
               <a:rPr lang="fr-FR" dirty="0" err="1"/>
@@ -16928,57 +17194,44 @@
             <a:pPr lvl="2"/>
             <a:r>
               <a:rPr lang="fr-FR" dirty="0"/>
-              <a:t> Interface Utilisateur pour Classer un groupe d’images</a:t>
+              <a:t> Interface Utilisateur</a:t>
+            </a:r>
+          </a:p>
+          <a:p>
+            <a:pPr marL="1828800" lvl="3" indent="-457200">
+              <a:buFont typeface="+mj-lt"/>
+              <a:buAutoNum type="arabicPeriod"/>
+            </a:pPr>
+            <a:r>
+              <a:rPr lang="fr-FR" sz="2000" dirty="0"/>
+              <a:t>Classer un groupe d’images</a:t>
             </a:r>
           </a:p>
           <a:p>
             <a:pPr lvl="2"/>
             <a:r>
               <a:rPr lang="fr-FR" dirty="0"/>
-              <a:t> Interface Admin pour Lancer des entrainements de modèle sur des images classées</a:t>
-            </a:r>
-          </a:p>
-          <a:p>
-            <a:pPr lvl="2"/>
-            <a:r>
-              <a:rPr lang="fr-FR" dirty="0"/>
-              <a:t> Interface Admin pour Monitorer le système d’entrainement et de prédiction</a:t>
-            </a:r>
-          </a:p>
-          <a:p>
-            <a:r>
-              <a:rPr lang="fr-FR" dirty="0"/>
-              <a:t>Jeu de données</a:t>
-            </a:r>
-          </a:p>
-          <a:p>
-            <a:pPr lvl="1"/>
-            <a:r>
-              <a:rPr lang="fr-FR" dirty="0"/>
-              <a:t>Initialement - Data </a:t>
-            </a:r>
-            <a:r>
-              <a:rPr lang="fr-FR" dirty="0" err="1"/>
-              <a:t>Scientist</a:t>
-            </a:r>
-            <a:r>
-              <a:rPr lang="fr-FR" dirty="0"/>
-              <a:t>: 1608 images couvrant 23 types de documents</a:t>
-            </a:r>
-          </a:p>
-          <a:p>
-            <a:pPr lvl="1"/>
-            <a:r>
-              <a:rPr lang="fr-FR" dirty="0"/>
-              <a:t>Réduction </a:t>
-            </a:r>
-            <a:r>
-              <a:rPr lang="fr-FR" dirty="0" err="1"/>
-              <a:t>MLOps</a:t>
-            </a:r>
-            <a:r>
-              <a:rPr lang="fr-FR" dirty="0"/>
-              <a:t>: ~200 images « propre » pour 3 catégories (Facture, ID, CV)</a:t>
+              <a:t> Interface Admin</a:t>
+            </a:r>
+          </a:p>
+          <a:p>
+            <a:pPr marL="1828800" lvl="3" indent="-457200">
+              <a:buFont typeface="+mj-lt"/>
+              <a:buAutoNum type="arabicPeriod" startAt="2"/>
+            </a:pPr>
+            <a:r>
+              <a:rPr lang="fr-FR" sz="2000" dirty="0"/>
+              <a:t>Lancer des entrainements de modèle sur des images classées</a:t>
+            </a:r>
+          </a:p>
+          <a:p>
+            <a:pPr marL="1828800" lvl="3" indent="-457200">
+              <a:buFont typeface="+mj-lt"/>
+              <a:buAutoNum type="arabicPeriod" startAt="2"/>
+            </a:pPr>
+            <a:r>
+              <a:rPr lang="fr-FR" sz="2000" dirty="0"/>
+              <a:t>Monitorer le système d’entrainement et de prédiction</a:t>
             </a:r>
           </a:p>
         </p:txBody>
@@ -16993,151 +17246,546 @@
   <p:clrMapOvr>
     <a:masterClrMapping/>
   </p:clrMapOvr>
-  <p:timing>
-    <p:tnLst>
-      <p:par>
-        <p:cTn id="1" dur="indefinite" restart="never" nodeType="tmRoot">
-          <p:childTnLst>
-            <p:seq concurrent="1" nextAc="seek">
-              <p:cTn id="2" dur="indefinite" nodeType="mainSeq">
-                <p:childTnLst>
-                  <p:par>
-                    <p:cTn id="3" fill="hold">
-                      <p:stCondLst>
-                        <p:cond delay="indefinite"/>
-                      </p:stCondLst>
-                      <p:childTnLst>
-                        <p:par>
-                          <p:cTn id="4" fill="hold">
-                            <p:stCondLst>
-                              <p:cond delay="0"/>
-                            </p:stCondLst>
-                            <p:childTnLst>
-                              <p:par>
-                                <p:cTn id="5" presetID="1" presetClass="entr" presetSubtype="0" fill="hold" nodeType="clickEffect">
-                                  <p:stCondLst>
-                                    <p:cond delay="0"/>
-                                  </p:stCondLst>
-                                  <p:childTnLst>
-                                    <p:set>
-                                      <p:cBhvr>
-                                        <p:cTn id="6" dur="1" fill="hold">
-                                          <p:stCondLst>
-                                            <p:cond delay="0"/>
-                                          </p:stCondLst>
-                                        </p:cTn>
-                                        <p:tgtEl>
-                                          <p:spTgt spid="6">
-                                            <p:txEl>
-                                              <p:pRg st="10" end="10"/>
-                                            </p:txEl>
-                                          </p:spTgt>
-                                        </p:tgtEl>
-                                        <p:attrNameLst>
-                                          <p:attrName>style.visibility</p:attrName>
-                                        </p:attrNameLst>
-                                      </p:cBhvr>
-                                      <p:to>
-                                        <p:strVal val="visible"/>
-                                      </p:to>
-                                    </p:set>
-                                  </p:childTnLst>
-                                </p:cTn>
-                              </p:par>
-                              <p:par>
-                                <p:cTn id="7" presetID="1" presetClass="entr" presetSubtype="0" fill="hold" nodeType="withEffect">
-                                  <p:stCondLst>
-                                    <p:cond delay="0"/>
-                                  </p:stCondLst>
-                                  <p:childTnLst>
-                                    <p:set>
-                                      <p:cBhvr>
-                                        <p:cTn id="8" dur="1" fill="hold">
-                                          <p:stCondLst>
-                                            <p:cond delay="0"/>
-                                          </p:stCondLst>
-                                        </p:cTn>
-                                        <p:tgtEl>
-                                          <p:spTgt spid="6">
-                                            <p:txEl>
-                                              <p:pRg st="11" end="11"/>
-                                            </p:txEl>
-                                          </p:spTgt>
-                                        </p:tgtEl>
-                                        <p:attrNameLst>
-                                          <p:attrName>style.visibility</p:attrName>
-                                        </p:attrNameLst>
-                                      </p:cBhvr>
-                                      <p:to>
-                                        <p:strVal val="visible"/>
-                                      </p:to>
-                                    </p:set>
-                                  </p:childTnLst>
-                                </p:cTn>
-                              </p:par>
-                              <p:par>
-                                <p:cTn id="9" presetID="1" presetClass="entr" presetSubtype="0" fill="hold" nodeType="withEffect">
-                                  <p:stCondLst>
-                                    <p:cond delay="0"/>
-                                  </p:stCondLst>
-                                  <p:childTnLst>
-                                    <p:set>
-                                      <p:cBhvr>
-                                        <p:cTn id="10" dur="1" fill="hold">
-                                          <p:stCondLst>
-                                            <p:cond delay="0"/>
-                                          </p:stCondLst>
-                                        </p:cTn>
-                                        <p:tgtEl>
-                                          <p:spTgt spid="6">
-                                            <p:txEl>
-                                              <p:pRg st="12" end="12"/>
-                                            </p:txEl>
-                                          </p:spTgt>
-                                        </p:tgtEl>
-                                        <p:attrNameLst>
-                                          <p:attrName>style.visibility</p:attrName>
-                                        </p:attrNameLst>
-                                      </p:cBhvr>
-                                      <p:to>
-                                        <p:strVal val="visible"/>
-                                      </p:to>
-                                    </p:set>
-                                  </p:childTnLst>
-                                </p:cTn>
-                              </p:par>
-                            </p:childTnLst>
-                          </p:cTn>
-                        </p:par>
-                      </p:childTnLst>
-                    </p:cTn>
-                  </p:par>
-                </p:childTnLst>
-              </p:cTn>
-              <p:prevCondLst>
-                <p:cond evt="onPrev" delay="0">
-                  <p:tgtEl>
-                    <p:sldTgt/>
-                  </p:tgtEl>
-                </p:cond>
-              </p:prevCondLst>
-              <p:nextCondLst>
-                <p:cond evt="onNext" delay="0">
-                  <p:tgtEl>
-                    <p:sldTgt/>
-                  </p:tgtEl>
-                </p:cond>
-              </p:nextCondLst>
-            </p:seq>
-          </p:childTnLst>
-        </p:cTn>
-      </p:par>
-    </p:tnLst>
-  </p:timing>
 </p:sld>
 </file>
 
-<file path=ppt/slides/slide3.xml><?xml version="1.0" encoding="utf-8"?>
+<file path=ppt/slides/slide4.xml><?xml version="1.0" encoding="utf-8"?>
+<p:sld xmlns:a="http://schemas.openxmlformats.org/drawingml/2006/main" xmlns:r="http://schemas.openxmlformats.org/officeDocument/2006/relationships" xmlns:p="http://schemas.openxmlformats.org/presentationml/2006/main">
+  <p:cSld>
+    <p:spTree>
+      <p:nvGrpSpPr>
+        <p:cNvPr id="1" name="">
+          <a:extLst>
+            <a:ext uri="{FF2B5EF4-FFF2-40B4-BE49-F238E27FC236}">
+              <a16:creationId xmlns:a16="http://schemas.microsoft.com/office/drawing/2014/main" id="{5BF829F3-B6C5-9DFE-53BB-39AD4BED3EAE}"/>
+            </a:ext>
+          </a:extLst>
+        </p:cNvPr>
+        <p:cNvGrpSpPr/>
+        <p:nvPr/>
+      </p:nvGrpSpPr>
+      <p:grpSpPr>
+        <a:xfrm>
+          <a:off x="0" y="0"/>
+          <a:ext cx="0" cy="0"/>
+          <a:chOff x="0" y="0"/>
+          <a:chExt cx="0" cy="0"/>
+        </a:xfrm>
+      </p:grpSpPr>
+      <p:sp>
+        <p:nvSpPr>
+          <p:cNvPr id="2" name="Titre 1">
+            <a:extLst>
+              <a:ext uri="{FF2B5EF4-FFF2-40B4-BE49-F238E27FC236}">
+                <a16:creationId xmlns:a16="http://schemas.microsoft.com/office/drawing/2014/main" id="{0E83583A-DC23-D09D-A2D1-38ADAD16FF2D}"/>
+              </a:ext>
+            </a:extLst>
+          </p:cNvPr>
+          <p:cNvSpPr>
+            <a:spLocks noGrp="1"/>
+          </p:cNvSpPr>
+          <p:nvPr>
+            <p:ph type="title"/>
+          </p:nvPr>
+        </p:nvSpPr>
+        <p:spPr>
+          <a:xfrm>
+            <a:off x="838200" y="222062"/>
+            <a:ext cx="10963274" cy="583781"/>
+          </a:xfrm>
+        </p:spPr>
+        <p:txBody>
+          <a:bodyPr/>
+          <a:lstStyle/>
+          <a:p>
+            <a:r>
+              <a:rPr lang="fr-FR" dirty="0"/>
+              <a:t>Vue d’ensemble du projet</a:t>
+            </a:r>
+            <a:endParaRPr lang="en-US" dirty="0"/>
+          </a:p>
+        </p:txBody>
+      </p:sp>
+      <p:sp>
+        <p:nvSpPr>
+          <p:cNvPr id="3" name="Espace réservé de la date 2">
+            <a:extLst>
+              <a:ext uri="{FF2B5EF4-FFF2-40B4-BE49-F238E27FC236}">
+                <a16:creationId xmlns:a16="http://schemas.microsoft.com/office/drawing/2014/main" id="{BA3FDF07-89BB-B5F2-789D-155303C7EAF7}"/>
+              </a:ext>
+            </a:extLst>
+          </p:cNvPr>
+          <p:cNvSpPr>
+            <a:spLocks noGrp="1"/>
+          </p:cNvSpPr>
+          <p:nvPr>
+            <p:ph type="dt" sz="half" idx="10"/>
+          </p:nvPr>
+        </p:nvSpPr>
+        <p:spPr>
+          <a:xfrm>
+            <a:off x="838200" y="6356350"/>
+            <a:ext cx="2743200" cy="365125"/>
+          </a:xfrm>
+        </p:spPr>
+        <p:txBody>
+          <a:bodyPr/>
+          <a:lstStyle/>
+          <a:p>
+            <a:r>
+              <a:rPr lang="en-US"/>
+              <a:t>2024</a:t>
+            </a:r>
+            <a:endParaRPr lang="en-US" dirty="0"/>
+          </a:p>
+        </p:txBody>
+      </p:sp>
+      <p:sp>
+        <p:nvSpPr>
+          <p:cNvPr id="4" name="Espace réservé du pied de page 3">
+            <a:extLst>
+              <a:ext uri="{FF2B5EF4-FFF2-40B4-BE49-F238E27FC236}">
+                <a16:creationId xmlns:a16="http://schemas.microsoft.com/office/drawing/2014/main" id="{58A13379-2586-57B0-8399-CD90631C1706}"/>
+              </a:ext>
+            </a:extLst>
+          </p:cNvPr>
+          <p:cNvSpPr>
+            <a:spLocks noGrp="1"/>
+          </p:cNvSpPr>
+          <p:nvPr>
+            <p:ph type="ftr" sz="quarter" idx="11"/>
+          </p:nvPr>
+        </p:nvSpPr>
+        <p:spPr>
+          <a:xfrm>
+            <a:off x="4038600" y="6356350"/>
+            <a:ext cx="4114800" cy="365125"/>
+          </a:xfrm>
+        </p:spPr>
+        <p:txBody>
+          <a:bodyPr/>
+          <a:lstStyle/>
+          <a:p>
+            <a:r>
+              <a:rPr lang="en-US"/>
+              <a:t>Projet classification de documents</a:t>
+            </a:r>
+            <a:endParaRPr lang="en-US" dirty="0"/>
+          </a:p>
+        </p:txBody>
+      </p:sp>
+      <p:sp>
+        <p:nvSpPr>
+          <p:cNvPr id="5" name="Espace réservé du numéro de diapositive 4">
+            <a:extLst>
+              <a:ext uri="{FF2B5EF4-FFF2-40B4-BE49-F238E27FC236}">
+                <a16:creationId xmlns:a16="http://schemas.microsoft.com/office/drawing/2014/main" id="{778E5512-AE7C-5723-792D-5C62B338570B}"/>
+              </a:ext>
+            </a:extLst>
+          </p:cNvPr>
+          <p:cNvSpPr>
+            <a:spLocks noGrp="1"/>
+          </p:cNvSpPr>
+          <p:nvPr>
+            <p:ph type="sldNum" sz="quarter" idx="12"/>
+          </p:nvPr>
+        </p:nvSpPr>
+        <p:spPr>
+          <a:xfrm>
+            <a:off x="8610600" y="6356350"/>
+            <a:ext cx="2743200" cy="365125"/>
+          </a:xfrm>
+        </p:spPr>
+        <p:txBody>
+          <a:bodyPr/>
+          <a:lstStyle/>
+          <a:p>
+            <a:fld id="{B5CEABB6-07DC-46E8-9B57-56EC44A396E5}" type="slidenum">
+              <a:rPr lang="en-US" smtClean="0"/>
+              <a:pPr/>
+              <a:t>4</a:t>
+            </a:fld>
+            <a:endParaRPr lang="en-US" dirty="0"/>
+          </a:p>
+        </p:txBody>
+      </p:sp>
+      <p:pic>
+        <p:nvPicPr>
+          <p:cNvPr id="1026" name="Picture 2">
+            <a:extLst>
+              <a:ext uri="{FF2B5EF4-FFF2-40B4-BE49-F238E27FC236}">
+                <a16:creationId xmlns:a16="http://schemas.microsoft.com/office/drawing/2014/main" id="{FB54342D-2402-D435-6C9A-7899B21DF810}"/>
+              </a:ext>
+            </a:extLst>
+          </p:cNvPr>
+          <p:cNvPicPr>
+            <a:picLocks noChangeAspect="1" noChangeArrowheads="1"/>
+          </p:cNvPicPr>
+          <p:nvPr/>
+        </p:nvPicPr>
+        <p:blipFill>
+          <a:blip r:embed="rId2">
+            <a:extLst>
+              <a:ext uri="{28A0092B-C50C-407E-A947-70E740481C1C}">
+                <a14:useLocalDpi xmlns:a14="http://schemas.microsoft.com/office/drawing/2010/main" val="0"/>
+              </a:ext>
+            </a:extLst>
+          </a:blip>
+          <a:srcRect/>
+          <a:stretch>
+            <a:fillRect/>
+          </a:stretch>
+        </p:blipFill>
+        <p:spPr bwMode="auto">
+          <a:xfrm>
+            <a:off x="1790753" y="701218"/>
+            <a:ext cx="5716289" cy="5934720"/>
+          </a:xfrm>
+          <a:prstGeom prst="rect">
+            <a:avLst/>
+          </a:prstGeom>
+          <a:noFill/>
+          <a:extLst>
+            <a:ext uri="{909E8E84-426E-40DD-AFC4-6F175D3DCCD1}">
+              <a14:hiddenFill xmlns:a14="http://schemas.microsoft.com/office/drawing/2010/main">
+                <a:solidFill>
+                  <a:srgbClr val="FFFFFF"/>
+                </a:solidFill>
+              </a14:hiddenFill>
+            </a:ext>
+          </a:extLst>
+        </p:spPr>
+      </p:pic>
+      <p:sp>
+        <p:nvSpPr>
+          <p:cNvPr id="6" name="ZoneTexte 5">
+            <a:extLst>
+              <a:ext uri="{FF2B5EF4-FFF2-40B4-BE49-F238E27FC236}">
+                <a16:creationId xmlns:a16="http://schemas.microsoft.com/office/drawing/2014/main" id="{153FB532-7213-8FF8-CB41-0087BE54D014}"/>
+              </a:ext>
+            </a:extLst>
+          </p:cNvPr>
+          <p:cNvSpPr txBox="1"/>
+          <p:nvPr/>
+        </p:nvSpPr>
+        <p:spPr>
+          <a:xfrm>
+            <a:off x="7507042" y="1800520"/>
+            <a:ext cx="4446145" cy="3046988"/>
+          </a:xfrm>
+          <a:prstGeom prst="rect">
+            <a:avLst/>
+          </a:prstGeom>
+          <a:noFill/>
+        </p:spPr>
+        <p:txBody>
+          <a:bodyPr wrap="square" rtlCol="0">
+            <a:spAutoFit/>
+          </a:bodyPr>
+          <a:lstStyle/>
+          <a:p>
+            <a:r>
+              <a:rPr lang="fr-FR" sz="3200" dirty="0"/>
+              <a:t>Reprendre ce schéma et le simplifier !</a:t>
+            </a:r>
+          </a:p>
+          <a:p>
+            <a:endParaRPr lang="fr-FR" sz="3200" dirty="0"/>
+          </a:p>
+          <a:p>
+            <a:r>
+              <a:rPr lang="fr-FR" sz="3200" dirty="0"/>
+              <a:t>En lien avec les autres Schéma</a:t>
+            </a:r>
+          </a:p>
+          <a:p>
+            <a:endParaRPr lang="fr-FR" sz="3200" dirty="0"/>
+          </a:p>
+        </p:txBody>
+      </p:sp>
+    </p:spTree>
+    <p:extLst>
+      <p:ext uri="{BB962C8B-B14F-4D97-AF65-F5344CB8AC3E}">
+        <p14:creationId xmlns:p14="http://schemas.microsoft.com/office/powerpoint/2010/main" val="979997633"/>
+      </p:ext>
+    </p:extLst>
+  </p:cSld>
+  <p:clrMapOvr>
+    <a:masterClrMapping/>
+  </p:clrMapOvr>
+</p:sld>
+</file>
+
+<file path=ppt/slides/slide5.xml><?xml version="1.0" encoding="utf-8"?>
+<p:sld xmlns:a="http://schemas.openxmlformats.org/drawingml/2006/main" xmlns:r="http://schemas.openxmlformats.org/officeDocument/2006/relationships" xmlns:p="http://schemas.openxmlformats.org/presentationml/2006/main">
+  <p:cSld>
+    <p:spTree>
+      <p:nvGrpSpPr>
+        <p:cNvPr id="1" name="">
+          <a:extLst>
+            <a:ext uri="{FF2B5EF4-FFF2-40B4-BE49-F238E27FC236}">
+              <a16:creationId xmlns:a16="http://schemas.microsoft.com/office/drawing/2014/main" id="{04497FF6-186B-0CFC-1F4B-026E356933F1}"/>
+            </a:ext>
+          </a:extLst>
+        </p:cNvPr>
+        <p:cNvGrpSpPr/>
+        <p:nvPr/>
+      </p:nvGrpSpPr>
+      <p:grpSpPr>
+        <a:xfrm>
+          <a:off x="0" y="0"/>
+          <a:ext cx="0" cy="0"/>
+          <a:chOff x="0" y="0"/>
+          <a:chExt cx="0" cy="0"/>
+        </a:xfrm>
+      </p:grpSpPr>
+      <p:sp>
+        <p:nvSpPr>
+          <p:cNvPr id="2" name="Titre 1">
+            <a:extLst>
+              <a:ext uri="{FF2B5EF4-FFF2-40B4-BE49-F238E27FC236}">
+                <a16:creationId xmlns:a16="http://schemas.microsoft.com/office/drawing/2014/main" id="{1E2769F6-8F44-1842-7F48-EE5E0481F47C}"/>
+              </a:ext>
+            </a:extLst>
+          </p:cNvPr>
+          <p:cNvSpPr>
+            <a:spLocks noGrp="1"/>
+          </p:cNvSpPr>
+          <p:nvPr>
+            <p:ph type="title"/>
+          </p:nvPr>
+        </p:nvSpPr>
+        <p:spPr>
+          <a:xfrm>
+            <a:off x="838200" y="222062"/>
+            <a:ext cx="10963274" cy="583781"/>
+          </a:xfrm>
+        </p:spPr>
+        <p:txBody>
+          <a:bodyPr/>
+          <a:lstStyle/>
+          <a:p>
+            <a:r>
+              <a:rPr lang="fr-FR" dirty="0"/>
+              <a:t>Plan de la présentation</a:t>
+            </a:r>
+            <a:endParaRPr lang="en-US" dirty="0"/>
+          </a:p>
+        </p:txBody>
+      </p:sp>
+      <p:sp>
+        <p:nvSpPr>
+          <p:cNvPr id="3" name="Espace réservé de la date 2">
+            <a:extLst>
+              <a:ext uri="{FF2B5EF4-FFF2-40B4-BE49-F238E27FC236}">
+                <a16:creationId xmlns:a16="http://schemas.microsoft.com/office/drawing/2014/main" id="{026044A3-DF31-CA40-8A7B-E500D7DD35FD}"/>
+              </a:ext>
+            </a:extLst>
+          </p:cNvPr>
+          <p:cNvSpPr>
+            <a:spLocks noGrp="1"/>
+          </p:cNvSpPr>
+          <p:nvPr>
+            <p:ph type="dt" sz="half" idx="10"/>
+          </p:nvPr>
+        </p:nvSpPr>
+        <p:spPr>
+          <a:xfrm>
+            <a:off x="838200" y="6356350"/>
+            <a:ext cx="2743200" cy="365125"/>
+          </a:xfrm>
+        </p:spPr>
+        <p:txBody>
+          <a:bodyPr/>
+          <a:lstStyle/>
+          <a:p>
+            <a:r>
+              <a:rPr lang="en-US"/>
+              <a:t>2024</a:t>
+            </a:r>
+            <a:endParaRPr lang="en-US" dirty="0"/>
+          </a:p>
+        </p:txBody>
+      </p:sp>
+      <p:sp>
+        <p:nvSpPr>
+          <p:cNvPr id="4" name="Espace réservé du pied de page 3">
+            <a:extLst>
+              <a:ext uri="{FF2B5EF4-FFF2-40B4-BE49-F238E27FC236}">
+                <a16:creationId xmlns:a16="http://schemas.microsoft.com/office/drawing/2014/main" id="{2E144701-9AAB-ED59-3B7F-1B2F3906617A}"/>
+              </a:ext>
+            </a:extLst>
+          </p:cNvPr>
+          <p:cNvSpPr>
+            <a:spLocks noGrp="1"/>
+          </p:cNvSpPr>
+          <p:nvPr>
+            <p:ph type="ftr" sz="quarter" idx="11"/>
+          </p:nvPr>
+        </p:nvSpPr>
+        <p:spPr>
+          <a:xfrm>
+            <a:off x="4038600" y="6356350"/>
+            <a:ext cx="4114800" cy="365125"/>
+          </a:xfrm>
+        </p:spPr>
+        <p:txBody>
+          <a:bodyPr/>
+          <a:lstStyle/>
+          <a:p>
+            <a:r>
+              <a:rPr lang="en-US"/>
+              <a:t>Projet classification de documents</a:t>
+            </a:r>
+            <a:endParaRPr lang="en-US" dirty="0"/>
+          </a:p>
+        </p:txBody>
+      </p:sp>
+      <p:sp>
+        <p:nvSpPr>
+          <p:cNvPr id="5" name="Espace réservé du numéro de diapositive 4">
+            <a:extLst>
+              <a:ext uri="{FF2B5EF4-FFF2-40B4-BE49-F238E27FC236}">
+                <a16:creationId xmlns:a16="http://schemas.microsoft.com/office/drawing/2014/main" id="{7AD0AF2A-9772-26A4-1814-3E57BEFF852F}"/>
+              </a:ext>
+            </a:extLst>
+          </p:cNvPr>
+          <p:cNvSpPr>
+            <a:spLocks noGrp="1"/>
+          </p:cNvSpPr>
+          <p:nvPr>
+            <p:ph type="sldNum" sz="quarter" idx="12"/>
+          </p:nvPr>
+        </p:nvSpPr>
+        <p:spPr>
+          <a:xfrm>
+            <a:off x="8610600" y="6356350"/>
+            <a:ext cx="2743200" cy="365125"/>
+          </a:xfrm>
+        </p:spPr>
+        <p:txBody>
+          <a:bodyPr/>
+          <a:lstStyle/>
+          <a:p>
+            <a:fld id="{B5CEABB6-07DC-46E8-9B57-56EC44A396E5}" type="slidenum">
+              <a:rPr lang="en-US" smtClean="0"/>
+              <a:pPr/>
+              <a:t>5</a:t>
+            </a:fld>
+            <a:endParaRPr lang="en-US" dirty="0"/>
+          </a:p>
+        </p:txBody>
+      </p:sp>
+      <p:sp>
+        <p:nvSpPr>
+          <p:cNvPr id="6" name="Espace réservé du contenu 5">
+            <a:extLst>
+              <a:ext uri="{FF2B5EF4-FFF2-40B4-BE49-F238E27FC236}">
+                <a16:creationId xmlns:a16="http://schemas.microsoft.com/office/drawing/2014/main" id="{17371F1E-F6BA-307D-9707-FEB85C7383DD}"/>
+              </a:ext>
+            </a:extLst>
+          </p:cNvPr>
+          <p:cNvSpPr>
+            <a:spLocks noGrp="1"/>
+          </p:cNvSpPr>
+          <p:nvPr>
+            <p:ph sz="quarter" idx="16"/>
+          </p:nvPr>
+        </p:nvSpPr>
+        <p:spPr>
+          <a:xfrm>
+            <a:off x="838200" y="1199072"/>
+            <a:ext cx="10963274" cy="4899803"/>
+          </a:xfrm>
+        </p:spPr>
+        <p:txBody>
+          <a:bodyPr/>
+          <a:lstStyle/>
+          <a:p>
+            <a:r>
+              <a:rPr lang="fr-FR" dirty="0"/>
+              <a:t>Introduction &amp; Démo</a:t>
+            </a:r>
+          </a:p>
+          <a:p>
+            <a:r>
+              <a:rPr lang="fr-FR" b="1" dirty="0"/>
+              <a:t>Modèles et jeu de données</a:t>
+            </a:r>
+          </a:p>
+          <a:p>
+            <a:r>
+              <a:rPr lang="fr-FR" dirty="0"/>
+              <a:t>Pipeline Training &amp; Monitoring</a:t>
+            </a:r>
+          </a:p>
+          <a:p>
+            <a:pPr lvl="1"/>
+            <a:r>
+              <a:rPr lang="fr-FR" dirty="0"/>
+              <a:t>Ajouter un slide sur le versioning des données et des modèles</a:t>
+            </a:r>
+          </a:p>
+          <a:p>
+            <a:r>
+              <a:rPr lang="fr-FR"/>
+              <a:t>Pipeline Prédiction </a:t>
+            </a:r>
+            <a:r>
+              <a:rPr lang="fr-FR" dirty="0"/>
+              <a:t>&amp; Feedback User</a:t>
+            </a:r>
+          </a:p>
+          <a:p>
+            <a:r>
+              <a:rPr lang="fr-FR" dirty="0"/>
+              <a:t>Déploiement </a:t>
+            </a:r>
+            <a:r>
+              <a:rPr lang="fr-FR" dirty="0" err="1"/>
+              <a:t>MLOps</a:t>
+            </a:r>
+            <a:r>
+              <a:rPr lang="fr-FR" dirty="0"/>
+              <a:t> (CI/CD, </a:t>
+            </a:r>
+            <a:r>
+              <a:rPr lang="fr-FR" dirty="0" err="1"/>
+              <a:t>Kubernetes</a:t>
+            </a:r>
+            <a:r>
+              <a:rPr lang="fr-FR" dirty="0"/>
+              <a:t>, Sécurisation)</a:t>
+            </a:r>
+          </a:p>
+          <a:p>
+            <a:pPr lvl="1"/>
+            <a:r>
+              <a:rPr lang="fr-FR" dirty="0"/>
+              <a:t>Ajouter un slide sur le versioning entre Repo Code et Repo </a:t>
+            </a:r>
+            <a:r>
+              <a:rPr lang="fr-FR" dirty="0" err="1"/>
+              <a:t>Deploiement</a:t>
+            </a:r>
+            <a:endParaRPr lang="fr-FR" dirty="0"/>
+          </a:p>
+        </p:txBody>
+      </p:sp>
+    </p:spTree>
+    <p:extLst>
+      <p:ext uri="{BB962C8B-B14F-4D97-AF65-F5344CB8AC3E}">
+        <p14:creationId xmlns:p14="http://schemas.microsoft.com/office/powerpoint/2010/main" val="1993415277"/>
+      </p:ext>
+    </p:extLst>
+  </p:cSld>
+  <p:clrMapOvr>
+    <a:masterClrMapping/>
+  </p:clrMapOvr>
+</p:sld>
+</file>
+
+<file path=ppt/slides/slide6.xml><?xml version="1.0" encoding="utf-8"?>
 <p:sld xmlns:a="http://schemas.openxmlformats.org/drawingml/2006/main" xmlns:r="http://schemas.openxmlformats.org/officeDocument/2006/relationships" xmlns:p="http://schemas.openxmlformats.org/presentationml/2006/main">
   <p:cSld>
     <p:spTree>
@@ -17291,7 +17939,7 @@
             <a:fld id="{B5CEABB6-07DC-46E8-9B57-56EC44A396E5}" type="slidenum">
               <a:rPr lang="en-US" smtClean="0"/>
               <a:pPr/>
-              <a:t>3</a:t>
+              <a:t>6</a:t>
             </a:fld>
             <a:endParaRPr lang="en-US" dirty="0"/>
           </a:p>
@@ -17325,36 +17973,41 @@
           <a:p>
             <a:r>
               <a:rPr lang="fr-FR" dirty="0"/>
-              <a:t>Pour le projet Data </a:t>
-            </a:r>
-            <a:r>
-              <a:rPr lang="fr-FR" dirty="0" err="1"/>
-              <a:t>Scientist</a:t>
-            </a:r>
+              <a:t>Jeu de données initial d’entrainement</a:t>
+            </a:r>
+          </a:p>
+          <a:p>
+            <a:pPr lvl="1"/>
             <a:r>
               <a:rPr lang="fr-FR" dirty="0"/>
-              <a:t>, nous avions terminé avec 3 modèles</a:t>
+              <a:t>~200 images « propre » pour 3 catégories (Facture, ID, CV)</a:t>
+            </a:r>
+          </a:p>
+          <a:p>
+            <a:r>
+              <a:rPr lang="fr-FR" dirty="0"/>
+              <a:t>Modèles utilisés</a:t>
             </a:r>
           </a:p>
           <a:p>
             <a:pPr lvl="1"/>
             <a:r>
               <a:rPr lang="fr-FR" dirty="0"/>
-              <a:t> Modèle OCR (modèle </a:t>
-            </a:r>
-            <a:r>
-              <a:rPr lang="fr-FR" dirty="0" err="1"/>
-              <a:t>deep-learning</a:t>
+              <a:t>Modèle </a:t>
+            </a:r>
+            <a:r>
+              <a:rPr lang="fr-FR" b="1" dirty="0"/>
+              <a:t>OCR</a:t>
             </a:r>
             <a:r>
               <a:rPr lang="fr-FR" dirty="0"/>
-              <a:t> Doc-TR optimisé) </a:t>
+              <a:t> : image </a:t>
             </a:r>
             <a:r>
               <a:rPr lang="fr-FR" dirty="0">
                 <a:sym typeface="Wingdings" panose="05000000000000000000" pitchFamily="2" charset="2"/>
               </a:rPr>
-              <a:t> Texte océrisé</a:t>
+              <a:t> texte océrisé</a:t>
             </a:r>
             <a:endParaRPr lang="fr-FR" dirty="0"/>
           </a:p>
@@ -17362,65 +18015,10 @@
             <a:pPr lvl="1"/>
             <a:r>
               <a:rPr lang="fr-FR" dirty="0"/>
-              <a:t> Modèle visuel (uniquement </a:t>
-            </a:r>
-            <a:r>
-              <a:rPr lang="fr-FR" dirty="0" err="1"/>
-              <a:t>deep-learning</a:t>
-            </a:r>
-            <a:r>
-              <a:rPr lang="fr-FR" dirty="0"/>
-              <a:t> sur analyse des aspects graphiques)</a:t>
-            </a:r>
-          </a:p>
-          <a:p>
-            <a:pPr lvl="1"/>
-            <a:r>
-              <a:rPr lang="fr-FR" dirty="0"/>
-              <a:t> Modèle hybride (architecture neuronale) à 2 entrées : textes océrisés + images</a:t>
-            </a:r>
-          </a:p>
-          <a:p>
-            <a:r>
-              <a:rPr lang="fr-FR" dirty="0"/>
-              <a:t>Pour le projet </a:t>
-            </a:r>
-            <a:r>
-              <a:rPr lang="fr-FR" dirty="0" err="1"/>
-              <a:t>MLOps</a:t>
-            </a:r>
-            <a:endParaRPr lang="fr-FR" dirty="0"/>
-          </a:p>
-          <a:p>
-            <a:pPr lvl="1"/>
-            <a:r>
-              <a:rPr lang="fr-FR" dirty="0"/>
-              <a:t> Modèle OCR réutilisé en l’état </a:t>
-            </a:r>
-            <a:r>
-              <a:rPr lang="fr-FR" dirty="0">
-                <a:sym typeface="Wingdings" panose="05000000000000000000" pitchFamily="2" charset="2"/>
-              </a:rPr>
-              <a:t> </a:t>
-            </a:r>
-            <a:r>
-              <a:rPr lang="fr-FR" dirty="0"/>
-              <a:t>Docker indépendant déployé sur </a:t>
-            </a:r>
-            <a:r>
-              <a:rPr lang="fr-FR" dirty="0" err="1"/>
-              <a:t>DockerHub</a:t>
-            </a:r>
-            <a:endParaRPr lang="fr-FR" dirty="0"/>
-          </a:p>
-          <a:p>
-            <a:pPr lvl="1"/>
-            <a:r>
-              <a:rPr lang="fr-FR" dirty="0"/>
-              <a:t> Modèle simple </a:t>
-            </a:r>
-            <a:r>
-              <a:rPr lang="fr-FR" dirty="0" err="1"/>
+              <a:t>Modèle </a:t>
+            </a:r>
+            <a:r>
+              <a:rPr lang="fr-FR" b="1" dirty="0" err="1"/>
               <a:t>LogisticRegression</a:t>
             </a:r>
             <a:r>
@@ -17430,29 +18028,26 @@
           </a:p>
           <a:p>
             <a:r>
+              <a:rPr lang="fr-FR" dirty="0" err="1"/>
+              <a:t>Feature</a:t>
+            </a:r>
+            <a:r>
               <a:rPr lang="fr-FR" dirty="0"/>
-              <a:t>Récupération du nettoyage des données déjà effectuées</a:t>
+              <a:t> engineering des données</a:t>
             </a:r>
           </a:p>
           <a:p>
             <a:pPr lvl="1"/>
             <a:r>
               <a:rPr lang="fr-FR" dirty="0"/>
-              <a:t> Suppression des images non pertinentes ou de mauvaise qualité</a:t>
+              <a:t>Fonctions de Nettoyage du texte océrisé</a:t>
             </a:r>
           </a:p>
           <a:p>
             <a:pPr lvl="1"/>
             <a:r>
               <a:rPr lang="fr-FR" dirty="0"/>
-              <a:t> Fonctions de Nettoyage du texte océrisé</a:t>
-            </a:r>
-          </a:p>
-          <a:p>
-            <a:pPr lvl="1"/>
-            <a:r>
-              <a:rPr lang="fr-FR" dirty="0"/>
-              <a:t> Fonctions de Lemmatisation / </a:t>
+              <a:t>Fonctions de Lemmatisation / </a:t>
             </a:r>
             <a:r>
               <a:rPr lang="fr-FR" dirty="0" err="1"/>
@@ -17469,6 +18064,7 @@
             <a:endParaRPr lang="fr-FR" dirty="0"/>
           </a:p>
           <a:p>
+            <a:pPr lvl="1"/>
             <a:r>
               <a:rPr lang="fr-FR" dirty="0"/>
               <a:t>Récupération des fonctions de vectorisation du texte océrisé (TF-IDF)</a:t>
@@ -17522,7 +18118,7 @@
                                         <p:tgtEl>
                                           <p:spTgt spid="6">
                                             <p:txEl>
-                                              <p:pRg st="7" end="7"/>
+                                              <p:pRg st="5" end="5"/>
                                             </p:txEl>
                                           </p:spTgt>
                                         </p:tgtEl>
@@ -17553,7 +18149,7 @@
                                         <p:tgtEl>
                                           <p:spTgt spid="6">
                                             <p:txEl>
-                                              <p:pRg st="8" end="8"/>
+                                              <p:pRg st="6" end="6"/>
                                             </p:txEl>
                                           </p:spTgt>
                                         </p:tgtEl>
@@ -17584,7 +18180,7 @@
                                         <p:tgtEl>
                                           <p:spTgt spid="6">
                                             <p:txEl>
-                                              <p:pRg st="9" end="9"/>
+                                              <p:pRg st="7" end="7"/>
                                             </p:txEl>
                                           </p:spTgt>
                                         </p:tgtEl>
@@ -17615,38 +18211,7 @@
                                         <p:tgtEl>
                                           <p:spTgt spid="6">
                                             <p:txEl>
-                                              <p:pRg st="10" end="10"/>
-                                            </p:txEl>
-                                          </p:spTgt>
-                                        </p:tgtEl>
-                                        <p:attrNameLst>
-                                          <p:attrName>style.visibility</p:attrName>
-                                        </p:attrNameLst>
-                                      </p:cBhvr>
-                                      <p:to>
-                                        <p:strVal val="visible"/>
-                                      </p:to>
-                                    </p:set>
-                                  </p:childTnLst>
-                                </p:cTn>
-                              </p:par>
-                              <p:par>
-                                <p:cTn id="13" presetID="1" presetClass="entr" presetSubtype="0" fill="hold" nodeType="withEffect">
-                                  <p:stCondLst>
-                                    <p:cond delay="0"/>
-                                  </p:stCondLst>
-                                  <p:childTnLst>
-                                    <p:set>
-                                      <p:cBhvr>
-                                        <p:cTn id="14" dur="1" fill="hold">
-                                          <p:stCondLst>
-                                            <p:cond delay="0"/>
-                                          </p:stCondLst>
-                                        </p:cTn>
-                                        <p:tgtEl>
-                                          <p:spTgt spid="6">
-                                            <p:txEl>
-                                              <p:pRg st="11" end="11"/>
+                                              <p:pRg st="8" end="8"/>
                                             </p:txEl>
                                           </p:spTgt>
                                         </p:tgtEl>
@@ -17689,534 +18254,6 @@
       </p:par>
     </p:tnLst>
   </p:timing>
-</p:sld>
-</file>
-
-<file path=ppt/slides/slide4.xml><?xml version="1.0" encoding="utf-8"?>
-<p:sld xmlns:a="http://schemas.openxmlformats.org/drawingml/2006/main" xmlns:r="http://schemas.openxmlformats.org/officeDocument/2006/relationships" xmlns:p="http://schemas.openxmlformats.org/presentationml/2006/main">
-  <p:cSld>
-    <p:spTree>
-      <p:nvGrpSpPr>
-        <p:cNvPr id="1" name="">
-          <a:extLst>
-            <a:ext uri="{FF2B5EF4-FFF2-40B4-BE49-F238E27FC236}">
-              <a16:creationId xmlns:a16="http://schemas.microsoft.com/office/drawing/2014/main" id="{5BF829F3-B6C5-9DFE-53BB-39AD4BED3EAE}"/>
-            </a:ext>
-          </a:extLst>
-        </p:cNvPr>
-        <p:cNvGrpSpPr/>
-        <p:nvPr/>
-      </p:nvGrpSpPr>
-      <p:grpSpPr>
-        <a:xfrm>
-          <a:off x="0" y="0"/>
-          <a:ext cx="0" cy="0"/>
-          <a:chOff x="0" y="0"/>
-          <a:chExt cx="0" cy="0"/>
-        </a:xfrm>
-      </p:grpSpPr>
-      <p:sp>
-        <p:nvSpPr>
-          <p:cNvPr id="2" name="Titre 1">
-            <a:extLst>
-              <a:ext uri="{FF2B5EF4-FFF2-40B4-BE49-F238E27FC236}">
-                <a16:creationId xmlns:a16="http://schemas.microsoft.com/office/drawing/2014/main" id="{0E83583A-DC23-D09D-A2D1-38ADAD16FF2D}"/>
-              </a:ext>
-            </a:extLst>
-          </p:cNvPr>
-          <p:cNvSpPr>
-            <a:spLocks noGrp="1"/>
-          </p:cNvSpPr>
-          <p:nvPr>
-            <p:ph type="title"/>
-          </p:nvPr>
-        </p:nvSpPr>
-        <p:spPr>
-          <a:xfrm>
-            <a:off x="838200" y="222062"/>
-            <a:ext cx="10963274" cy="583781"/>
-          </a:xfrm>
-        </p:spPr>
-        <p:txBody>
-          <a:bodyPr/>
-          <a:lstStyle/>
-          <a:p>
-            <a:r>
-              <a:rPr lang="fr-FR" dirty="0"/>
-              <a:t>Vue d’ensemble du projet</a:t>
-            </a:r>
-            <a:endParaRPr lang="en-US" dirty="0"/>
-          </a:p>
-        </p:txBody>
-      </p:sp>
-      <p:sp>
-        <p:nvSpPr>
-          <p:cNvPr id="3" name="Espace réservé de la date 2">
-            <a:extLst>
-              <a:ext uri="{FF2B5EF4-FFF2-40B4-BE49-F238E27FC236}">
-                <a16:creationId xmlns:a16="http://schemas.microsoft.com/office/drawing/2014/main" id="{BA3FDF07-89BB-B5F2-789D-155303C7EAF7}"/>
-              </a:ext>
-            </a:extLst>
-          </p:cNvPr>
-          <p:cNvSpPr>
-            <a:spLocks noGrp="1"/>
-          </p:cNvSpPr>
-          <p:nvPr>
-            <p:ph type="dt" sz="half" idx="10"/>
-          </p:nvPr>
-        </p:nvSpPr>
-        <p:spPr>
-          <a:xfrm>
-            <a:off x="838200" y="6356350"/>
-            <a:ext cx="2743200" cy="365125"/>
-          </a:xfrm>
-        </p:spPr>
-        <p:txBody>
-          <a:bodyPr/>
-          <a:lstStyle/>
-          <a:p>
-            <a:r>
-              <a:rPr lang="en-US"/>
-              <a:t>2024</a:t>
-            </a:r>
-            <a:endParaRPr lang="en-US" dirty="0"/>
-          </a:p>
-        </p:txBody>
-      </p:sp>
-      <p:sp>
-        <p:nvSpPr>
-          <p:cNvPr id="4" name="Espace réservé du pied de page 3">
-            <a:extLst>
-              <a:ext uri="{FF2B5EF4-FFF2-40B4-BE49-F238E27FC236}">
-                <a16:creationId xmlns:a16="http://schemas.microsoft.com/office/drawing/2014/main" id="{58A13379-2586-57B0-8399-CD90631C1706}"/>
-              </a:ext>
-            </a:extLst>
-          </p:cNvPr>
-          <p:cNvSpPr>
-            <a:spLocks noGrp="1"/>
-          </p:cNvSpPr>
-          <p:nvPr>
-            <p:ph type="ftr" sz="quarter" idx="11"/>
-          </p:nvPr>
-        </p:nvSpPr>
-        <p:spPr>
-          <a:xfrm>
-            <a:off x="4038600" y="6356350"/>
-            <a:ext cx="4114800" cy="365125"/>
-          </a:xfrm>
-        </p:spPr>
-        <p:txBody>
-          <a:bodyPr/>
-          <a:lstStyle/>
-          <a:p>
-            <a:r>
-              <a:rPr lang="en-US"/>
-              <a:t>Projet classification de documents</a:t>
-            </a:r>
-            <a:endParaRPr lang="en-US" dirty="0"/>
-          </a:p>
-        </p:txBody>
-      </p:sp>
-      <p:sp>
-        <p:nvSpPr>
-          <p:cNvPr id="5" name="Espace réservé du numéro de diapositive 4">
-            <a:extLst>
-              <a:ext uri="{FF2B5EF4-FFF2-40B4-BE49-F238E27FC236}">
-                <a16:creationId xmlns:a16="http://schemas.microsoft.com/office/drawing/2014/main" id="{778E5512-AE7C-5723-792D-5C62B338570B}"/>
-              </a:ext>
-            </a:extLst>
-          </p:cNvPr>
-          <p:cNvSpPr>
-            <a:spLocks noGrp="1"/>
-          </p:cNvSpPr>
-          <p:nvPr>
-            <p:ph type="sldNum" sz="quarter" idx="12"/>
-          </p:nvPr>
-        </p:nvSpPr>
-        <p:spPr>
-          <a:xfrm>
-            <a:off x="8610600" y="6356350"/>
-            <a:ext cx="2743200" cy="365125"/>
-          </a:xfrm>
-        </p:spPr>
-        <p:txBody>
-          <a:bodyPr/>
-          <a:lstStyle/>
-          <a:p>
-            <a:fld id="{B5CEABB6-07DC-46E8-9B57-56EC44A396E5}" type="slidenum">
-              <a:rPr lang="en-US" smtClean="0"/>
-              <a:pPr/>
-              <a:t>4</a:t>
-            </a:fld>
-            <a:endParaRPr lang="en-US" dirty="0"/>
-          </a:p>
-        </p:txBody>
-      </p:sp>
-      <p:pic>
-        <p:nvPicPr>
-          <p:cNvPr id="1026" name="Picture 2">
-            <a:extLst>
-              <a:ext uri="{FF2B5EF4-FFF2-40B4-BE49-F238E27FC236}">
-                <a16:creationId xmlns:a16="http://schemas.microsoft.com/office/drawing/2014/main" id="{FB54342D-2402-D435-6C9A-7899B21DF810}"/>
-              </a:ext>
-            </a:extLst>
-          </p:cNvPr>
-          <p:cNvPicPr>
-            <a:picLocks noChangeAspect="1" noChangeArrowheads="1"/>
-          </p:cNvPicPr>
-          <p:nvPr/>
-        </p:nvPicPr>
-        <p:blipFill>
-          <a:blip r:embed="rId2">
-            <a:extLst>
-              <a:ext uri="{28A0092B-C50C-407E-A947-70E740481C1C}">
-                <a14:useLocalDpi xmlns:a14="http://schemas.microsoft.com/office/drawing/2010/main" val="0"/>
-              </a:ext>
-            </a:extLst>
-          </a:blip>
-          <a:srcRect/>
-          <a:stretch>
-            <a:fillRect/>
-          </a:stretch>
-        </p:blipFill>
-        <p:spPr bwMode="auto">
-          <a:xfrm>
-            <a:off x="3355942" y="739854"/>
-            <a:ext cx="5716289" cy="5934720"/>
-          </a:xfrm>
-          <a:prstGeom prst="rect">
-            <a:avLst/>
-          </a:prstGeom>
-          <a:noFill/>
-          <a:extLst>
-            <a:ext uri="{909E8E84-426E-40DD-AFC4-6F175D3DCCD1}">
-              <a14:hiddenFill xmlns:a14="http://schemas.microsoft.com/office/drawing/2010/main">
-                <a:solidFill>
-                  <a:srgbClr val="FFFFFF"/>
-                </a:solidFill>
-              </a14:hiddenFill>
-            </a:ext>
-          </a:extLst>
-        </p:spPr>
-      </p:pic>
-    </p:spTree>
-    <p:extLst>
-      <p:ext uri="{BB962C8B-B14F-4D97-AF65-F5344CB8AC3E}">
-        <p14:creationId xmlns:p14="http://schemas.microsoft.com/office/powerpoint/2010/main" val="979997633"/>
-      </p:ext>
-    </p:extLst>
-  </p:cSld>
-  <p:clrMapOvr>
-    <a:masterClrMapping/>
-  </p:clrMapOvr>
-</p:sld>
-</file>
-
-<file path=ppt/slides/slide5.xml><?xml version="1.0" encoding="utf-8"?>
-<p:sld xmlns:a="http://schemas.openxmlformats.org/drawingml/2006/main" xmlns:r="http://schemas.openxmlformats.org/officeDocument/2006/relationships" xmlns:p="http://schemas.openxmlformats.org/presentationml/2006/main">
-  <p:cSld>
-    <p:spTree>
-      <p:nvGrpSpPr>
-        <p:cNvPr id="1" name="">
-          <a:extLst>
-            <a:ext uri="{FF2B5EF4-FFF2-40B4-BE49-F238E27FC236}">
-              <a16:creationId xmlns:a16="http://schemas.microsoft.com/office/drawing/2014/main" id="{B89AE269-3CB1-F0DB-E007-3A7E1F60E73F}"/>
-            </a:ext>
-          </a:extLst>
-        </p:cNvPr>
-        <p:cNvGrpSpPr/>
-        <p:nvPr/>
-      </p:nvGrpSpPr>
-      <p:grpSpPr>
-        <a:xfrm>
-          <a:off x="0" y="0"/>
-          <a:ext cx="0" cy="0"/>
-          <a:chOff x="0" y="0"/>
-          <a:chExt cx="0" cy="0"/>
-        </a:xfrm>
-      </p:grpSpPr>
-      <p:sp>
-        <p:nvSpPr>
-          <p:cNvPr id="2" name="Titre 1">
-            <a:extLst>
-              <a:ext uri="{FF2B5EF4-FFF2-40B4-BE49-F238E27FC236}">
-                <a16:creationId xmlns:a16="http://schemas.microsoft.com/office/drawing/2014/main" id="{D63A54A9-10D1-7874-F1BB-F009FF6E386D}"/>
-              </a:ext>
-            </a:extLst>
-          </p:cNvPr>
-          <p:cNvSpPr>
-            <a:spLocks noGrp="1"/>
-          </p:cNvSpPr>
-          <p:nvPr>
-            <p:ph type="title"/>
-          </p:nvPr>
-        </p:nvSpPr>
-        <p:spPr>
-          <a:xfrm>
-            <a:off x="838200" y="222062"/>
-            <a:ext cx="10963274" cy="583781"/>
-          </a:xfrm>
-        </p:spPr>
-        <p:txBody>
-          <a:bodyPr/>
-          <a:lstStyle/>
-          <a:p>
-            <a:r>
-              <a:rPr lang="fr-FR" dirty="0"/>
-              <a:t>Plan de la présentation</a:t>
-            </a:r>
-            <a:endParaRPr lang="en-US" dirty="0"/>
-          </a:p>
-        </p:txBody>
-      </p:sp>
-      <p:sp>
-        <p:nvSpPr>
-          <p:cNvPr id="3" name="Espace réservé de la date 2">
-            <a:extLst>
-              <a:ext uri="{FF2B5EF4-FFF2-40B4-BE49-F238E27FC236}">
-                <a16:creationId xmlns:a16="http://schemas.microsoft.com/office/drawing/2014/main" id="{DFF8A72F-FC5B-385E-0CF0-ACF10C404048}"/>
-              </a:ext>
-            </a:extLst>
-          </p:cNvPr>
-          <p:cNvSpPr>
-            <a:spLocks noGrp="1"/>
-          </p:cNvSpPr>
-          <p:nvPr>
-            <p:ph type="dt" sz="half" idx="10"/>
-          </p:nvPr>
-        </p:nvSpPr>
-        <p:spPr>
-          <a:xfrm>
-            <a:off x="838200" y="6356350"/>
-            <a:ext cx="2743200" cy="365125"/>
-          </a:xfrm>
-        </p:spPr>
-        <p:txBody>
-          <a:bodyPr/>
-          <a:lstStyle/>
-          <a:p>
-            <a:r>
-              <a:rPr lang="en-US"/>
-              <a:t>2024</a:t>
-            </a:r>
-            <a:endParaRPr lang="en-US" dirty="0"/>
-          </a:p>
-        </p:txBody>
-      </p:sp>
-      <p:sp>
-        <p:nvSpPr>
-          <p:cNvPr id="4" name="Espace réservé du pied de page 3">
-            <a:extLst>
-              <a:ext uri="{FF2B5EF4-FFF2-40B4-BE49-F238E27FC236}">
-                <a16:creationId xmlns:a16="http://schemas.microsoft.com/office/drawing/2014/main" id="{F5B66F39-801D-885B-5D57-17B05E8667C2}"/>
-              </a:ext>
-            </a:extLst>
-          </p:cNvPr>
-          <p:cNvSpPr>
-            <a:spLocks noGrp="1"/>
-          </p:cNvSpPr>
-          <p:nvPr>
-            <p:ph type="ftr" sz="quarter" idx="11"/>
-          </p:nvPr>
-        </p:nvSpPr>
-        <p:spPr>
-          <a:xfrm>
-            <a:off x="4038600" y="6356350"/>
-            <a:ext cx="4114800" cy="365125"/>
-          </a:xfrm>
-        </p:spPr>
-        <p:txBody>
-          <a:bodyPr/>
-          <a:lstStyle/>
-          <a:p>
-            <a:r>
-              <a:rPr lang="en-US"/>
-              <a:t>Projet classification de documents</a:t>
-            </a:r>
-            <a:endParaRPr lang="en-US" dirty="0"/>
-          </a:p>
-        </p:txBody>
-      </p:sp>
-      <p:sp>
-        <p:nvSpPr>
-          <p:cNvPr id="5" name="Espace réservé du numéro de diapositive 4">
-            <a:extLst>
-              <a:ext uri="{FF2B5EF4-FFF2-40B4-BE49-F238E27FC236}">
-                <a16:creationId xmlns:a16="http://schemas.microsoft.com/office/drawing/2014/main" id="{7195292C-5DFC-50B2-C2B5-413FC09DA38E}"/>
-              </a:ext>
-            </a:extLst>
-          </p:cNvPr>
-          <p:cNvSpPr>
-            <a:spLocks noGrp="1"/>
-          </p:cNvSpPr>
-          <p:nvPr>
-            <p:ph type="sldNum" sz="quarter" idx="12"/>
-          </p:nvPr>
-        </p:nvSpPr>
-        <p:spPr>
-          <a:xfrm>
-            <a:off x="8610600" y="6356350"/>
-            <a:ext cx="2743200" cy="365125"/>
-          </a:xfrm>
-        </p:spPr>
-        <p:txBody>
-          <a:bodyPr/>
-          <a:lstStyle/>
-          <a:p>
-            <a:fld id="{B5CEABB6-07DC-46E8-9B57-56EC44A396E5}" type="slidenum">
-              <a:rPr lang="en-US" smtClean="0"/>
-              <a:pPr/>
-              <a:t>5</a:t>
-            </a:fld>
-            <a:endParaRPr lang="en-US" dirty="0"/>
-          </a:p>
-        </p:txBody>
-      </p:sp>
-      <p:sp>
-        <p:nvSpPr>
-          <p:cNvPr id="6" name="Espace réservé du contenu 5">
-            <a:extLst>
-              <a:ext uri="{FF2B5EF4-FFF2-40B4-BE49-F238E27FC236}">
-                <a16:creationId xmlns:a16="http://schemas.microsoft.com/office/drawing/2014/main" id="{2C63056B-A839-1CF6-2D0A-C4EA9B518EA6}"/>
-              </a:ext>
-            </a:extLst>
-          </p:cNvPr>
-          <p:cNvSpPr>
-            <a:spLocks noGrp="1"/>
-          </p:cNvSpPr>
-          <p:nvPr>
-            <p:ph sz="quarter" idx="16"/>
-          </p:nvPr>
-        </p:nvSpPr>
-        <p:spPr>
-          <a:xfrm>
-            <a:off x="838200" y="1198563"/>
-            <a:ext cx="11353800" cy="5315360"/>
-          </a:xfrm>
-        </p:spPr>
-        <p:txBody>
-          <a:bodyPr/>
-          <a:lstStyle/>
-          <a:p>
-            <a:r>
-              <a:rPr lang="fr-FR" sz="2400" dirty="0"/>
-              <a:t>Training</a:t>
-            </a:r>
-          </a:p>
-          <a:p>
-            <a:pPr lvl="1"/>
-            <a:r>
-              <a:rPr lang="fr-FR" dirty="0"/>
-              <a:t>Pipeline Training</a:t>
-            </a:r>
-          </a:p>
-          <a:p>
-            <a:pPr lvl="1"/>
-            <a:r>
-              <a:rPr lang="fr-FR" dirty="0"/>
-              <a:t>Monitoring</a:t>
-            </a:r>
-          </a:p>
-          <a:p>
-            <a:r>
-              <a:rPr lang="fr-FR" sz="2400" dirty="0"/>
-              <a:t>Prédiction</a:t>
-            </a:r>
-          </a:p>
-          <a:p>
-            <a:pPr lvl="1"/>
-            <a:r>
-              <a:rPr lang="fr-FR" dirty="0"/>
-              <a:t>Pipeline </a:t>
-            </a:r>
-            <a:r>
-              <a:rPr lang="fr-FR" dirty="0" err="1"/>
-              <a:t>Predict</a:t>
-            </a:r>
-            <a:endParaRPr lang="fr-FR" dirty="0"/>
-          </a:p>
-          <a:p>
-            <a:pPr lvl="1"/>
-            <a:r>
-              <a:rPr lang="fr-FR" dirty="0"/>
-              <a:t>Interface User pour les prédictions</a:t>
-            </a:r>
-          </a:p>
-          <a:p>
-            <a:pPr lvl="1"/>
-            <a:r>
-              <a:rPr lang="fr-FR" dirty="0"/>
-              <a:t>Gestion du feedback utilisateur</a:t>
-            </a:r>
-          </a:p>
-          <a:p>
-            <a:r>
-              <a:rPr lang="fr-FR" sz="2400" dirty="0"/>
-              <a:t>Déploiement </a:t>
-            </a:r>
-            <a:r>
-              <a:rPr lang="fr-FR" sz="2400" dirty="0" err="1"/>
-              <a:t>MLOps</a:t>
-            </a:r>
-            <a:endParaRPr lang="fr-FR" sz="2400" dirty="0"/>
-          </a:p>
-          <a:p>
-            <a:pPr lvl="1"/>
-            <a:r>
-              <a:rPr lang="fr-FR" dirty="0"/>
-              <a:t>CI : Jenkins</a:t>
-            </a:r>
-          </a:p>
-          <a:p>
-            <a:pPr lvl="1"/>
-            <a:r>
-              <a:rPr lang="fr-FR" dirty="0"/>
-              <a:t>CD : </a:t>
-            </a:r>
-            <a:r>
-              <a:rPr lang="fr-FR" dirty="0" err="1"/>
-              <a:t>Argo</a:t>
-            </a:r>
-            <a:endParaRPr lang="fr-FR" dirty="0"/>
-          </a:p>
-          <a:p>
-            <a:pPr lvl="1"/>
-            <a:r>
-              <a:rPr lang="fr-FR" dirty="0"/>
-              <a:t>Déploiement des dockers sur </a:t>
-            </a:r>
-            <a:r>
-              <a:rPr lang="fr-FR" dirty="0" err="1"/>
-              <a:t>Kubernetes</a:t>
-            </a:r>
-            <a:endParaRPr lang="fr-FR" dirty="0"/>
-          </a:p>
-          <a:p>
-            <a:pPr lvl="1"/>
-            <a:r>
-              <a:rPr lang="fr-FR" dirty="0"/>
-              <a:t>API Gateway</a:t>
-            </a:r>
-          </a:p>
-          <a:p>
-            <a:pPr lvl="1"/>
-            <a:r>
-              <a:rPr lang="fr-FR" dirty="0"/>
-              <a:t>Sécurisation de l’architecture</a:t>
-            </a:r>
-          </a:p>
-        </p:txBody>
-      </p:sp>
-    </p:spTree>
-    <p:extLst>
-      <p:ext uri="{BB962C8B-B14F-4D97-AF65-F5344CB8AC3E}">
-        <p14:creationId xmlns:p14="http://schemas.microsoft.com/office/powerpoint/2010/main" val="4229699463"/>
-      </p:ext>
-    </p:extLst>
-  </p:cSld>
-  <p:clrMapOvr>
-    <a:masterClrMapping/>
-  </p:clrMapOvr>
 </p:sld>
 </file>
 
@@ -19012,6 +19049,26 @@
 </file>
 
 <file path=customXml/item1.xml><?xml version="1.0" encoding="utf-8"?>
+<p:properties xmlns:p="http://schemas.microsoft.com/office/2006/metadata/properties" xmlns:xsi="http://www.w3.org/2001/XMLSchema-instance" xmlns:pc="http://schemas.microsoft.com/office/infopath/2007/PartnerControls">
+  <documentManagement>
+    <_ip_UnifiedCompliancePolicyUIAction xmlns="http://schemas.microsoft.com/sharepoint/v3" xsi:nil="true"/>
+    <Image xmlns="71af3243-3dd4-4a8d-8c0d-dd76da1f02a5">
+      <Url xsi:nil="true"/>
+      <Description xsi:nil="true"/>
+    </Image>
+    <Status xmlns="71af3243-3dd4-4a8d-8c0d-dd76da1f02a5">Not started</Status>
+    <Background xmlns="71af3243-3dd4-4a8d-8c0d-dd76da1f02a5">false</Background>
+    <_ip_UnifiedCompliancePolicyProperties xmlns="http://schemas.microsoft.com/sharepoint/v3" xsi:nil="true"/>
+    <ImageTagsTaxHTField xmlns="71af3243-3dd4-4a8d-8c0d-dd76da1f02a5">
+      <Terms xmlns="http://schemas.microsoft.com/office/infopath/2007/PartnerControls"/>
+    </ImageTagsTaxHTField>
+    <TaxCatchAll xmlns="230e9df3-be65-4c73-a93b-d1236ebd677e" xsi:nil="true"/>
+    <MediaServiceKeyPoints xmlns="71af3243-3dd4-4a8d-8c0d-dd76da1f02a5" xsi:nil="true"/>
+  </documentManagement>
+</p:properties>
+</file>
+
+<file path=customXml/item2.xml><?xml version="1.0" encoding="utf-8"?>
 <?mso-contentType ?>
 <FormTemplates xmlns="http://schemas.microsoft.com/sharepoint/v3/contenttype/forms">
   <Display>DocumentLibraryForm</Display>
@@ -19020,7 +19077,7 @@
 </FormTemplates>
 </file>
 
-<file path=customXml/item2.xml><?xml version="1.0" encoding="utf-8"?>
+<file path=customXml/item3.xml><?xml version="1.0" encoding="utf-8"?>
 <ct:contentTypeSchema xmlns:ct="http://schemas.microsoft.com/office/2006/metadata/contentType" xmlns:ma="http://schemas.microsoft.com/office/2006/metadata/properties/metaAttributes" ct:_="" ma:_="" ma:contentTypeName="Document" ma:contentTypeID="0x01010079F111ED35F8CC479449609E8A0923A6" ma:contentTypeVersion="27" ma:contentTypeDescription="Create a new document." ma:contentTypeScope="" ma:versionID="c6f9a84f66a9c8b9a21755b9ffafb945">
   <xsd:schema xmlns:xsd="http://www.w3.org/2001/XMLSchema" xmlns:xs="http://www.w3.org/2001/XMLSchema" xmlns:p="http://schemas.microsoft.com/office/2006/metadata/properties" xmlns:ns1="http://schemas.microsoft.com/sharepoint/v3" xmlns:ns2="71af3243-3dd4-4a8d-8c0d-dd76da1f02a5" xmlns:ns3="16c05727-aa75-4e4a-9b5f-8a80a1165891" xmlns:ns4="230e9df3-be65-4c73-a93b-d1236ebd677e" targetNamespace="http://schemas.microsoft.com/office/2006/metadata/properties" ma:root="true" ma:fieldsID="27df39e3e7036dff54f89ddd5805ce72" ns1:_="" ns2:_="" ns3:_="" ns4:_="">
     <xsd:import namespace="http://schemas.microsoft.com/sharepoint/v3"/>
@@ -19326,27 +19383,19 @@
 </ct:contentTypeSchema>
 </file>
 
-<file path=customXml/item3.xml><?xml version="1.0" encoding="utf-8"?>
-<p:properties xmlns:p="http://schemas.microsoft.com/office/2006/metadata/properties" xmlns:xsi="http://www.w3.org/2001/XMLSchema-instance" xmlns:pc="http://schemas.microsoft.com/office/infopath/2007/PartnerControls">
-  <documentManagement>
-    <_ip_UnifiedCompliancePolicyUIAction xmlns="http://schemas.microsoft.com/sharepoint/v3" xsi:nil="true"/>
-    <Image xmlns="71af3243-3dd4-4a8d-8c0d-dd76da1f02a5">
-      <Url xsi:nil="true"/>
-      <Description xsi:nil="true"/>
-    </Image>
-    <Status xmlns="71af3243-3dd4-4a8d-8c0d-dd76da1f02a5">Not started</Status>
-    <Background xmlns="71af3243-3dd4-4a8d-8c0d-dd76da1f02a5">false</Background>
-    <_ip_UnifiedCompliancePolicyProperties xmlns="http://schemas.microsoft.com/sharepoint/v3" xsi:nil="true"/>
-    <ImageTagsTaxHTField xmlns="71af3243-3dd4-4a8d-8c0d-dd76da1f02a5">
-      <Terms xmlns="http://schemas.microsoft.com/office/infopath/2007/PartnerControls"/>
-    </ImageTagsTaxHTField>
-    <TaxCatchAll xmlns="230e9df3-be65-4c73-a93b-d1236ebd677e" xsi:nil="true"/>
-    <MediaServiceKeyPoints xmlns="71af3243-3dd4-4a8d-8c0d-dd76da1f02a5" xsi:nil="true"/>
-  </documentManagement>
-</p:properties>
+<file path=customXml/itemProps1.xml><?xml version="1.0" encoding="utf-8"?>
+<ds:datastoreItem xmlns:ds="http://schemas.openxmlformats.org/officeDocument/2006/customXml" ds:itemID="{6EA97235-BEC4-4F82-87A8-2F5DAD53B5F9}">
+  <ds:schemaRefs>
+    <ds:schemaRef ds:uri="http://schemas.microsoft.com/office/2006/metadata/properties"/>
+    <ds:schemaRef ds:uri="http://schemas.microsoft.com/office/infopath/2007/PartnerControls"/>
+    <ds:schemaRef ds:uri="http://schemas.microsoft.com/sharepoint/v3"/>
+    <ds:schemaRef ds:uri="71af3243-3dd4-4a8d-8c0d-dd76da1f02a5"/>
+    <ds:schemaRef ds:uri="230e9df3-be65-4c73-a93b-d1236ebd677e"/>
+  </ds:schemaRefs>
+</ds:datastoreItem>
 </file>
 
-<file path=customXml/itemProps1.xml><?xml version="1.0" encoding="utf-8"?>
+<file path=customXml/itemProps2.xml><?xml version="1.0" encoding="utf-8"?>
 <ds:datastoreItem xmlns:ds="http://schemas.openxmlformats.org/officeDocument/2006/customXml" ds:itemID="{79BF405E-7930-4D5C-ABB3-493E9D6D6CEA}">
   <ds:schemaRefs>
     <ds:schemaRef ds:uri="http://schemas.microsoft.com/sharepoint/v3/contenttype/forms"/>
@@ -19354,7 +19403,7 @@
 </ds:datastoreItem>
 </file>
 
-<file path=customXml/itemProps2.xml><?xml version="1.0" encoding="utf-8"?>
+<file path=customXml/itemProps3.xml><?xml version="1.0" encoding="utf-8"?>
 <ds:datastoreItem xmlns:ds="http://schemas.openxmlformats.org/officeDocument/2006/customXml" ds:itemID="{2C1F447F-FAA8-4106-988B-648F3C8EDB2D}">
   <ds:schemaRefs>
     <ds:schemaRef ds:uri="http://schemas.microsoft.com/office/2006/metadata/contentType"/>
@@ -19375,18 +19424,6 @@
 </ds:datastoreItem>
 </file>
 
-<file path=customXml/itemProps3.xml><?xml version="1.0" encoding="utf-8"?>
-<ds:datastoreItem xmlns:ds="http://schemas.openxmlformats.org/officeDocument/2006/customXml" ds:itemID="{6EA97235-BEC4-4F82-87A8-2F5DAD53B5F9}">
-  <ds:schemaRefs>
-    <ds:schemaRef ds:uri="http://schemas.microsoft.com/office/2006/metadata/properties"/>
-    <ds:schemaRef ds:uri="http://schemas.microsoft.com/office/infopath/2007/PartnerControls"/>
-    <ds:schemaRef ds:uri="http://schemas.microsoft.com/sharepoint/v3"/>
-    <ds:schemaRef ds:uri="71af3243-3dd4-4a8d-8c0d-dd76da1f02a5"/>
-    <ds:schemaRef ds:uri="230e9df3-be65-4c73-a93b-d1236ebd677e"/>
-  </ds:schemaRefs>
-</ds:datastoreItem>
-</file>
-
 <file path=docMetadata/LabelInfo.xml><?xml version="1.0" encoding="utf-8"?>
 <clbl:labelList xmlns:clbl="http://schemas.microsoft.com/office/2020/mipLabelMetadata"/>
 </file>
</xml_diff>

<commit_message>
maj n°3 suite à remarques seb
</commit_message>
<xml_diff>
--- a/report/Projet_classification_MLOps_Partie1_Eddie.pptx
+++ b/report/Projet_classification_MLOps_Partie1_Eddie.pptx
@@ -16834,7 +16834,7 @@
           <a:lstStyle/>
           <a:p>
             <a:r>
-              <a:rPr lang="fr-FR" dirty="0"/>
+              <a:rPr lang="fr-FR" b="1" dirty="0"/>
               <a:t>Introduction &amp; Démo</a:t>
             </a:r>
           </a:p>
@@ -16851,13 +16851,6 @@
             </a:r>
           </a:p>
           <a:p>
-            <a:pPr lvl="1"/>
-            <a:r>
-              <a:rPr lang="fr-FR" dirty="0"/>
-              <a:t>Ajouter un slide sur le versioning des données et des modèles</a:t>
-            </a:r>
-          </a:p>
-          <a:p>
             <a:r>
               <a:rPr lang="fr-FR" dirty="0"/>
               <a:t>Pipeline Prédiction &amp; Feedback User</a:t>
@@ -16871,29 +16864,6 @@
             <a:r>
               <a:rPr lang="fr-FR" dirty="0" err="1"/>
               <a:t>MLOps</a:t>
-            </a:r>
-            <a:r>
-              <a:rPr lang="fr-FR" dirty="0"/>
-              <a:t> (CI/CD, </a:t>
-            </a:r>
-            <a:r>
-              <a:rPr lang="fr-FR" dirty="0" err="1"/>
-              <a:t>Kubernetes</a:t>
-            </a:r>
-            <a:r>
-              <a:rPr lang="fr-FR" dirty="0"/>
-              <a:t>, Sécurisation)</a:t>
-            </a:r>
-          </a:p>
-          <a:p>
-            <a:pPr lvl="1"/>
-            <a:r>
-              <a:rPr lang="fr-FR" dirty="0"/>
-              <a:t>Ajouter un slide sur le versioning entre Repo Code et Repo </a:t>
-            </a:r>
-            <a:r>
-              <a:rPr lang="fr-FR" dirty="0" err="1"/>
-              <a:t>Deploiement</a:t>
             </a:r>
             <a:endParaRPr lang="fr-FR" dirty="0"/>
           </a:p>
@@ -17272,6 +17242,159 @@
           <a:chExt cx="0" cy="0"/>
         </a:xfrm>
       </p:grpSpPr>
+      <p:grpSp>
+        <p:nvGrpSpPr>
+          <p:cNvPr id="18" name="Groupe 17">
+            <a:extLst>
+              <a:ext uri="{FF2B5EF4-FFF2-40B4-BE49-F238E27FC236}">
+                <a16:creationId xmlns:a16="http://schemas.microsoft.com/office/drawing/2014/main" id="{E50DFD68-59D0-31A2-E5E9-E857317F06F7}"/>
+              </a:ext>
+            </a:extLst>
+          </p:cNvPr>
+          <p:cNvGrpSpPr/>
+          <p:nvPr/>
+        </p:nvGrpSpPr>
+        <p:grpSpPr>
+          <a:xfrm>
+            <a:off x="284806" y="2312453"/>
+            <a:ext cx="2540637" cy="1005387"/>
+            <a:chOff x="2408561" y="1070940"/>
+            <a:chExt cx="2540637" cy="1005387"/>
+          </a:xfrm>
+        </p:grpSpPr>
+        <p:grpSp>
+          <p:nvGrpSpPr>
+            <p:cNvPr id="7" name="Groupe 6">
+              <a:extLst>
+                <a:ext uri="{FF2B5EF4-FFF2-40B4-BE49-F238E27FC236}">
+                  <a16:creationId xmlns:a16="http://schemas.microsoft.com/office/drawing/2014/main" id="{96C13041-AA0E-9139-65C2-2F20376C49C3}"/>
+                </a:ext>
+              </a:extLst>
+            </p:cNvPr>
+            <p:cNvGrpSpPr/>
+            <p:nvPr/>
+          </p:nvGrpSpPr>
+          <p:grpSpPr>
+            <a:xfrm>
+              <a:off x="2408561" y="1070940"/>
+              <a:ext cx="2540637" cy="1005387"/>
+              <a:chOff x="1812307" y="2955391"/>
+              <a:chExt cx="2540637" cy="1005387"/>
+            </a:xfrm>
+          </p:grpSpPr>
+          <p:sp>
+            <p:nvSpPr>
+              <p:cNvPr id="8" name="ZoneTexte 7">
+                <a:extLst>
+                  <a:ext uri="{FF2B5EF4-FFF2-40B4-BE49-F238E27FC236}">
+                    <a16:creationId xmlns:a16="http://schemas.microsoft.com/office/drawing/2014/main" id="{B98243F3-6C91-ECDD-E52E-BAA762DB288B}"/>
+                  </a:ext>
+                </a:extLst>
+              </p:cNvPr>
+              <p:cNvSpPr txBox="1"/>
+              <p:nvPr/>
+            </p:nvSpPr>
+            <p:spPr>
+              <a:xfrm>
+                <a:off x="1812307" y="2955391"/>
+                <a:ext cx="2540637" cy="1005387"/>
+              </a:xfrm>
+              <a:prstGeom prst="rect">
+                <a:avLst/>
+              </a:prstGeom>
+              <a:ln w="41275" cap="rnd">
+                <a:round/>
+              </a:ln>
+            </p:spPr>
+            <p:style>
+              <a:lnRef idx="2">
+                <a:schemeClr val="accent5"/>
+              </a:lnRef>
+              <a:fillRef idx="1">
+                <a:schemeClr val="lt1"/>
+              </a:fillRef>
+              <a:effectRef idx="0">
+                <a:schemeClr val="accent5"/>
+              </a:effectRef>
+              <a:fontRef idx="minor">
+                <a:schemeClr val="dk1"/>
+              </a:fontRef>
+            </p:style>
+            <p:txBody>
+              <a:bodyPr wrap="square" rtlCol="0">
+                <a:noAutofit/>
+              </a:bodyPr>
+              <a:lstStyle/>
+              <a:p>
+                <a:pPr algn="ctr"/>
+                <a:r>
+                  <a:rPr lang="fr-FR" b="1" dirty="0"/>
+                  <a:t>USER-frontend</a:t>
+                </a:r>
+              </a:p>
+            </p:txBody>
+          </p:sp>
+          <p:pic>
+            <p:nvPicPr>
+              <p:cNvPr id="9" name="Image 8" descr="Une image contenant symbole, Graphique, clipart, conception&#10;&#10;Le contenu généré par l’IA peut être incorrect.">
+                <a:extLst>
+                  <a:ext uri="{FF2B5EF4-FFF2-40B4-BE49-F238E27FC236}">
+                    <a16:creationId xmlns:a16="http://schemas.microsoft.com/office/drawing/2014/main" id="{192F4A25-0535-7D82-F538-4AAA81234E97}"/>
+                  </a:ext>
+                </a:extLst>
+              </p:cNvPr>
+              <p:cNvPicPr>
+                <a:picLocks noChangeAspect="1"/>
+              </p:cNvPicPr>
+              <p:nvPr/>
+            </p:nvPicPr>
+            <p:blipFill>
+              <a:blip r:embed="rId2"/>
+              <a:stretch>
+                <a:fillRect/>
+              </a:stretch>
+            </p:blipFill>
+            <p:spPr>
+              <a:xfrm>
+                <a:off x="3903948" y="3557950"/>
+                <a:ext cx="396649" cy="396649"/>
+              </a:xfrm>
+              <a:prstGeom prst="rect">
+                <a:avLst/>
+              </a:prstGeom>
+            </p:spPr>
+          </p:pic>
+        </p:grpSp>
+        <p:pic>
+          <p:nvPicPr>
+            <p:cNvPr id="17" name="Image 16" descr="Une image contenant logo, Graphique, Police, graphisme&#10;&#10;Le contenu généré par l’IA peut être incorrect.">
+              <a:extLst>
+                <a:ext uri="{FF2B5EF4-FFF2-40B4-BE49-F238E27FC236}">
+                  <a16:creationId xmlns:a16="http://schemas.microsoft.com/office/drawing/2014/main" id="{88EFC1C3-B91F-46A3-3D58-227CE2CD0BE8}"/>
+                </a:ext>
+              </a:extLst>
+            </p:cNvPr>
+            <p:cNvPicPr>
+              <a:picLocks noChangeAspect="1"/>
+            </p:cNvPicPr>
+            <p:nvPr/>
+          </p:nvPicPr>
+          <p:blipFill>
+            <a:blip r:embed="rId3"/>
+            <a:srcRect l="3961" t="27473" r="4988" b="25711"/>
+            <a:stretch/>
+          </p:blipFill>
+          <p:spPr>
+            <a:xfrm>
+              <a:off x="3075978" y="1446423"/>
+              <a:ext cx="1059269" cy="542227"/>
+            </a:xfrm>
+            <a:prstGeom prst="rect">
+              <a:avLst/>
+            </a:prstGeom>
+          </p:spPr>
+        </p:pic>
+      </p:grpSp>
       <p:sp>
         <p:nvSpPr>
           <p:cNvPr id="2" name="Titre 1">
@@ -17300,7 +17423,11 @@
           <a:p>
             <a:r>
               <a:rPr lang="fr-FR" dirty="0"/>
-              <a:t>Vue d’ensemble du projet</a:t>
+              <a:t>Vue d’ensemble du projet Classification </a:t>
+            </a:r>
+            <a:r>
+              <a:rPr lang="fr-FR" dirty="0" err="1"/>
+              <a:t>MLOps</a:t>
             </a:r>
             <a:endParaRPr lang="en-US" dirty="0"/>
           </a:p>
@@ -17367,10 +17494,13 @@
           <a:lstStyle/>
           <a:p>
             <a:r>
-              <a:rPr lang="en-US"/>
-              <a:t>Projet classification de documents</a:t>
-            </a:r>
-            <a:endParaRPr lang="en-US" dirty="0"/>
+              <a:rPr lang="en-US" dirty="0" err="1"/>
+              <a:t>Projet</a:t>
+            </a:r>
+            <a:r>
+              <a:rPr lang="en-US" dirty="0"/>
+              <a:t> classification de documents</a:t>
+            </a:r>
           </a:p>
         </p:txBody>
       </p:sp>
@@ -17409,100 +17539,2840 @@
           </a:p>
         </p:txBody>
       </p:sp>
+      <p:grpSp>
+        <p:nvGrpSpPr>
+          <p:cNvPr id="13" name="Groupe 12">
+            <a:extLst>
+              <a:ext uri="{FF2B5EF4-FFF2-40B4-BE49-F238E27FC236}">
+                <a16:creationId xmlns:a16="http://schemas.microsoft.com/office/drawing/2014/main" id="{FD59CA47-306D-34B0-F35C-13A8D0DF5030}"/>
+              </a:ext>
+            </a:extLst>
+          </p:cNvPr>
+          <p:cNvGrpSpPr/>
+          <p:nvPr/>
+        </p:nvGrpSpPr>
+        <p:grpSpPr>
+          <a:xfrm>
+            <a:off x="4097721" y="5452021"/>
+            <a:ext cx="1310102" cy="960591"/>
+            <a:chOff x="8106314" y="3786269"/>
+            <a:chExt cx="1646040" cy="1166981"/>
+          </a:xfrm>
+        </p:grpSpPr>
+        <p:sp>
+          <p:nvSpPr>
+            <p:cNvPr id="14" name="ZoneTexte 13">
+              <a:extLst>
+                <a:ext uri="{FF2B5EF4-FFF2-40B4-BE49-F238E27FC236}">
+                  <a16:creationId xmlns:a16="http://schemas.microsoft.com/office/drawing/2014/main" id="{1B01489A-1BC7-4EAF-91D6-DAA5B028E077}"/>
+                </a:ext>
+              </a:extLst>
+            </p:cNvPr>
+            <p:cNvSpPr txBox="1"/>
+            <p:nvPr/>
+          </p:nvSpPr>
+          <p:spPr>
+            <a:xfrm>
+              <a:off x="8106314" y="3786269"/>
+              <a:ext cx="1646040" cy="373905"/>
+            </a:xfrm>
+            <a:prstGeom prst="rect">
+              <a:avLst/>
+            </a:prstGeom>
+            <a:noFill/>
+          </p:spPr>
+          <p:txBody>
+            <a:bodyPr wrap="none" rtlCol="0">
+              <a:spAutoFit/>
+            </a:bodyPr>
+            <a:lstStyle/>
+            <a:p>
+              <a:r>
+                <a:rPr lang="fr-FR" sz="1400" dirty="0">
+                  <a:solidFill>
+                    <a:schemeClr val="accent2">
+                      <a:lumMod val="75000"/>
+                    </a:schemeClr>
+                  </a:solidFill>
+                </a:rPr>
+                <a:t>User Feedback</a:t>
+              </a:r>
+            </a:p>
+          </p:txBody>
+        </p:sp>
+        <p:pic>
+          <p:nvPicPr>
+            <p:cNvPr id="15" name="Image 14" descr="Une image contenant Graphique, conception&#10;&#10;Le contenu généré par l’IA peut être incorrect.">
+              <a:extLst>
+                <a:ext uri="{FF2B5EF4-FFF2-40B4-BE49-F238E27FC236}">
+                  <a16:creationId xmlns:a16="http://schemas.microsoft.com/office/drawing/2014/main" id="{045C7726-A3F8-1A3D-5836-485FA3544833}"/>
+                </a:ext>
+              </a:extLst>
+            </p:cNvPr>
+            <p:cNvPicPr>
+              <a:picLocks noChangeAspect="1"/>
+            </p:cNvPicPr>
+            <p:nvPr/>
+          </p:nvPicPr>
+          <p:blipFill>
+            <a:blip r:embed="rId4"/>
+            <a:srcRect l="11406" t="1461" r="10410" b="5393"/>
+            <a:stretch/>
+          </p:blipFill>
+          <p:spPr>
+            <a:xfrm>
+              <a:off x="8474329" y="4140127"/>
+              <a:ext cx="910012" cy="813123"/>
+            </a:xfrm>
+            <a:prstGeom prst="rect">
+              <a:avLst/>
+            </a:prstGeom>
+          </p:spPr>
+        </p:pic>
+      </p:grpSp>
+      <p:sp>
+        <p:nvSpPr>
+          <p:cNvPr id="16" name="Flèche : bas 15">
+            <a:extLst>
+              <a:ext uri="{FF2B5EF4-FFF2-40B4-BE49-F238E27FC236}">
+                <a16:creationId xmlns:a16="http://schemas.microsoft.com/office/drawing/2014/main" id="{EBDF1E89-88FB-D142-4161-FE1968C50C94}"/>
+              </a:ext>
+            </a:extLst>
+          </p:cNvPr>
+          <p:cNvSpPr/>
+          <p:nvPr/>
+        </p:nvSpPr>
+        <p:spPr>
+          <a:xfrm rot="16200000">
+            <a:off x="3523773" y="5279825"/>
+            <a:ext cx="246544" cy="1487170"/>
+          </a:xfrm>
+          <a:prstGeom prst="downArrow">
+            <a:avLst/>
+          </a:prstGeom>
+          <a:solidFill>
+            <a:schemeClr val="accent2">
+              <a:lumMod val="60000"/>
+              <a:lumOff val="40000"/>
+            </a:schemeClr>
+          </a:solidFill>
+          <a:ln>
+            <a:solidFill>
+              <a:schemeClr val="tx1"/>
+            </a:solidFill>
+          </a:ln>
+        </p:spPr>
+        <p:style>
+          <a:lnRef idx="2">
+            <a:schemeClr val="accent1">
+              <a:shade val="15000"/>
+            </a:schemeClr>
+          </a:lnRef>
+          <a:fillRef idx="1">
+            <a:schemeClr val="accent1"/>
+          </a:fillRef>
+          <a:effectRef idx="0">
+            <a:schemeClr val="accent1"/>
+          </a:effectRef>
+          <a:fontRef idx="minor">
+            <a:schemeClr val="lt1"/>
+          </a:fontRef>
+        </p:style>
+        <p:txBody>
+          <a:bodyPr rtlCol="0" anchor="ctr"/>
+          <a:lstStyle/>
+          <a:p>
+            <a:endParaRPr lang="fr-FR" dirty="0"/>
+          </a:p>
+        </p:txBody>
+      </p:sp>
+      <p:grpSp>
+        <p:nvGrpSpPr>
+          <p:cNvPr id="25" name="Groupe 24">
+            <a:extLst>
+              <a:ext uri="{FF2B5EF4-FFF2-40B4-BE49-F238E27FC236}">
+                <a16:creationId xmlns:a16="http://schemas.microsoft.com/office/drawing/2014/main" id="{57B3AD34-1824-54ED-6ABD-C63C478D9E1A}"/>
+              </a:ext>
+            </a:extLst>
+          </p:cNvPr>
+          <p:cNvGrpSpPr/>
+          <p:nvPr/>
+        </p:nvGrpSpPr>
+        <p:grpSpPr>
+          <a:xfrm>
+            <a:off x="7737253" y="3913130"/>
+            <a:ext cx="4158094" cy="2555121"/>
+            <a:chOff x="3105455" y="447175"/>
+            <a:chExt cx="4067028" cy="2555121"/>
+          </a:xfrm>
+        </p:grpSpPr>
+        <p:sp>
+          <p:nvSpPr>
+            <p:cNvPr id="26" name="ZoneTexte 25">
+              <a:extLst>
+                <a:ext uri="{FF2B5EF4-FFF2-40B4-BE49-F238E27FC236}">
+                  <a16:creationId xmlns:a16="http://schemas.microsoft.com/office/drawing/2014/main" id="{CD49B0C8-B65A-0A9D-290B-B6F799103131}"/>
+                </a:ext>
+              </a:extLst>
+            </p:cNvPr>
+            <p:cNvSpPr txBox="1"/>
+            <p:nvPr/>
+          </p:nvSpPr>
+          <p:spPr>
+            <a:xfrm>
+              <a:off x="3105455" y="447175"/>
+              <a:ext cx="4067028" cy="2555121"/>
+            </a:xfrm>
+            <a:prstGeom prst="rect">
+              <a:avLst/>
+            </a:prstGeom>
+            <a:ln w="41275" cap="rnd">
+              <a:round/>
+            </a:ln>
+          </p:spPr>
+          <p:style>
+            <a:lnRef idx="2">
+              <a:schemeClr val="accent5"/>
+            </a:lnRef>
+            <a:fillRef idx="1">
+              <a:schemeClr val="lt1"/>
+            </a:fillRef>
+            <a:effectRef idx="0">
+              <a:schemeClr val="accent5"/>
+            </a:effectRef>
+            <a:fontRef idx="minor">
+              <a:schemeClr val="dk1"/>
+            </a:fontRef>
+          </p:style>
+          <p:txBody>
+            <a:bodyPr wrap="square" rtlCol="0">
+              <a:noAutofit/>
+            </a:bodyPr>
+            <a:lstStyle/>
+            <a:p>
+              <a:pPr algn="ctr"/>
+              <a:r>
+                <a:rPr lang="fr-FR" b="1" dirty="0"/>
+                <a:t>TRAINING-Admin-Backend</a:t>
+              </a:r>
+            </a:p>
+          </p:txBody>
+        </p:sp>
+        <p:pic>
+          <p:nvPicPr>
+            <p:cNvPr id="27" name="Image 26" descr="Une image contenant symbole, Graphique, clipart, conception&#10;&#10;Le contenu généré par l’IA peut être incorrect.">
+              <a:extLst>
+                <a:ext uri="{FF2B5EF4-FFF2-40B4-BE49-F238E27FC236}">
+                  <a16:creationId xmlns:a16="http://schemas.microsoft.com/office/drawing/2014/main" id="{D0820919-0F2A-07FB-BFE8-8ECC4D31D4F0}"/>
+                </a:ext>
+              </a:extLst>
+            </p:cNvPr>
+            <p:cNvPicPr>
+              <a:picLocks noChangeAspect="1"/>
+            </p:cNvPicPr>
+            <p:nvPr/>
+          </p:nvPicPr>
+          <p:blipFill>
+            <a:blip r:embed="rId2"/>
+            <a:stretch>
+              <a:fillRect/>
+            </a:stretch>
+          </p:blipFill>
+          <p:spPr>
+            <a:xfrm>
+              <a:off x="6740974" y="2536471"/>
+              <a:ext cx="396649" cy="396649"/>
+            </a:xfrm>
+            <a:prstGeom prst="rect">
+              <a:avLst/>
+            </a:prstGeom>
+          </p:spPr>
+        </p:pic>
+      </p:grpSp>
+      <p:grpSp>
+        <p:nvGrpSpPr>
+          <p:cNvPr id="28" name="Groupe 27">
+            <a:extLst>
+              <a:ext uri="{FF2B5EF4-FFF2-40B4-BE49-F238E27FC236}">
+                <a16:creationId xmlns:a16="http://schemas.microsoft.com/office/drawing/2014/main" id="{613960A7-9EBE-F5AE-CC74-2DF8579A0560}"/>
+              </a:ext>
+            </a:extLst>
+          </p:cNvPr>
+          <p:cNvGrpSpPr/>
+          <p:nvPr/>
+        </p:nvGrpSpPr>
+        <p:grpSpPr>
+          <a:xfrm>
+            <a:off x="7780546" y="2380193"/>
+            <a:ext cx="4114800" cy="1013870"/>
+            <a:chOff x="2731654" y="2135928"/>
+            <a:chExt cx="4114800" cy="1013870"/>
+          </a:xfrm>
+        </p:grpSpPr>
+        <p:grpSp>
+          <p:nvGrpSpPr>
+            <p:cNvPr id="29" name="Groupe 28">
+              <a:extLst>
+                <a:ext uri="{FF2B5EF4-FFF2-40B4-BE49-F238E27FC236}">
+                  <a16:creationId xmlns:a16="http://schemas.microsoft.com/office/drawing/2014/main" id="{76D3596F-A65B-BF35-0237-F20D7D85754B}"/>
+                </a:ext>
+              </a:extLst>
+            </p:cNvPr>
+            <p:cNvGrpSpPr/>
+            <p:nvPr/>
+          </p:nvGrpSpPr>
+          <p:grpSpPr>
+            <a:xfrm>
+              <a:off x="2731654" y="2135928"/>
+              <a:ext cx="4114800" cy="1013870"/>
+              <a:chOff x="3117818" y="1697484"/>
+              <a:chExt cx="4024682" cy="1013870"/>
+            </a:xfrm>
+          </p:grpSpPr>
+          <p:sp>
+            <p:nvSpPr>
+              <p:cNvPr id="31" name="ZoneTexte 30">
+                <a:extLst>
+                  <a:ext uri="{FF2B5EF4-FFF2-40B4-BE49-F238E27FC236}">
+                    <a16:creationId xmlns:a16="http://schemas.microsoft.com/office/drawing/2014/main" id="{C1E4258D-508B-B087-C98B-9B231D393B05}"/>
+                  </a:ext>
+                </a:extLst>
+              </p:cNvPr>
+              <p:cNvSpPr txBox="1"/>
+              <p:nvPr/>
+            </p:nvSpPr>
+            <p:spPr>
+              <a:xfrm>
+                <a:off x="3117818" y="1697484"/>
+                <a:ext cx="4024682" cy="1013870"/>
+              </a:xfrm>
+              <a:prstGeom prst="rect">
+                <a:avLst/>
+              </a:prstGeom>
+              <a:ln w="41275" cap="rnd">
+                <a:round/>
+              </a:ln>
+            </p:spPr>
+            <p:style>
+              <a:lnRef idx="2">
+                <a:schemeClr val="accent5"/>
+              </a:lnRef>
+              <a:fillRef idx="1">
+                <a:schemeClr val="lt1"/>
+              </a:fillRef>
+              <a:effectRef idx="0">
+                <a:schemeClr val="accent5"/>
+              </a:effectRef>
+              <a:fontRef idx="minor">
+                <a:schemeClr val="dk1"/>
+              </a:fontRef>
+            </p:style>
+            <p:txBody>
+              <a:bodyPr wrap="square" rtlCol="0">
+                <a:noAutofit/>
+              </a:bodyPr>
+              <a:lstStyle/>
+              <a:p>
+                <a:pPr algn="ctr"/>
+                <a:r>
+                  <a:rPr lang="fr-FR" b="1" dirty="0"/>
+                  <a:t>ADMIN-Frontend</a:t>
+                </a:r>
+              </a:p>
+            </p:txBody>
+          </p:sp>
+          <p:pic>
+            <p:nvPicPr>
+              <p:cNvPr id="32" name="Image 31" descr="Une image contenant symbole, Graphique, clipart, conception&#10;&#10;Le contenu généré par l’IA peut être incorrect.">
+                <a:extLst>
+                  <a:ext uri="{FF2B5EF4-FFF2-40B4-BE49-F238E27FC236}">
+                    <a16:creationId xmlns:a16="http://schemas.microsoft.com/office/drawing/2014/main" id="{40595A3F-BC5D-7961-B8A4-008DB9C3DA94}"/>
+                  </a:ext>
+                </a:extLst>
+              </p:cNvPr>
+              <p:cNvPicPr>
+                <a:picLocks noChangeAspect="1"/>
+              </p:cNvPicPr>
+              <p:nvPr/>
+            </p:nvPicPr>
+            <p:blipFill>
+              <a:blip r:embed="rId2"/>
+              <a:stretch>
+                <a:fillRect/>
+              </a:stretch>
+            </p:blipFill>
+            <p:spPr>
+              <a:xfrm>
+                <a:off x="6719253" y="2071994"/>
+                <a:ext cx="396649" cy="396649"/>
+              </a:xfrm>
+              <a:prstGeom prst="rect">
+                <a:avLst/>
+              </a:prstGeom>
+            </p:spPr>
+          </p:pic>
+        </p:grpSp>
+        <p:pic>
+          <p:nvPicPr>
+            <p:cNvPr id="30" name="Image 29" descr="Une image contenant logo, Graphique, Police, graphisme&#10;&#10;Le contenu généré par l’IA peut être incorrect.">
+              <a:extLst>
+                <a:ext uri="{FF2B5EF4-FFF2-40B4-BE49-F238E27FC236}">
+                  <a16:creationId xmlns:a16="http://schemas.microsoft.com/office/drawing/2014/main" id="{920DD9B6-E3A7-0E7F-F61F-2396786F6922}"/>
+                </a:ext>
+              </a:extLst>
+            </p:cNvPr>
+            <p:cNvPicPr>
+              <a:picLocks noChangeAspect="1"/>
+            </p:cNvPicPr>
+            <p:nvPr/>
+          </p:nvPicPr>
+          <p:blipFill>
+            <a:blip r:embed="rId3"/>
+            <a:srcRect l="3961" t="27473" r="4988" b="25711"/>
+            <a:stretch/>
+          </p:blipFill>
+          <p:spPr>
+            <a:xfrm>
+              <a:off x="4222518" y="2442914"/>
+              <a:ext cx="1064653" cy="544984"/>
+            </a:xfrm>
+            <a:prstGeom prst="rect">
+              <a:avLst/>
+            </a:prstGeom>
+          </p:spPr>
+        </p:pic>
+      </p:grpSp>
+      <p:grpSp>
+        <p:nvGrpSpPr>
+          <p:cNvPr id="33" name="Groupe 32">
+            <a:extLst>
+              <a:ext uri="{FF2B5EF4-FFF2-40B4-BE49-F238E27FC236}">
+                <a16:creationId xmlns:a16="http://schemas.microsoft.com/office/drawing/2014/main" id="{2C0392BD-D85C-AA8A-05C3-6458416B6460}"/>
+              </a:ext>
+            </a:extLst>
+          </p:cNvPr>
+          <p:cNvGrpSpPr/>
+          <p:nvPr/>
+        </p:nvGrpSpPr>
+        <p:grpSpPr>
+          <a:xfrm>
+            <a:off x="5815346" y="4508481"/>
+            <a:ext cx="762420" cy="960763"/>
+            <a:chOff x="8474329" y="3786059"/>
+            <a:chExt cx="957921" cy="1167191"/>
+          </a:xfrm>
+        </p:grpSpPr>
+        <p:sp>
+          <p:nvSpPr>
+            <p:cNvPr id="34" name="ZoneTexte 33">
+              <a:extLst>
+                <a:ext uri="{FF2B5EF4-FFF2-40B4-BE49-F238E27FC236}">
+                  <a16:creationId xmlns:a16="http://schemas.microsoft.com/office/drawing/2014/main" id="{43BC6261-04BB-5612-3E5E-A1B37EB03842}"/>
+                </a:ext>
+              </a:extLst>
+            </p:cNvPr>
+            <p:cNvSpPr txBox="1"/>
+            <p:nvPr/>
+          </p:nvSpPr>
+          <p:spPr>
+            <a:xfrm>
+              <a:off x="8495878" y="3786059"/>
+              <a:ext cx="936372" cy="373905"/>
+            </a:xfrm>
+            <a:prstGeom prst="rect">
+              <a:avLst/>
+            </a:prstGeom>
+            <a:noFill/>
+          </p:spPr>
+          <p:txBody>
+            <a:bodyPr wrap="none" rtlCol="0">
+              <a:spAutoFit/>
+            </a:bodyPr>
+            <a:lstStyle/>
+            <a:p>
+              <a:r>
+                <a:rPr lang="fr-FR" sz="1400" dirty="0" err="1">
+                  <a:solidFill>
+                    <a:schemeClr val="accent2">
+                      <a:lumMod val="75000"/>
+                    </a:schemeClr>
+                  </a:solidFill>
+                </a:rPr>
+                <a:t>Models</a:t>
+              </a:r>
+              <a:endParaRPr lang="fr-FR" sz="1400" dirty="0">
+                <a:solidFill>
+                  <a:schemeClr val="accent2">
+                    <a:lumMod val="75000"/>
+                  </a:schemeClr>
+                </a:solidFill>
+              </a:endParaRPr>
+            </a:p>
+          </p:txBody>
+        </p:sp>
+        <p:pic>
+          <p:nvPicPr>
+            <p:cNvPr id="35" name="Image 34" descr="Une image contenant Graphique, conception&#10;&#10;Le contenu généré par l’IA peut être incorrect.">
+              <a:extLst>
+                <a:ext uri="{FF2B5EF4-FFF2-40B4-BE49-F238E27FC236}">
+                  <a16:creationId xmlns:a16="http://schemas.microsoft.com/office/drawing/2014/main" id="{8257424F-A2B3-6160-5D20-69C694052E27}"/>
+                </a:ext>
+              </a:extLst>
+            </p:cNvPr>
+            <p:cNvPicPr>
+              <a:picLocks noChangeAspect="1"/>
+            </p:cNvPicPr>
+            <p:nvPr/>
+          </p:nvPicPr>
+          <p:blipFill>
+            <a:blip r:embed="rId4"/>
+            <a:srcRect l="11406" t="1461" r="10410" b="5393"/>
+            <a:stretch/>
+          </p:blipFill>
+          <p:spPr>
+            <a:xfrm>
+              <a:off x="8474329" y="4140127"/>
+              <a:ext cx="910012" cy="813123"/>
+            </a:xfrm>
+            <a:prstGeom prst="rect">
+              <a:avLst/>
+            </a:prstGeom>
+          </p:spPr>
+        </p:pic>
+      </p:grpSp>
+      <p:grpSp>
+        <p:nvGrpSpPr>
+          <p:cNvPr id="36" name="Groupe 35">
+            <a:extLst>
+              <a:ext uri="{FF2B5EF4-FFF2-40B4-BE49-F238E27FC236}">
+                <a16:creationId xmlns:a16="http://schemas.microsoft.com/office/drawing/2014/main" id="{82B789B5-CFE3-4958-9BFC-5229975E44F3}"/>
+              </a:ext>
+            </a:extLst>
+          </p:cNvPr>
+          <p:cNvGrpSpPr/>
+          <p:nvPr/>
+        </p:nvGrpSpPr>
+        <p:grpSpPr>
+          <a:xfrm>
+            <a:off x="3491851" y="3471791"/>
+            <a:ext cx="1636568" cy="1354217"/>
+            <a:chOff x="10430230" y="3528632"/>
+            <a:chExt cx="1636568" cy="1354217"/>
+          </a:xfrm>
+        </p:grpSpPr>
+        <p:sp>
+          <p:nvSpPr>
+            <p:cNvPr id="37" name="ZoneTexte 36">
+              <a:extLst>
+                <a:ext uri="{FF2B5EF4-FFF2-40B4-BE49-F238E27FC236}">
+                  <a16:creationId xmlns:a16="http://schemas.microsoft.com/office/drawing/2014/main" id="{55644D68-0F67-CFF5-A0CA-D23BA98AF015}"/>
+                </a:ext>
+              </a:extLst>
+            </p:cNvPr>
+            <p:cNvSpPr txBox="1"/>
+            <p:nvPr/>
+          </p:nvSpPr>
+          <p:spPr>
+            <a:xfrm>
+              <a:off x="10430230" y="3528632"/>
+              <a:ext cx="1636568" cy="1354217"/>
+            </a:xfrm>
+            <a:prstGeom prst="rect">
+              <a:avLst/>
+            </a:prstGeom>
+            <a:noFill/>
+            <a:ln>
+              <a:solidFill>
+                <a:schemeClr val="tx1"/>
+              </a:solidFill>
+            </a:ln>
+          </p:spPr>
+          <p:txBody>
+            <a:bodyPr wrap="square" rtlCol="0">
+              <a:spAutoFit/>
+            </a:bodyPr>
+            <a:lstStyle/>
+            <a:p>
+              <a:endParaRPr lang="fr-FR" dirty="0"/>
+            </a:p>
+            <a:p>
+              <a:endParaRPr lang="fr-FR" dirty="0"/>
+            </a:p>
+            <a:p>
+              <a:endParaRPr lang="fr-FR" dirty="0"/>
+            </a:p>
+            <a:p>
+              <a:r>
+                <a:rPr lang="fr-FR" sz="1400" dirty="0"/>
+                <a:t>- </a:t>
+              </a:r>
+              <a:r>
+                <a:rPr lang="fr-FR" sz="1400" dirty="0" err="1"/>
+                <a:t>Experiment</a:t>
+              </a:r>
+              <a:endParaRPr lang="fr-FR" sz="1400" dirty="0"/>
+            </a:p>
+            <a:p>
+              <a:r>
+                <a:rPr lang="fr-FR" sz="1400" dirty="0"/>
+                <a:t>- Git Hash</a:t>
+              </a:r>
+            </a:p>
+          </p:txBody>
+        </p:sp>
+        <p:pic>
+          <p:nvPicPr>
+            <p:cNvPr id="38" name="Image 37" descr="Une image contenant dessin humoristique, clipart, Police, lapin&#10;&#10;Le contenu généré par l’IA peut être incorrect.">
+              <a:extLst>
+                <a:ext uri="{FF2B5EF4-FFF2-40B4-BE49-F238E27FC236}">
+                  <a16:creationId xmlns:a16="http://schemas.microsoft.com/office/drawing/2014/main" id="{E56D770E-CAA2-7777-65F3-32C47C07A7F4}"/>
+                </a:ext>
+              </a:extLst>
+            </p:cNvPr>
+            <p:cNvPicPr>
+              <a:picLocks noChangeAspect="1"/>
+            </p:cNvPicPr>
+            <p:nvPr/>
+          </p:nvPicPr>
+          <p:blipFill>
+            <a:blip r:embed="rId5"/>
+            <a:stretch>
+              <a:fillRect/>
+            </a:stretch>
+          </p:blipFill>
+          <p:spPr>
+            <a:xfrm>
+              <a:off x="10607420" y="3558191"/>
+              <a:ext cx="1282188" cy="366339"/>
+            </a:xfrm>
+            <a:prstGeom prst="rect">
+              <a:avLst/>
+            </a:prstGeom>
+          </p:spPr>
+        </p:pic>
+        <p:pic>
+          <p:nvPicPr>
+            <p:cNvPr id="39" name="Image 38" descr="Une image contenant Police, Graphique, graphisme, logo&#10;&#10;Le contenu généré par l’IA peut être incorrect.">
+              <a:extLst>
+                <a:ext uri="{FF2B5EF4-FFF2-40B4-BE49-F238E27FC236}">
+                  <a16:creationId xmlns:a16="http://schemas.microsoft.com/office/drawing/2014/main" id="{8FE6B2C7-8C4A-AD40-B42A-BD9FD1119803}"/>
+                </a:ext>
+              </a:extLst>
+            </p:cNvPr>
+            <p:cNvPicPr>
+              <a:picLocks noChangeAspect="1"/>
+            </p:cNvPicPr>
+            <p:nvPr/>
+          </p:nvPicPr>
+          <p:blipFill>
+            <a:blip r:embed="rId6"/>
+            <a:stretch>
+              <a:fillRect/>
+            </a:stretch>
+          </p:blipFill>
+          <p:spPr>
+            <a:xfrm>
+              <a:off x="10657946" y="3953288"/>
+              <a:ext cx="999108" cy="366339"/>
+            </a:xfrm>
+            <a:prstGeom prst="rect">
+              <a:avLst/>
+            </a:prstGeom>
+          </p:spPr>
+        </p:pic>
+      </p:grpSp>
+      <p:sp>
+        <p:nvSpPr>
+          <p:cNvPr id="40" name="Flèche : bas 39">
+            <a:extLst>
+              <a:ext uri="{FF2B5EF4-FFF2-40B4-BE49-F238E27FC236}">
+                <a16:creationId xmlns:a16="http://schemas.microsoft.com/office/drawing/2014/main" id="{BFBFDDC4-5AAE-EE7D-43CF-FE0E97762CA8}"/>
+              </a:ext>
+            </a:extLst>
+          </p:cNvPr>
+          <p:cNvSpPr/>
+          <p:nvPr/>
+        </p:nvSpPr>
+        <p:spPr>
+          <a:xfrm rot="5400000">
+            <a:off x="6268316" y="2925103"/>
+            <a:ext cx="242151" cy="2548950"/>
+          </a:xfrm>
+          <a:prstGeom prst="downArrow">
+            <a:avLst/>
+          </a:prstGeom>
+          <a:solidFill>
+            <a:schemeClr val="accent6">
+              <a:lumMod val="60000"/>
+              <a:lumOff val="40000"/>
+            </a:schemeClr>
+          </a:solidFill>
+          <a:ln>
+            <a:solidFill>
+              <a:schemeClr val="tx1"/>
+            </a:solidFill>
+          </a:ln>
+        </p:spPr>
+        <p:style>
+          <a:lnRef idx="2">
+            <a:schemeClr val="accent1">
+              <a:shade val="15000"/>
+            </a:schemeClr>
+          </a:lnRef>
+          <a:fillRef idx="1">
+            <a:schemeClr val="accent1"/>
+          </a:fillRef>
+          <a:effectRef idx="0">
+            <a:schemeClr val="accent1"/>
+          </a:effectRef>
+          <a:fontRef idx="minor">
+            <a:schemeClr val="lt1"/>
+          </a:fontRef>
+        </p:style>
+        <p:txBody>
+          <a:bodyPr rtlCol="0" anchor="ctr"/>
+          <a:lstStyle/>
+          <a:p>
+            <a:pPr algn="ctr"/>
+            <a:endParaRPr lang="fr-FR" dirty="0"/>
+          </a:p>
+        </p:txBody>
+      </p:sp>
+      <p:sp>
+        <p:nvSpPr>
+          <p:cNvPr id="41" name="Flèche : bas 40">
+            <a:extLst>
+              <a:ext uri="{FF2B5EF4-FFF2-40B4-BE49-F238E27FC236}">
+                <a16:creationId xmlns:a16="http://schemas.microsoft.com/office/drawing/2014/main" id="{65F61427-94BD-DB5A-9486-34202872C24C}"/>
+              </a:ext>
+            </a:extLst>
+          </p:cNvPr>
+          <p:cNvSpPr/>
+          <p:nvPr/>
+        </p:nvSpPr>
+        <p:spPr>
+          <a:xfrm rot="5400000">
+            <a:off x="6958174" y="4549288"/>
+            <a:ext cx="287154" cy="1124232"/>
+          </a:xfrm>
+          <a:prstGeom prst="downArrow">
+            <a:avLst/>
+          </a:prstGeom>
+          <a:solidFill>
+            <a:schemeClr val="accent2">
+              <a:lumMod val="60000"/>
+              <a:lumOff val="40000"/>
+            </a:schemeClr>
+          </a:solidFill>
+          <a:ln>
+            <a:solidFill>
+              <a:schemeClr val="tx1"/>
+            </a:solidFill>
+          </a:ln>
+        </p:spPr>
+        <p:style>
+          <a:lnRef idx="2">
+            <a:schemeClr val="accent1">
+              <a:shade val="15000"/>
+            </a:schemeClr>
+          </a:lnRef>
+          <a:fillRef idx="1">
+            <a:schemeClr val="accent1"/>
+          </a:fillRef>
+          <a:effectRef idx="0">
+            <a:schemeClr val="accent1"/>
+          </a:effectRef>
+          <a:fontRef idx="minor">
+            <a:schemeClr val="lt1"/>
+          </a:fontRef>
+        </p:style>
+        <p:txBody>
+          <a:bodyPr rtlCol="0" anchor="ctr"/>
+          <a:lstStyle/>
+          <a:p>
+            <a:endParaRPr lang="fr-FR" dirty="0"/>
+          </a:p>
+        </p:txBody>
+      </p:sp>
+      <p:sp>
+        <p:nvSpPr>
+          <p:cNvPr id="42" name="Flèche : bas 41">
+            <a:extLst>
+              <a:ext uri="{FF2B5EF4-FFF2-40B4-BE49-F238E27FC236}">
+                <a16:creationId xmlns:a16="http://schemas.microsoft.com/office/drawing/2014/main" id="{FD06F962-8010-2D5B-8B8D-9EB3B84D2E20}"/>
+              </a:ext>
+            </a:extLst>
+          </p:cNvPr>
+          <p:cNvSpPr/>
+          <p:nvPr/>
+        </p:nvSpPr>
+        <p:spPr>
+          <a:xfrm rot="5400000">
+            <a:off x="4224690" y="3681743"/>
+            <a:ext cx="253813" cy="2896279"/>
+          </a:xfrm>
+          <a:prstGeom prst="downArrow">
+            <a:avLst/>
+          </a:prstGeom>
+          <a:solidFill>
+            <a:schemeClr val="accent2">
+              <a:lumMod val="60000"/>
+              <a:lumOff val="40000"/>
+            </a:schemeClr>
+          </a:solidFill>
+          <a:ln>
+            <a:solidFill>
+              <a:schemeClr val="tx1"/>
+            </a:solidFill>
+          </a:ln>
+        </p:spPr>
+        <p:style>
+          <a:lnRef idx="2">
+            <a:schemeClr val="accent1">
+              <a:shade val="15000"/>
+            </a:schemeClr>
+          </a:lnRef>
+          <a:fillRef idx="1">
+            <a:schemeClr val="accent1"/>
+          </a:fillRef>
+          <a:effectRef idx="0">
+            <a:schemeClr val="accent1"/>
+          </a:effectRef>
+          <a:fontRef idx="minor">
+            <a:schemeClr val="lt1"/>
+          </a:fontRef>
+        </p:style>
+        <p:txBody>
+          <a:bodyPr rtlCol="0" anchor="ctr"/>
+          <a:lstStyle/>
+          <a:p>
+            <a:endParaRPr lang="fr-FR" dirty="0"/>
+          </a:p>
+        </p:txBody>
+      </p:sp>
+      <p:grpSp>
+        <p:nvGrpSpPr>
+          <p:cNvPr id="43" name="Groupe 42">
+            <a:extLst>
+              <a:ext uri="{FF2B5EF4-FFF2-40B4-BE49-F238E27FC236}">
+                <a16:creationId xmlns:a16="http://schemas.microsoft.com/office/drawing/2014/main" id="{1EB1DE35-0938-E54B-BA15-C8108E4EA663}"/>
+              </a:ext>
+            </a:extLst>
+          </p:cNvPr>
+          <p:cNvGrpSpPr/>
+          <p:nvPr/>
+        </p:nvGrpSpPr>
+        <p:grpSpPr>
+          <a:xfrm>
+            <a:off x="8615741" y="1718184"/>
+            <a:ext cx="547714" cy="671329"/>
+            <a:chOff x="10257940" y="1022096"/>
+            <a:chExt cx="547714" cy="671329"/>
+          </a:xfrm>
+        </p:grpSpPr>
+        <p:cxnSp>
+          <p:nvCxnSpPr>
+            <p:cNvPr id="44" name="Connecteur droit avec flèche 43">
+              <a:extLst>
+                <a:ext uri="{FF2B5EF4-FFF2-40B4-BE49-F238E27FC236}">
+                  <a16:creationId xmlns:a16="http://schemas.microsoft.com/office/drawing/2014/main" id="{3C7E99FA-3772-FA6F-94B5-D40AB52C369B}"/>
+                </a:ext>
+              </a:extLst>
+            </p:cNvPr>
+            <p:cNvCxnSpPr>
+              <a:cxnSpLocks/>
+            </p:cNvCxnSpPr>
+            <p:nvPr/>
+          </p:nvCxnSpPr>
+          <p:spPr>
+            <a:xfrm>
+              <a:off x="10307639" y="1022096"/>
+              <a:ext cx="0" cy="671329"/>
+            </a:xfrm>
+            <a:prstGeom prst="straightConnector1">
+              <a:avLst/>
+            </a:prstGeom>
+            <a:ln w="19050" cap="flat" cmpd="sng" algn="ctr">
+              <a:solidFill>
+                <a:schemeClr val="accent5"/>
+              </a:solidFill>
+              <a:prstDash val="solid"/>
+              <a:round/>
+              <a:headEnd type="none" w="med" len="med"/>
+              <a:tailEnd type="arrow" w="med" len="med"/>
+            </a:ln>
+          </p:spPr>
+          <p:style>
+            <a:lnRef idx="0">
+              <a:scrgbClr r="0" g="0" b="0"/>
+            </a:lnRef>
+            <a:fillRef idx="0">
+              <a:scrgbClr r="0" g="0" b="0"/>
+            </a:fillRef>
+            <a:effectRef idx="0">
+              <a:scrgbClr r="0" g="0" b="0"/>
+            </a:effectRef>
+            <a:fontRef idx="minor">
+              <a:schemeClr val="tx1"/>
+            </a:fontRef>
+          </p:style>
+        </p:cxnSp>
+        <p:sp>
+          <p:nvSpPr>
+            <p:cNvPr id="45" name="ZoneTexte 44">
+              <a:extLst>
+                <a:ext uri="{FF2B5EF4-FFF2-40B4-BE49-F238E27FC236}">
+                  <a16:creationId xmlns:a16="http://schemas.microsoft.com/office/drawing/2014/main" id="{6C760790-71D3-6A29-9300-649FBD70138D}"/>
+                </a:ext>
+              </a:extLst>
+            </p:cNvPr>
+            <p:cNvSpPr txBox="1"/>
+            <p:nvPr/>
+          </p:nvSpPr>
+          <p:spPr>
+            <a:xfrm>
+              <a:off x="10257940" y="1156538"/>
+              <a:ext cx="547714" cy="307777"/>
+            </a:xfrm>
+            <a:prstGeom prst="rect">
+              <a:avLst/>
+            </a:prstGeom>
+            <a:noFill/>
+          </p:spPr>
+          <p:txBody>
+            <a:bodyPr wrap="none" rtlCol="0">
+              <a:spAutoFit/>
+            </a:bodyPr>
+            <a:lstStyle/>
+            <a:p>
+              <a:r>
+                <a:rPr lang="fr-FR" sz="1400" dirty="0"/>
+                <a:t>train</a:t>
+              </a:r>
+            </a:p>
+          </p:txBody>
+        </p:sp>
+      </p:grpSp>
+      <p:grpSp>
+        <p:nvGrpSpPr>
+          <p:cNvPr id="49" name="Groupe 48">
+            <a:extLst>
+              <a:ext uri="{FF2B5EF4-FFF2-40B4-BE49-F238E27FC236}">
+                <a16:creationId xmlns:a16="http://schemas.microsoft.com/office/drawing/2014/main" id="{0566FF5F-E70A-750F-41B1-01996201FA3F}"/>
+              </a:ext>
+            </a:extLst>
+          </p:cNvPr>
+          <p:cNvGrpSpPr/>
+          <p:nvPr/>
+        </p:nvGrpSpPr>
+        <p:grpSpPr>
+          <a:xfrm>
+            <a:off x="9306765" y="1718183"/>
+            <a:ext cx="1324530" cy="671329"/>
+            <a:chOff x="10257940" y="1022096"/>
+            <a:chExt cx="1324530" cy="671329"/>
+          </a:xfrm>
+        </p:grpSpPr>
+        <p:cxnSp>
+          <p:nvCxnSpPr>
+            <p:cNvPr id="50" name="Connecteur droit avec flèche 49">
+              <a:extLst>
+                <a:ext uri="{FF2B5EF4-FFF2-40B4-BE49-F238E27FC236}">
+                  <a16:creationId xmlns:a16="http://schemas.microsoft.com/office/drawing/2014/main" id="{0E26283C-5005-AF66-AF49-CAD57C27CC9E}"/>
+                </a:ext>
+              </a:extLst>
+            </p:cNvPr>
+            <p:cNvCxnSpPr>
+              <a:cxnSpLocks/>
+            </p:cNvCxnSpPr>
+            <p:nvPr/>
+          </p:nvCxnSpPr>
+          <p:spPr>
+            <a:xfrm>
+              <a:off x="10307639" y="1022096"/>
+              <a:ext cx="0" cy="671329"/>
+            </a:xfrm>
+            <a:prstGeom prst="straightConnector1">
+              <a:avLst/>
+            </a:prstGeom>
+            <a:ln w="19050" cap="flat" cmpd="sng" algn="ctr">
+              <a:solidFill>
+                <a:schemeClr val="accent5"/>
+              </a:solidFill>
+              <a:prstDash val="solid"/>
+              <a:round/>
+              <a:headEnd type="none" w="med" len="med"/>
+              <a:tailEnd type="arrow" w="med" len="med"/>
+            </a:ln>
+          </p:spPr>
+          <p:style>
+            <a:lnRef idx="0">
+              <a:scrgbClr r="0" g="0" b="0"/>
+            </a:lnRef>
+            <a:fillRef idx="0">
+              <a:scrgbClr r="0" g="0" b="0"/>
+            </a:fillRef>
+            <a:effectRef idx="0">
+              <a:scrgbClr r="0" g="0" b="0"/>
+            </a:effectRef>
+            <a:fontRef idx="minor">
+              <a:schemeClr val="tx1"/>
+            </a:fontRef>
+          </p:style>
+        </p:cxnSp>
+        <p:sp>
+          <p:nvSpPr>
+            <p:cNvPr id="51" name="ZoneTexte 50">
+              <a:extLst>
+                <a:ext uri="{FF2B5EF4-FFF2-40B4-BE49-F238E27FC236}">
+                  <a16:creationId xmlns:a16="http://schemas.microsoft.com/office/drawing/2014/main" id="{F6BBFB93-DD92-4384-884F-750C69E842C3}"/>
+                </a:ext>
+              </a:extLst>
+            </p:cNvPr>
+            <p:cNvSpPr txBox="1"/>
+            <p:nvPr/>
+          </p:nvSpPr>
+          <p:spPr>
+            <a:xfrm>
+              <a:off x="10257940" y="1156538"/>
+              <a:ext cx="1324530" cy="307777"/>
+            </a:xfrm>
+            <a:prstGeom prst="rect">
+              <a:avLst/>
+            </a:prstGeom>
+            <a:noFill/>
+          </p:spPr>
+          <p:txBody>
+            <a:bodyPr wrap="none" rtlCol="0">
+              <a:spAutoFit/>
+            </a:bodyPr>
+            <a:lstStyle/>
+            <a:p>
+              <a:r>
+                <a:rPr lang="fr-FR" sz="1400" dirty="0" err="1"/>
+                <a:t>register_model</a:t>
+              </a:r>
+              <a:endParaRPr lang="fr-FR" sz="1400" dirty="0"/>
+            </a:p>
+          </p:txBody>
+        </p:sp>
+      </p:grpSp>
+      <p:grpSp>
+        <p:nvGrpSpPr>
+          <p:cNvPr id="1068" name="Groupe 1067">
+            <a:extLst>
+              <a:ext uri="{FF2B5EF4-FFF2-40B4-BE49-F238E27FC236}">
+                <a16:creationId xmlns:a16="http://schemas.microsoft.com/office/drawing/2014/main" id="{E0D60370-B6C9-753D-025D-CE7D5F6BC875}"/>
+              </a:ext>
+            </a:extLst>
+          </p:cNvPr>
+          <p:cNvGrpSpPr/>
+          <p:nvPr/>
+        </p:nvGrpSpPr>
+        <p:grpSpPr>
+          <a:xfrm>
+            <a:off x="10631522" y="1643885"/>
+            <a:ext cx="1578098" cy="736150"/>
+            <a:chOff x="10421641" y="1652070"/>
+            <a:chExt cx="1578098" cy="736150"/>
+          </a:xfrm>
+        </p:grpSpPr>
+        <p:grpSp>
+          <p:nvGrpSpPr>
+            <p:cNvPr id="52" name="Groupe 51">
+              <a:extLst>
+                <a:ext uri="{FF2B5EF4-FFF2-40B4-BE49-F238E27FC236}">
+                  <a16:creationId xmlns:a16="http://schemas.microsoft.com/office/drawing/2014/main" id="{87FCDEFA-296B-9C1D-3A42-2CE9685F7C2E}"/>
+                </a:ext>
+              </a:extLst>
+            </p:cNvPr>
+            <p:cNvGrpSpPr/>
+            <p:nvPr/>
+          </p:nvGrpSpPr>
+          <p:grpSpPr>
+            <a:xfrm>
+              <a:off x="10421641" y="1652070"/>
+              <a:ext cx="1495896" cy="736150"/>
+              <a:chOff x="10197912" y="963144"/>
+              <a:chExt cx="1495896" cy="736150"/>
+            </a:xfrm>
+          </p:grpSpPr>
+          <p:grpSp>
+            <p:nvGrpSpPr>
+              <p:cNvPr id="53" name="Groupe 52">
+                <a:extLst>
+                  <a:ext uri="{FF2B5EF4-FFF2-40B4-BE49-F238E27FC236}">
+                    <a16:creationId xmlns:a16="http://schemas.microsoft.com/office/drawing/2014/main" id="{91AB9CAF-12B2-E031-4235-27E4D662BBC8}"/>
+                  </a:ext>
+                </a:extLst>
+              </p:cNvPr>
+              <p:cNvGrpSpPr/>
+              <p:nvPr/>
+            </p:nvGrpSpPr>
+            <p:grpSpPr>
+              <a:xfrm>
+                <a:off x="10197912" y="1027965"/>
+                <a:ext cx="184731" cy="671329"/>
+                <a:chOff x="1267689" y="1070658"/>
+                <a:chExt cx="184731" cy="671329"/>
+              </a:xfrm>
+            </p:grpSpPr>
+            <p:cxnSp>
+              <p:nvCxnSpPr>
+                <p:cNvPr id="55" name="Connecteur droit avec flèche 54">
+                  <a:extLst>
+                    <a:ext uri="{FF2B5EF4-FFF2-40B4-BE49-F238E27FC236}">
+                      <a16:creationId xmlns:a16="http://schemas.microsoft.com/office/drawing/2014/main" id="{F1677DE7-8038-6E8A-439F-BFE71F4840AB}"/>
+                    </a:ext>
+                  </a:extLst>
+                </p:cNvPr>
+                <p:cNvCxnSpPr>
+                  <a:cxnSpLocks/>
+                </p:cNvCxnSpPr>
+                <p:nvPr/>
+              </p:nvCxnSpPr>
+              <p:spPr>
+                <a:xfrm>
+                  <a:off x="1327940" y="1070658"/>
+                  <a:ext cx="0" cy="671329"/>
+                </a:xfrm>
+                <a:prstGeom prst="straightConnector1">
+                  <a:avLst/>
+                </a:prstGeom>
+                <a:ln w="19050" cap="flat" cmpd="sng" algn="ctr">
+                  <a:solidFill>
+                    <a:schemeClr val="accent5"/>
+                  </a:solidFill>
+                  <a:prstDash val="solid"/>
+                  <a:round/>
+                  <a:headEnd type="none" w="med" len="med"/>
+                  <a:tailEnd type="arrow" w="med" len="med"/>
+                </a:ln>
+              </p:spPr>
+              <p:style>
+                <a:lnRef idx="0">
+                  <a:scrgbClr r="0" g="0" b="0"/>
+                </a:lnRef>
+                <a:fillRef idx="0">
+                  <a:scrgbClr r="0" g="0" b="0"/>
+                </a:fillRef>
+                <a:effectRef idx="0">
+                  <a:scrgbClr r="0" g="0" b="0"/>
+                </a:effectRef>
+                <a:fontRef idx="minor">
+                  <a:schemeClr val="tx1"/>
+                </a:fontRef>
+              </p:style>
+            </p:cxnSp>
+            <p:sp>
+              <p:nvSpPr>
+                <p:cNvPr id="56" name="ZoneTexte 55">
+                  <a:extLst>
+                    <a:ext uri="{FF2B5EF4-FFF2-40B4-BE49-F238E27FC236}">
+                      <a16:creationId xmlns:a16="http://schemas.microsoft.com/office/drawing/2014/main" id="{4E7F5A2A-9CBD-4262-966B-2101CC374510}"/>
+                    </a:ext>
+                  </a:extLst>
+                </p:cNvPr>
+                <p:cNvSpPr txBox="1"/>
+                <p:nvPr/>
+              </p:nvSpPr>
+              <p:spPr>
+                <a:xfrm>
+                  <a:off x="1267689" y="1184970"/>
+                  <a:ext cx="184731" cy="307777"/>
+                </a:xfrm>
+                <a:prstGeom prst="rect">
+                  <a:avLst/>
+                </a:prstGeom>
+                <a:noFill/>
+              </p:spPr>
+              <p:txBody>
+                <a:bodyPr wrap="none" rtlCol="0">
+                  <a:spAutoFit/>
+                </a:bodyPr>
+                <a:lstStyle/>
+                <a:p>
+                  <a:endParaRPr lang="fr-FR" sz="1400" dirty="0">
+                    <a:solidFill>
+                      <a:schemeClr val="accent5"/>
+                    </a:solidFill>
+                  </a:endParaRPr>
+                </a:p>
+              </p:txBody>
+            </p:sp>
+          </p:grpSp>
+          <p:sp>
+            <p:nvSpPr>
+              <p:cNvPr id="54" name="ZoneTexte 53">
+                <a:extLst>
+                  <a:ext uri="{FF2B5EF4-FFF2-40B4-BE49-F238E27FC236}">
+                    <a16:creationId xmlns:a16="http://schemas.microsoft.com/office/drawing/2014/main" id="{F9D58B32-A780-63A4-EFB5-FF8FA0EA1193}"/>
+                  </a:ext>
+                </a:extLst>
+              </p:cNvPr>
+              <p:cNvSpPr txBox="1"/>
+              <p:nvPr/>
+            </p:nvSpPr>
+            <p:spPr>
+              <a:xfrm>
+                <a:off x="10230715" y="963144"/>
+                <a:ext cx="1463093" cy="307777"/>
+              </a:xfrm>
+              <a:prstGeom prst="rect">
+                <a:avLst/>
+              </a:prstGeom>
+              <a:noFill/>
+            </p:spPr>
+            <p:txBody>
+              <a:bodyPr wrap="none" rtlCol="0">
+                <a:spAutoFit/>
+              </a:bodyPr>
+              <a:lstStyle/>
+              <a:p>
+                <a:r>
+                  <a:rPr lang="fr-FR" sz="1400" dirty="0" err="1"/>
+                  <a:t>get_mlflow_runs</a:t>
+                </a:r>
+                <a:endParaRPr lang="fr-FR" sz="1400" dirty="0"/>
+              </a:p>
+            </p:txBody>
+          </p:sp>
+        </p:grpSp>
+        <p:sp>
+          <p:nvSpPr>
+            <p:cNvPr id="57" name="ZoneTexte 56">
+              <a:extLst>
+                <a:ext uri="{FF2B5EF4-FFF2-40B4-BE49-F238E27FC236}">
+                  <a16:creationId xmlns:a16="http://schemas.microsoft.com/office/drawing/2014/main" id="{613D108B-4144-6045-DAB6-807939AA4AF9}"/>
+                </a:ext>
+              </a:extLst>
+            </p:cNvPr>
+            <p:cNvSpPr txBox="1"/>
+            <p:nvPr/>
+          </p:nvSpPr>
+          <p:spPr>
+            <a:xfrm>
+              <a:off x="10454444" y="1926565"/>
+              <a:ext cx="1545295" cy="307777"/>
+            </a:xfrm>
+            <a:prstGeom prst="rect">
+              <a:avLst/>
+            </a:prstGeom>
+            <a:noFill/>
+          </p:spPr>
+          <p:txBody>
+            <a:bodyPr wrap="none" rtlCol="0">
+              <a:spAutoFit/>
+            </a:bodyPr>
+            <a:lstStyle/>
+            <a:p>
+              <a:r>
+                <a:rPr lang="fr-FR" sz="1400" dirty="0" err="1"/>
+                <a:t>revert_to_commit</a:t>
+              </a:r>
+              <a:endParaRPr lang="fr-FR" sz="1400" dirty="0"/>
+            </a:p>
+          </p:txBody>
+        </p:sp>
+      </p:grpSp>
+      <p:grpSp>
+        <p:nvGrpSpPr>
+          <p:cNvPr id="58" name="Groupe 57">
+            <a:extLst>
+              <a:ext uri="{FF2B5EF4-FFF2-40B4-BE49-F238E27FC236}">
+                <a16:creationId xmlns:a16="http://schemas.microsoft.com/office/drawing/2014/main" id="{3BB2ED40-CBEC-CCF0-57C8-C565FDCD4E46}"/>
+              </a:ext>
+            </a:extLst>
+          </p:cNvPr>
+          <p:cNvGrpSpPr/>
+          <p:nvPr/>
+        </p:nvGrpSpPr>
+        <p:grpSpPr>
+          <a:xfrm>
+            <a:off x="8500575" y="4767770"/>
+            <a:ext cx="1476815" cy="943966"/>
+            <a:chOff x="181503" y="3624705"/>
+            <a:chExt cx="1476815" cy="943966"/>
+          </a:xfrm>
+        </p:grpSpPr>
+        <p:pic>
+          <p:nvPicPr>
+            <p:cNvPr id="59" name="Graphique 58" descr="Base de données avec un remplissage uni">
+              <a:extLst>
+                <a:ext uri="{FF2B5EF4-FFF2-40B4-BE49-F238E27FC236}">
+                  <a16:creationId xmlns:a16="http://schemas.microsoft.com/office/drawing/2014/main" id="{7F07757C-D520-992F-C78C-3A2320A8D7F7}"/>
+                </a:ext>
+              </a:extLst>
+            </p:cNvPr>
+            <p:cNvPicPr>
+              <a:picLocks noChangeAspect="1"/>
+            </p:cNvPicPr>
+            <p:nvPr/>
+          </p:nvPicPr>
+          <p:blipFill>
+            <a:blip r:embed="rId7">
+              <a:extLst>
+                <a:ext uri="{96DAC541-7B7A-43D3-8B79-37D633B846F1}">
+                  <asvg:svgBlip xmlns:asvg="http://schemas.microsoft.com/office/drawing/2016/SVG/main" r:embed="rId8"/>
+                </a:ext>
+              </a:extLst>
+            </a:blip>
+            <a:stretch>
+              <a:fillRect/>
+            </a:stretch>
+          </p:blipFill>
+          <p:spPr>
+            <a:xfrm>
+              <a:off x="433209" y="3846518"/>
+              <a:ext cx="722153" cy="722153"/>
+            </a:xfrm>
+            <a:prstGeom prst="rect">
+              <a:avLst/>
+            </a:prstGeom>
+          </p:spPr>
+        </p:pic>
+        <p:sp>
+          <p:nvSpPr>
+            <p:cNvPr id="60" name="ZoneTexte 59">
+              <a:extLst>
+                <a:ext uri="{FF2B5EF4-FFF2-40B4-BE49-F238E27FC236}">
+                  <a16:creationId xmlns:a16="http://schemas.microsoft.com/office/drawing/2014/main" id="{221ADED0-DDC4-B8CA-9C1E-DAC1844E6447}"/>
+                </a:ext>
+              </a:extLst>
+            </p:cNvPr>
+            <p:cNvSpPr txBox="1"/>
+            <p:nvPr/>
+          </p:nvSpPr>
+          <p:spPr>
+            <a:xfrm>
+              <a:off x="181503" y="3624705"/>
+              <a:ext cx="1476815" cy="338554"/>
+            </a:xfrm>
+            <a:prstGeom prst="rect">
+              <a:avLst/>
+            </a:prstGeom>
+            <a:noFill/>
+          </p:spPr>
+          <p:txBody>
+            <a:bodyPr wrap="none" rtlCol="0">
+              <a:spAutoFit/>
+            </a:bodyPr>
+            <a:lstStyle/>
+            <a:p>
+              <a:r>
+                <a:rPr lang="fr-FR" sz="1600" dirty="0">
+                  <a:solidFill>
+                    <a:schemeClr val="accent6">
+                      <a:lumMod val="75000"/>
+                    </a:schemeClr>
+                  </a:solidFill>
+                </a:rPr>
+                <a:t>Data + </a:t>
+              </a:r>
+              <a:r>
+                <a:rPr lang="fr-FR" sz="1600" dirty="0" err="1">
+                  <a:solidFill>
+                    <a:schemeClr val="accent6">
+                      <a:lumMod val="75000"/>
+                    </a:schemeClr>
+                  </a:solidFill>
+                </a:rPr>
+                <a:t>Models</a:t>
+              </a:r>
+              <a:endParaRPr lang="fr-FR" sz="1600" dirty="0">
+                <a:solidFill>
+                  <a:schemeClr val="accent6">
+                    <a:lumMod val="75000"/>
+                  </a:schemeClr>
+                </a:solidFill>
+              </a:endParaRPr>
+            </a:p>
+          </p:txBody>
+        </p:sp>
+      </p:grpSp>
       <p:pic>
         <p:nvPicPr>
-          <p:cNvPr id="1026" name="Picture 2">
-            <a:extLst>
-              <a:ext uri="{FF2B5EF4-FFF2-40B4-BE49-F238E27FC236}">
-                <a16:creationId xmlns:a16="http://schemas.microsoft.com/office/drawing/2014/main" id="{FB54342D-2402-D435-6C9A-7899B21DF810}"/>
+          <p:cNvPr id="61" name="Image 60" descr="Une image contenant Police, logo, symbole, Graphique&#10;&#10;Le contenu généré par l’IA peut être incorrect.">
+            <a:extLst>
+              <a:ext uri="{FF2B5EF4-FFF2-40B4-BE49-F238E27FC236}">
+                <a16:creationId xmlns:a16="http://schemas.microsoft.com/office/drawing/2014/main" id="{6A7AF0B8-0ED1-EA80-E021-27AA378F9240}"/>
               </a:ext>
             </a:extLst>
           </p:cNvPr>
           <p:cNvPicPr>
-            <a:picLocks noChangeAspect="1" noChangeArrowheads="1"/>
+            <a:picLocks noChangeAspect="1"/>
           </p:cNvPicPr>
           <p:nvPr/>
         </p:nvPicPr>
         <p:blipFill>
-          <a:blip r:embed="rId2">
-            <a:extLst>
-              <a:ext uri="{28A0092B-C50C-407E-A947-70E740481C1C}">
-                <a14:useLocalDpi xmlns:a14="http://schemas.microsoft.com/office/drawing/2010/main" val="0"/>
-              </a:ext>
-            </a:extLst>
-          </a:blip>
-          <a:srcRect/>
-          <a:stretch>
-            <a:fillRect/>
-          </a:stretch>
+          <a:blip r:embed="rId9"/>
+          <a:srcRect l="-3197" t="27080" r="-3106" b="27204"/>
+          <a:stretch/>
         </p:blipFill>
-        <p:spPr bwMode="auto">
-          <a:xfrm>
-            <a:off x="1790753" y="701218"/>
-            <a:ext cx="5716289" cy="5934720"/>
+        <p:spPr>
+          <a:xfrm>
+            <a:off x="10283963" y="4657028"/>
+            <a:ext cx="1170212" cy="503265"/>
           </a:xfrm>
           <a:prstGeom prst="rect">
             <a:avLst/>
           </a:prstGeom>
-          <a:noFill/>
-          <a:extLst>
-            <a:ext uri="{909E8E84-426E-40DD-AFC4-6F175D3DCCD1}">
-              <a14:hiddenFill xmlns:a14="http://schemas.microsoft.com/office/drawing/2010/main">
-                <a:solidFill>
-                  <a:srgbClr val="FFFFFF"/>
-                </a:solidFill>
-              </a14:hiddenFill>
-            </a:ext>
-          </a:extLst>
         </p:spPr>
       </p:pic>
-      <p:sp>
-        <p:nvSpPr>
-          <p:cNvPr id="6" name="ZoneTexte 5">
-            <a:extLst>
-              <a:ext uri="{FF2B5EF4-FFF2-40B4-BE49-F238E27FC236}">
-                <a16:creationId xmlns:a16="http://schemas.microsoft.com/office/drawing/2014/main" id="{153FB532-7213-8FF8-CB41-0087BE54D014}"/>
-              </a:ext>
-            </a:extLst>
-          </p:cNvPr>
-          <p:cNvSpPr txBox="1"/>
+      <p:pic>
+        <p:nvPicPr>
+          <p:cNvPr id="62" name="Image 61" descr="Une image contenant Graphique, logo, graphisme, Police&#10;&#10;Le contenu généré par l’IA peut être incorrect.">
+            <a:extLst>
+              <a:ext uri="{FF2B5EF4-FFF2-40B4-BE49-F238E27FC236}">
+                <a16:creationId xmlns:a16="http://schemas.microsoft.com/office/drawing/2014/main" id="{0B918F86-6419-987D-2DC1-AC272943EA74}"/>
+              </a:ext>
+            </a:extLst>
+          </p:cNvPr>
+          <p:cNvPicPr>
+            <a:picLocks noChangeAspect="1"/>
+          </p:cNvPicPr>
           <p:nvPr/>
-        </p:nvSpPr>
-        <p:spPr>
-          <a:xfrm>
-            <a:off x="7507042" y="1800520"/>
-            <a:ext cx="4446145" cy="3046988"/>
+        </p:nvPicPr>
+        <p:blipFill>
+          <a:blip r:embed="rId10"/>
+          <a:srcRect l="30906" t="24775" r="30861" b="29405"/>
+          <a:stretch/>
+        </p:blipFill>
+        <p:spPr>
+          <a:xfrm>
+            <a:off x="10479938" y="5315364"/>
+            <a:ext cx="761300" cy="528870"/>
           </a:xfrm>
           <a:prstGeom prst="rect">
             <a:avLst/>
           </a:prstGeom>
-          <a:noFill/>
-        </p:spPr>
-        <p:txBody>
-          <a:bodyPr wrap="square" rtlCol="0">
-            <a:spAutoFit/>
-          </a:bodyPr>
+        </p:spPr>
+      </p:pic>
+      <p:grpSp>
+        <p:nvGrpSpPr>
+          <p:cNvPr id="1031" name="Groupe 1030">
+            <a:extLst>
+              <a:ext uri="{FF2B5EF4-FFF2-40B4-BE49-F238E27FC236}">
+                <a16:creationId xmlns:a16="http://schemas.microsoft.com/office/drawing/2014/main" id="{F1ACA7CD-9F13-C5D5-6EEE-3B2AC43F7D1E}"/>
+              </a:ext>
+            </a:extLst>
+          </p:cNvPr>
+          <p:cNvGrpSpPr/>
+          <p:nvPr/>
+        </p:nvGrpSpPr>
+        <p:grpSpPr>
+          <a:xfrm>
+            <a:off x="260257" y="3852334"/>
+            <a:ext cx="2540637" cy="2555122"/>
+            <a:chOff x="254840" y="3817614"/>
+            <a:chExt cx="2540637" cy="2221360"/>
+          </a:xfrm>
+        </p:grpSpPr>
+        <p:sp>
+          <p:nvSpPr>
+            <p:cNvPr id="11" name="ZoneTexte 10">
+              <a:extLst>
+                <a:ext uri="{FF2B5EF4-FFF2-40B4-BE49-F238E27FC236}">
+                  <a16:creationId xmlns:a16="http://schemas.microsoft.com/office/drawing/2014/main" id="{D28FD3AB-B4F6-6899-709E-ABB8BD0594DC}"/>
+                </a:ext>
+              </a:extLst>
+            </p:cNvPr>
+            <p:cNvSpPr txBox="1"/>
+            <p:nvPr/>
+          </p:nvSpPr>
+          <p:spPr>
+            <a:xfrm>
+              <a:off x="254840" y="3817614"/>
+              <a:ext cx="2540637" cy="2221360"/>
+            </a:xfrm>
+            <a:prstGeom prst="rect">
+              <a:avLst/>
+            </a:prstGeom>
+            <a:ln w="41275" cap="rnd">
+              <a:round/>
+            </a:ln>
+          </p:spPr>
+          <p:style>
+            <a:lnRef idx="2">
+              <a:schemeClr val="accent5"/>
+            </a:lnRef>
+            <a:fillRef idx="1">
+              <a:schemeClr val="lt1"/>
+            </a:fillRef>
+            <a:effectRef idx="0">
+              <a:schemeClr val="accent5"/>
+            </a:effectRef>
+            <a:fontRef idx="minor">
+              <a:schemeClr val="dk1"/>
+            </a:fontRef>
+          </p:style>
+          <p:txBody>
+            <a:bodyPr wrap="square" rtlCol="0">
+              <a:noAutofit/>
+            </a:bodyPr>
+            <a:lstStyle/>
+            <a:p>
+              <a:pPr algn="ctr"/>
+              <a:r>
+                <a:rPr lang="fr-FR" b="1" dirty="0" err="1"/>
+                <a:t>Predict-Orchestrator</a:t>
+              </a:r>
+              <a:endParaRPr lang="fr-FR" b="1" dirty="0"/>
+            </a:p>
+          </p:txBody>
+        </p:sp>
+        <p:pic>
+          <p:nvPicPr>
+            <p:cNvPr id="63" name="Image 62" descr="Une image contenant symbole, Graphique, clipart, conception&#10;&#10;Le contenu généré par l’IA peut être incorrect.">
+              <a:extLst>
+                <a:ext uri="{FF2B5EF4-FFF2-40B4-BE49-F238E27FC236}">
+                  <a16:creationId xmlns:a16="http://schemas.microsoft.com/office/drawing/2014/main" id="{DADD4B36-B48F-A0F5-6639-9FB7B49ED5F8}"/>
+                </a:ext>
+              </a:extLst>
+            </p:cNvPr>
+            <p:cNvPicPr>
+              <a:picLocks noChangeAspect="1"/>
+            </p:cNvPicPr>
+            <p:nvPr/>
+          </p:nvPicPr>
+          <p:blipFill>
+            <a:blip r:embed="rId2"/>
+            <a:stretch>
+              <a:fillRect/>
+            </a:stretch>
+          </p:blipFill>
+          <p:spPr>
+            <a:xfrm>
+              <a:off x="2330186" y="5597924"/>
+              <a:ext cx="396649" cy="396649"/>
+            </a:xfrm>
+            <a:prstGeom prst="rect">
+              <a:avLst/>
+            </a:prstGeom>
+          </p:spPr>
+        </p:pic>
+      </p:grpSp>
+      <p:grpSp>
+        <p:nvGrpSpPr>
+          <p:cNvPr id="1024" name="Groupe 1023">
+            <a:extLst>
+              <a:ext uri="{FF2B5EF4-FFF2-40B4-BE49-F238E27FC236}">
+                <a16:creationId xmlns:a16="http://schemas.microsoft.com/office/drawing/2014/main" id="{774A0262-B086-9508-37E3-58C65BF5F52F}"/>
+              </a:ext>
+            </a:extLst>
+          </p:cNvPr>
+          <p:cNvGrpSpPr/>
+          <p:nvPr/>
+        </p:nvGrpSpPr>
+        <p:grpSpPr>
+          <a:xfrm>
+            <a:off x="0" y="1641336"/>
+            <a:ext cx="724750" cy="681771"/>
+            <a:chOff x="10255257" y="1070863"/>
+            <a:chExt cx="724750" cy="671329"/>
+          </a:xfrm>
+        </p:grpSpPr>
+        <p:cxnSp>
+          <p:nvCxnSpPr>
+            <p:cNvPr id="1025" name="Connecteur droit avec flèche 1024">
+              <a:extLst>
+                <a:ext uri="{FF2B5EF4-FFF2-40B4-BE49-F238E27FC236}">
+                  <a16:creationId xmlns:a16="http://schemas.microsoft.com/office/drawing/2014/main" id="{1379B3A3-9F69-C143-B8C2-7AB359A88BA4}"/>
+                </a:ext>
+              </a:extLst>
+            </p:cNvPr>
+            <p:cNvCxnSpPr>
+              <a:cxnSpLocks/>
+            </p:cNvCxnSpPr>
+            <p:nvPr/>
+          </p:nvCxnSpPr>
+          <p:spPr>
+            <a:xfrm>
+              <a:off x="10970698" y="1070863"/>
+              <a:ext cx="0" cy="671329"/>
+            </a:xfrm>
+            <a:prstGeom prst="straightConnector1">
+              <a:avLst/>
+            </a:prstGeom>
+            <a:ln w="19050" cap="flat" cmpd="sng" algn="ctr">
+              <a:solidFill>
+                <a:schemeClr val="accent5"/>
+              </a:solidFill>
+              <a:prstDash val="solid"/>
+              <a:round/>
+              <a:headEnd type="none" w="med" len="med"/>
+              <a:tailEnd type="arrow" w="med" len="med"/>
+            </a:ln>
+          </p:spPr>
+          <p:style>
+            <a:lnRef idx="0">
+              <a:scrgbClr r="0" g="0" b="0"/>
+            </a:lnRef>
+            <a:fillRef idx="0">
+              <a:scrgbClr r="0" g="0" b="0"/>
+            </a:fillRef>
+            <a:effectRef idx="0">
+              <a:scrgbClr r="0" g="0" b="0"/>
+            </a:effectRef>
+            <a:fontRef idx="minor">
+              <a:schemeClr val="tx1"/>
+            </a:fontRef>
+          </p:style>
+        </p:cxnSp>
+        <p:sp>
+          <p:nvSpPr>
+            <p:cNvPr id="1027" name="ZoneTexte 1026">
+              <a:extLst>
+                <a:ext uri="{FF2B5EF4-FFF2-40B4-BE49-F238E27FC236}">
+                  <a16:creationId xmlns:a16="http://schemas.microsoft.com/office/drawing/2014/main" id="{D5B2D1BB-96A2-75F1-CC6E-80C1466A356A}"/>
+                </a:ext>
+              </a:extLst>
+            </p:cNvPr>
+            <p:cNvSpPr txBox="1"/>
+            <p:nvPr/>
+          </p:nvSpPr>
+          <p:spPr>
+            <a:xfrm>
+              <a:off x="10255257" y="1153833"/>
+              <a:ext cx="724750" cy="303063"/>
+            </a:xfrm>
+            <a:prstGeom prst="rect">
+              <a:avLst/>
+            </a:prstGeom>
+            <a:noFill/>
+          </p:spPr>
+          <p:txBody>
+            <a:bodyPr wrap="none" rtlCol="0">
+              <a:spAutoFit/>
+            </a:bodyPr>
+            <a:lstStyle/>
+            <a:p>
+              <a:r>
+                <a:rPr lang="fr-FR" sz="1400" dirty="0" err="1"/>
+                <a:t>Predict</a:t>
+              </a:r>
+              <a:endParaRPr lang="fr-FR" sz="1400" dirty="0"/>
+            </a:p>
+          </p:txBody>
+        </p:sp>
+      </p:grpSp>
+      <p:grpSp>
+        <p:nvGrpSpPr>
+          <p:cNvPr id="1028" name="Groupe 1027">
+            <a:extLst>
+              <a:ext uri="{FF2B5EF4-FFF2-40B4-BE49-F238E27FC236}">
+                <a16:creationId xmlns:a16="http://schemas.microsoft.com/office/drawing/2014/main" id="{891E9047-C0F4-7C69-A9FC-848491828881}"/>
+              </a:ext>
+            </a:extLst>
+          </p:cNvPr>
+          <p:cNvGrpSpPr/>
+          <p:nvPr/>
+        </p:nvGrpSpPr>
+        <p:grpSpPr>
+          <a:xfrm>
+            <a:off x="2572389" y="1603220"/>
+            <a:ext cx="1358192" cy="681771"/>
+            <a:chOff x="10283338" y="1022096"/>
+            <a:chExt cx="1358192" cy="671329"/>
+          </a:xfrm>
+        </p:grpSpPr>
+        <p:cxnSp>
+          <p:nvCxnSpPr>
+            <p:cNvPr id="1029" name="Connecteur droit avec flèche 1028">
+              <a:extLst>
+                <a:ext uri="{FF2B5EF4-FFF2-40B4-BE49-F238E27FC236}">
+                  <a16:creationId xmlns:a16="http://schemas.microsoft.com/office/drawing/2014/main" id="{EA5DE9C4-48A1-9879-7DCE-ADFB9651F58B}"/>
+                </a:ext>
+              </a:extLst>
+            </p:cNvPr>
+            <p:cNvCxnSpPr>
+              <a:cxnSpLocks/>
+            </p:cNvCxnSpPr>
+            <p:nvPr/>
+          </p:nvCxnSpPr>
+          <p:spPr>
+            <a:xfrm>
+              <a:off x="10307639" y="1022096"/>
+              <a:ext cx="0" cy="671329"/>
+            </a:xfrm>
+            <a:prstGeom prst="straightConnector1">
+              <a:avLst/>
+            </a:prstGeom>
+            <a:ln w="19050" cap="flat" cmpd="sng" algn="ctr">
+              <a:solidFill>
+                <a:schemeClr val="accent5"/>
+              </a:solidFill>
+              <a:prstDash val="solid"/>
+              <a:round/>
+              <a:headEnd type="none" w="med" len="med"/>
+              <a:tailEnd type="arrow" w="med" len="med"/>
+            </a:ln>
+          </p:spPr>
+          <p:style>
+            <a:lnRef idx="0">
+              <a:scrgbClr r="0" g="0" b="0"/>
+            </a:lnRef>
+            <a:fillRef idx="0">
+              <a:scrgbClr r="0" g="0" b="0"/>
+            </a:fillRef>
+            <a:effectRef idx="0">
+              <a:scrgbClr r="0" g="0" b="0"/>
+            </a:effectRef>
+            <a:fontRef idx="minor">
+              <a:schemeClr val="tx1"/>
+            </a:fontRef>
+          </p:style>
+        </p:cxnSp>
+        <p:sp>
+          <p:nvSpPr>
+            <p:cNvPr id="1030" name="ZoneTexte 1029">
+              <a:extLst>
+                <a:ext uri="{FF2B5EF4-FFF2-40B4-BE49-F238E27FC236}">
+                  <a16:creationId xmlns:a16="http://schemas.microsoft.com/office/drawing/2014/main" id="{C7371DA0-7E80-0DD8-CBF5-D7A4941FC171}"/>
+                </a:ext>
+              </a:extLst>
+            </p:cNvPr>
+            <p:cNvSpPr txBox="1"/>
+            <p:nvPr/>
+          </p:nvSpPr>
+          <p:spPr>
+            <a:xfrm>
+              <a:off x="10283338" y="1160098"/>
+              <a:ext cx="1358192" cy="515206"/>
+            </a:xfrm>
+            <a:prstGeom prst="rect">
+              <a:avLst/>
+            </a:prstGeom>
+            <a:noFill/>
+          </p:spPr>
+          <p:txBody>
+            <a:bodyPr wrap="none" rtlCol="0">
+              <a:spAutoFit/>
+            </a:bodyPr>
+            <a:lstStyle/>
+            <a:p>
+              <a:r>
+                <a:rPr lang="fr-FR" sz="1400" dirty="0"/>
+                <a:t>User Feedback </a:t>
+              </a:r>
+            </a:p>
+            <a:p>
+              <a:r>
+                <a:rPr lang="fr-FR" sz="1400" dirty="0"/>
+                <a:t>on </a:t>
+              </a:r>
+              <a:r>
+                <a:rPr lang="fr-FR" sz="1400" dirty="0" err="1"/>
+                <a:t>predictions</a:t>
+              </a:r>
+              <a:endParaRPr lang="fr-FR" sz="1400" dirty="0"/>
+            </a:p>
+          </p:txBody>
+        </p:sp>
+      </p:grpSp>
+      <p:sp>
+        <p:nvSpPr>
+          <p:cNvPr id="1032" name="Flèche : bas 1031">
+            <a:extLst>
+              <a:ext uri="{FF2B5EF4-FFF2-40B4-BE49-F238E27FC236}">
+                <a16:creationId xmlns:a16="http://schemas.microsoft.com/office/drawing/2014/main" id="{05D8F4CE-62A9-9553-96D5-2EA39DD8511B}"/>
+              </a:ext>
+            </a:extLst>
+          </p:cNvPr>
+          <p:cNvSpPr/>
+          <p:nvPr/>
+        </p:nvSpPr>
+        <p:spPr>
+          <a:xfrm rot="16200000">
+            <a:off x="6219352" y="4734866"/>
+            <a:ext cx="271417" cy="2617614"/>
+          </a:xfrm>
+          <a:prstGeom prst="downArrow">
+            <a:avLst/>
+          </a:prstGeom>
+          <a:solidFill>
+            <a:schemeClr val="accent2">
+              <a:lumMod val="60000"/>
+              <a:lumOff val="40000"/>
+            </a:schemeClr>
+          </a:solidFill>
+          <a:ln>
+            <a:solidFill>
+              <a:schemeClr val="tx1"/>
+            </a:solidFill>
+          </a:ln>
+        </p:spPr>
+        <p:style>
+          <a:lnRef idx="2">
+            <a:schemeClr val="accent1">
+              <a:shade val="15000"/>
+            </a:schemeClr>
+          </a:lnRef>
+          <a:fillRef idx="1">
+            <a:schemeClr val="accent1"/>
+          </a:fillRef>
+          <a:effectRef idx="0">
+            <a:schemeClr val="accent1"/>
+          </a:effectRef>
+          <a:fontRef idx="minor">
+            <a:schemeClr val="lt1"/>
+          </a:fontRef>
+        </p:style>
+        <p:txBody>
+          <a:bodyPr rtlCol="0" anchor="ctr"/>
           <a:lstStyle/>
           <a:p>
-            <a:r>
-              <a:rPr lang="fr-FR" sz="3200" dirty="0"/>
-              <a:t>Reprendre ce schéma et le simplifier !</a:t>
-            </a:r>
-          </a:p>
-          <a:p>
-            <a:endParaRPr lang="fr-FR" sz="3200" dirty="0"/>
-          </a:p>
-          <a:p>
-            <a:r>
-              <a:rPr lang="fr-FR" sz="3200" dirty="0"/>
-              <a:t>En lien avec les autres Schéma</a:t>
-            </a:r>
-          </a:p>
-          <a:p>
-            <a:endParaRPr lang="fr-FR" sz="3200" dirty="0"/>
-          </a:p>
-        </p:txBody>
-      </p:sp>
+            <a:endParaRPr lang="fr-FR" dirty="0"/>
+          </a:p>
+        </p:txBody>
+      </p:sp>
+      <p:cxnSp>
+        <p:nvCxnSpPr>
+          <p:cNvPr id="1033" name="Connecteur droit avec flèche 1032">
+            <a:extLst>
+              <a:ext uri="{FF2B5EF4-FFF2-40B4-BE49-F238E27FC236}">
+                <a16:creationId xmlns:a16="http://schemas.microsoft.com/office/drawing/2014/main" id="{30EB4D49-5553-B307-52FC-7FFED133F56F}"/>
+              </a:ext>
+            </a:extLst>
+          </p:cNvPr>
+          <p:cNvCxnSpPr>
+            <a:cxnSpLocks/>
+          </p:cNvCxnSpPr>
+          <p:nvPr/>
+        </p:nvCxnSpPr>
+        <p:spPr>
+          <a:xfrm>
+            <a:off x="1565311" y="3374532"/>
+            <a:ext cx="0" cy="457242"/>
+          </a:xfrm>
+          <a:prstGeom prst="straightConnector1">
+            <a:avLst/>
+          </a:prstGeom>
+          <a:ln w="41275" cap="flat" cmpd="sng" algn="ctr">
+            <a:solidFill>
+              <a:schemeClr val="accent5"/>
+            </a:solidFill>
+            <a:prstDash val="solid"/>
+            <a:round/>
+            <a:headEnd type="arrow" w="med" len="med"/>
+            <a:tailEnd type="arrow" w="med" len="med"/>
+          </a:ln>
+        </p:spPr>
+        <p:style>
+          <a:lnRef idx="0">
+            <a:scrgbClr r="0" g="0" b="0"/>
+          </a:lnRef>
+          <a:fillRef idx="0">
+            <a:scrgbClr r="0" g="0" b="0"/>
+          </a:fillRef>
+          <a:effectRef idx="0">
+            <a:scrgbClr r="0" g="0" b="0"/>
+          </a:effectRef>
+          <a:fontRef idx="minor">
+            <a:schemeClr val="tx1"/>
+          </a:fontRef>
+        </p:style>
+      </p:cxnSp>
+      <p:grpSp>
+        <p:nvGrpSpPr>
+          <p:cNvPr id="1041" name="Groupe 1040">
+            <a:extLst>
+              <a:ext uri="{FF2B5EF4-FFF2-40B4-BE49-F238E27FC236}">
+                <a16:creationId xmlns:a16="http://schemas.microsoft.com/office/drawing/2014/main" id="{69B6AE4B-9B5B-166A-16DE-5D6934ECC870}"/>
+              </a:ext>
+            </a:extLst>
+          </p:cNvPr>
+          <p:cNvGrpSpPr/>
+          <p:nvPr/>
+        </p:nvGrpSpPr>
+        <p:grpSpPr>
+          <a:xfrm>
+            <a:off x="1343228" y="678618"/>
+            <a:ext cx="1560229" cy="924560"/>
+            <a:chOff x="1229245" y="830438"/>
+            <a:chExt cx="1560229" cy="924560"/>
+          </a:xfrm>
+        </p:grpSpPr>
+        <p:pic>
+          <p:nvPicPr>
+            <p:cNvPr id="1036" name="Graphique 1035" descr="Homme avec un remplissage uni">
+              <a:extLst>
+                <a:ext uri="{FF2B5EF4-FFF2-40B4-BE49-F238E27FC236}">
+                  <a16:creationId xmlns:a16="http://schemas.microsoft.com/office/drawing/2014/main" id="{9E31BB70-D89F-59DF-5DCE-ADCF2F6C29BF}"/>
+                </a:ext>
+              </a:extLst>
+            </p:cNvPr>
+            <p:cNvPicPr>
+              <a:picLocks noChangeAspect="1"/>
+            </p:cNvPicPr>
+            <p:nvPr/>
+          </p:nvPicPr>
+          <p:blipFill>
+            <a:blip r:embed="rId11">
+              <a:extLst>
+                <a:ext uri="{96DAC541-7B7A-43D3-8B79-37D633B846F1}">
+                  <asvg:svgBlip xmlns:asvg="http://schemas.microsoft.com/office/drawing/2016/SVG/main" r:embed="rId12"/>
+                </a:ext>
+              </a:extLst>
+            </a:blip>
+            <a:stretch>
+              <a:fillRect/>
+            </a:stretch>
+          </p:blipFill>
+          <p:spPr>
+            <a:xfrm>
+              <a:off x="1229245" y="830438"/>
+              <a:ext cx="914400" cy="914400"/>
+            </a:xfrm>
+            <a:prstGeom prst="rect">
+              <a:avLst/>
+            </a:prstGeom>
+          </p:spPr>
+        </p:pic>
+        <p:sp>
+          <p:nvSpPr>
+            <p:cNvPr id="1038" name="ZoneTexte 1037">
+              <a:extLst>
+                <a:ext uri="{FF2B5EF4-FFF2-40B4-BE49-F238E27FC236}">
+                  <a16:creationId xmlns:a16="http://schemas.microsoft.com/office/drawing/2014/main" id="{6B11DF8A-1170-DEEB-BA3B-9B17BB7F10C0}"/>
+                </a:ext>
+              </a:extLst>
+            </p:cNvPr>
+            <p:cNvSpPr txBox="1"/>
+            <p:nvPr/>
+          </p:nvSpPr>
+          <p:spPr>
+            <a:xfrm>
+              <a:off x="1941749" y="1385666"/>
+              <a:ext cx="847725" cy="369332"/>
+            </a:xfrm>
+            <a:prstGeom prst="rect">
+              <a:avLst/>
+            </a:prstGeom>
+            <a:noFill/>
+          </p:spPr>
+          <p:txBody>
+            <a:bodyPr wrap="square" rtlCol="0">
+              <a:spAutoFit/>
+            </a:bodyPr>
+            <a:lstStyle/>
+            <a:p>
+              <a:r>
+                <a:rPr lang="fr-FR" dirty="0"/>
+                <a:t>USER</a:t>
+              </a:r>
+            </a:p>
+          </p:txBody>
+        </p:sp>
+      </p:grpSp>
+      <p:grpSp>
+        <p:nvGrpSpPr>
+          <p:cNvPr id="1040" name="Groupe 1039">
+            <a:extLst>
+              <a:ext uri="{FF2B5EF4-FFF2-40B4-BE49-F238E27FC236}">
+                <a16:creationId xmlns:a16="http://schemas.microsoft.com/office/drawing/2014/main" id="{18BD7121-265D-C343-6C5D-8734BAB244F6}"/>
+              </a:ext>
+            </a:extLst>
+          </p:cNvPr>
+          <p:cNvGrpSpPr/>
+          <p:nvPr/>
+        </p:nvGrpSpPr>
+        <p:grpSpPr>
+          <a:xfrm>
+            <a:off x="5748969" y="678618"/>
+            <a:ext cx="1914898" cy="914400"/>
+            <a:chOff x="8631844" y="767946"/>
+            <a:chExt cx="1914898" cy="914400"/>
+          </a:xfrm>
+        </p:grpSpPr>
+        <p:pic>
+          <p:nvPicPr>
+            <p:cNvPr id="1037" name="Graphique 1036" descr="Homme avec un remplissage uni">
+              <a:extLst>
+                <a:ext uri="{FF2B5EF4-FFF2-40B4-BE49-F238E27FC236}">
+                  <a16:creationId xmlns:a16="http://schemas.microsoft.com/office/drawing/2014/main" id="{B7F8C394-8C9D-4C77-7EB2-3F8E1C485514}"/>
+                </a:ext>
+              </a:extLst>
+            </p:cNvPr>
+            <p:cNvPicPr>
+              <a:picLocks noChangeAspect="1"/>
+            </p:cNvPicPr>
+            <p:nvPr/>
+          </p:nvPicPr>
+          <p:blipFill>
+            <a:blip r:embed="rId11">
+              <a:extLst>
+                <a:ext uri="{96DAC541-7B7A-43D3-8B79-37D633B846F1}">
+                  <asvg:svgBlip xmlns:asvg="http://schemas.microsoft.com/office/drawing/2016/SVG/main" r:embed="rId12"/>
+                </a:ext>
+              </a:extLst>
+            </a:blip>
+            <a:stretch>
+              <a:fillRect/>
+            </a:stretch>
+          </p:blipFill>
+          <p:spPr>
+            <a:xfrm>
+              <a:off x="8631844" y="767946"/>
+              <a:ext cx="914400" cy="914400"/>
+            </a:xfrm>
+            <a:prstGeom prst="rect">
+              <a:avLst/>
+            </a:prstGeom>
+          </p:spPr>
+        </p:pic>
+        <p:sp>
+          <p:nvSpPr>
+            <p:cNvPr id="1039" name="ZoneTexte 1038">
+              <a:extLst>
+                <a:ext uri="{FF2B5EF4-FFF2-40B4-BE49-F238E27FC236}">
+                  <a16:creationId xmlns:a16="http://schemas.microsoft.com/office/drawing/2014/main" id="{4562AE50-ADEF-47FB-6EBC-A89A67964736}"/>
+                </a:ext>
+              </a:extLst>
+            </p:cNvPr>
+            <p:cNvSpPr txBox="1"/>
+            <p:nvPr/>
+          </p:nvSpPr>
+          <p:spPr>
+            <a:xfrm>
+              <a:off x="9301276" y="1304309"/>
+              <a:ext cx="1245466" cy="369332"/>
+            </a:xfrm>
+            <a:prstGeom prst="rect">
+              <a:avLst/>
+            </a:prstGeom>
+            <a:noFill/>
+          </p:spPr>
+          <p:txBody>
+            <a:bodyPr wrap="square" rtlCol="0">
+              <a:spAutoFit/>
+            </a:bodyPr>
+            <a:lstStyle/>
+            <a:p>
+              <a:r>
+                <a:rPr lang="fr-FR" b="1" dirty="0"/>
+                <a:t>ADMIN</a:t>
+              </a:r>
+            </a:p>
+          </p:txBody>
+        </p:sp>
+      </p:grpSp>
+      <p:cxnSp>
+        <p:nvCxnSpPr>
+          <p:cNvPr id="1042" name="Connecteur droit avec flèche 1041">
+            <a:extLst>
+              <a:ext uri="{FF2B5EF4-FFF2-40B4-BE49-F238E27FC236}">
+                <a16:creationId xmlns:a16="http://schemas.microsoft.com/office/drawing/2014/main" id="{CE627F2C-501C-4B97-2566-B7523E694D3A}"/>
+              </a:ext>
+            </a:extLst>
+          </p:cNvPr>
+          <p:cNvCxnSpPr>
+            <a:cxnSpLocks/>
+          </p:cNvCxnSpPr>
+          <p:nvPr/>
+        </p:nvCxnSpPr>
+        <p:spPr>
+          <a:xfrm>
+            <a:off x="9907906" y="3384368"/>
+            <a:ext cx="0" cy="457242"/>
+          </a:xfrm>
+          <a:prstGeom prst="straightConnector1">
+            <a:avLst/>
+          </a:prstGeom>
+          <a:ln w="41275" cap="flat" cmpd="sng" algn="ctr">
+            <a:solidFill>
+              <a:schemeClr val="accent5"/>
+            </a:solidFill>
+            <a:prstDash val="solid"/>
+            <a:round/>
+            <a:headEnd type="arrow" w="med" len="med"/>
+            <a:tailEnd type="arrow" w="med" len="med"/>
+          </a:ln>
+        </p:spPr>
+        <p:style>
+          <a:lnRef idx="0">
+            <a:scrgbClr r="0" g="0" b="0"/>
+          </a:lnRef>
+          <a:fillRef idx="0">
+            <a:scrgbClr r="0" g="0" b="0"/>
+          </a:fillRef>
+          <a:effectRef idx="0">
+            <a:scrgbClr r="0" g="0" b="0"/>
+          </a:effectRef>
+          <a:fontRef idx="minor">
+            <a:schemeClr val="tx1"/>
+          </a:fontRef>
+        </p:style>
+      </p:cxnSp>
+      <p:grpSp>
+        <p:nvGrpSpPr>
+          <p:cNvPr id="1050" name="Groupe 1049">
+            <a:extLst>
+              <a:ext uri="{FF2B5EF4-FFF2-40B4-BE49-F238E27FC236}">
+                <a16:creationId xmlns:a16="http://schemas.microsoft.com/office/drawing/2014/main" id="{08A892BF-C9B0-83BC-C160-6F15DFA945A9}"/>
+              </a:ext>
+            </a:extLst>
+          </p:cNvPr>
+          <p:cNvGrpSpPr/>
+          <p:nvPr/>
+        </p:nvGrpSpPr>
+        <p:grpSpPr>
+          <a:xfrm>
+            <a:off x="5266720" y="2342971"/>
+            <a:ext cx="1939528" cy="999802"/>
+            <a:chOff x="5051560" y="1657093"/>
+            <a:chExt cx="1939528" cy="999802"/>
+          </a:xfrm>
+        </p:grpSpPr>
+        <p:grpSp>
+          <p:nvGrpSpPr>
+            <p:cNvPr id="1044" name="Groupe 1043">
+              <a:extLst>
+                <a:ext uri="{FF2B5EF4-FFF2-40B4-BE49-F238E27FC236}">
+                  <a16:creationId xmlns:a16="http://schemas.microsoft.com/office/drawing/2014/main" id="{D8BA9A28-6571-0195-9D48-AA8CEF758A8C}"/>
+                </a:ext>
+              </a:extLst>
+            </p:cNvPr>
+            <p:cNvGrpSpPr/>
+            <p:nvPr/>
+          </p:nvGrpSpPr>
+          <p:grpSpPr>
+            <a:xfrm>
+              <a:off x="5051560" y="1657093"/>
+              <a:ext cx="1939528" cy="999802"/>
+              <a:chOff x="3263531" y="1280755"/>
+              <a:chExt cx="1897051" cy="999802"/>
+            </a:xfrm>
+          </p:grpSpPr>
+          <p:sp>
+            <p:nvSpPr>
+              <p:cNvPr id="1046" name="ZoneTexte 1045">
+                <a:extLst>
+                  <a:ext uri="{FF2B5EF4-FFF2-40B4-BE49-F238E27FC236}">
+                    <a16:creationId xmlns:a16="http://schemas.microsoft.com/office/drawing/2014/main" id="{B05E03BE-5E41-0D93-632F-5A86B6CC2E51}"/>
+                  </a:ext>
+                </a:extLst>
+              </p:cNvPr>
+              <p:cNvSpPr txBox="1"/>
+              <p:nvPr/>
+            </p:nvSpPr>
+            <p:spPr>
+              <a:xfrm>
+                <a:off x="3263531" y="1280755"/>
+                <a:ext cx="1897051" cy="999802"/>
+              </a:xfrm>
+              <a:prstGeom prst="rect">
+                <a:avLst/>
+              </a:prstGeom>
+              <a:ln w="41275" cap="rnd">
+                <a:round/>
+              </a:ln>
+            </p:spPr>
+            <p:style>
+              <a:lnRef idx="2">
+                <a:schemeClr val="accent5"/>
+              </a:lnRef>
+              <a:fillRef idx="1">
+                <a:schemeClr val="lt1"/>
+              </a:fillRef>
+              <a:effectRef idx="0">
+                <a:schemeClr val="accent5"/>
+              </a:effectRef>
+              <a:fontRef idx="minor">
+                <a:schemeClr val="dk1"/>
+              </a:fontRef>
+            </p:style>
+            <p:txBody>
+              <a:bodyPr wrap="square" rtlCol="0">
+                <a:noAutofit/>
+              </a:bodyPr>
+              <a:lstStyle/>
+              <a:p>
+                <a:pPr algn="ctr"/>
+                <a:r>
+                  <a:rPr lang="fr-FR" b="1" dirty="0"/>
+                  <a:t>ADMIN-</a:t>
+                </a:r>
+                <a:r>
+                  <a:rPr lang="fr-FR" b="1" dirty="0" err="1"/>
+                  <a:t>Grafana</a:t>
+                </a:r>
+                <a:endParaRPr lang="fr-FR" b="1" dirty="0"/>
+              </a:p>
+            </p:txBody>
+          </p:sp>
+          <p:pic>
+            <p:nvPicPr>
+              <p:cNvPr id="1047" name="Image 1046" descr="Une image contenant symbole, Graphique, clipart, conception&#10;&#10;Le contenu généré par l’IA peut être incorrect.">
+                <a:extLst>
+                  <a:ext uri="{FF2B5EF4-FFF2-40B4-BE49-F238E27FC236}">
+                    <a16:creationId xmlns:a16="http://schemas.microsoft.com/office/drawing/2014/main" id="{7D087127-EEA5-06D3-35E1-79B70C918A29}"/>
+                  </a:ext>
+                </a:extLst>
+              </p:cNvPr>
+              <p:cNvPicPr>
+                <a:picLocks noChangeAspect="1"/>
+              </p:cNvPicPr>
+              <p:nvPr/>
+            </p:nvPicPr>
+            <p:blipFill>
+              <a:blip r:embed="rId2"/>
+              <a:stretch>
+                <a:fillRect/>
+              </a:stretch>
+            </p:blipFill>
+            <p:spPr>
+              <a:xfrm>
+                <a:off x="4719304" y="1877634"/>
+                <a:ext cx="396649" cy="396649"/>
+              </a:xfrm>
+              <a:prstGeom prst="rect">
+                <a:avLst/>
+              </a:prstGeom>
+            </p:spPr>
+          </p:pic>
+        </p:grpSp>
+        <p:pic>
+          <p:nvPicPr>
+            <p:cNvPr id="1049" name="Image 1048" descr="Une image contenant Graphique, graphisme, Police, clipart&#10;&#10;Le contenu généré par l’IA peut être incorrect.">
+              <a:extLst>
+                <a:ext uri="{FF2B5EF4-FFF2-40B4-BE49-F238E27FC236}">
+                  <a16:creationId xmlns:a16="http://schemas.microsoft.com/office/drawing/2014/main" id="{C40D1A2E-1A0B-472C-C3E9-3C5162569B2F}"/>
+                </a:ext>
+              </a:extLst>
+            </p:cNvPr>
+            <p:cNvPicPr>
+              <a:picLocks noChangeAspect="1"/>
+            </p:cNvPicPr>
+            <p:nvPr/>
+          </p:nvPicPr>
+          <p:blipFill>
+            <a:blip r:embed="rId13"/>
+            <a:stretch>
+              <a:fillRect/>
+            </a:stretch>
+          </p:blipFill>
+          <p:spPr>
+            <a:xfrm>
+              <a:off x="5737676" y="2049211"/>
+              <a:ext cx="512613" cy="524147"/>
+            </a:xfrm>
+            <a:prstGeom prst="rect">
+              <a:avLst/>
+            </a:prstGeom>
+          </p:spPr>
+        </p:pic>
+      </p:grpSp>
+      <p:grpSp>
+        <p:nvGrpSpPr>
+          <p:cNvPr id="1053" name="Groupe 1052">
+            <a:extLst>
+              <a:ext uri="{FF2B5EF4-FFF2-40B4-BE49-F238E27FC236}">
+                <a16:creationId xmlns:a16="http://schemas.microsoft.com/office/drawing/2014/main" id="{F3FD2707-D669-5F18-3460-88FC81F0CE9C}"/>
+              </a:ext>
+            </a:extLst>
+          </p:cNvPr>
+          <p:cNvGrpSpPr/>
+          <p:nvPr/>
+        </p:nvGrpSpPr>
+        <p:grpSpPr>
+          <a:xfrm>
+            <a:off x="6114370" y="1637672"/>
+            <a:ext cx="788549" cy="705823"/>
+            <a:chOff x="10257940" y="1022096"/>
+            <a:chExt cx="788549" cy="671329"/>
+          </a:xfrm>
+        </p:grpSpPr>
+        <p:cxnSp>
+          <p:nvCxnSpPr>
+            <p:cNvPr id="1054" name="Connecteur droit avec flèche 1053">
+              <a:extLst>
+                <a:ext uri="{FF2B5EF4-FFF2-40B4-BE49-F238E27FC236}">
+                  <a16:creationId xmlns:a16="http://schemas.microsoft.com/office/drawing/2014/main" id="{87CA9558-C1F3-2DA1-78AB-45E50ABBC30F}"/>
+                </a:ext>
+              </a:extLst>
+            </p:cNvPr>
+            <p:cNvCxnSpPr>
+              <a:cxnSpLocks/>
+            </p:cNvCxnSpPr>
+            <p:nvPr/>
+          </p:nvCxnSpPr>
+          <p:spPr>
+            <a:xfrm>
+              <a:off x="10307639" y="1022096"/>
+              <a:ext cx="0" cy="671329"/>
+            </a:xfrm>
+            <a:prstGeom prst="straightConnector1">
+              <a:avLst/>
+            </a:prstGeom>
+            <a:ln w="19050" cap="flat" cmpd="sng" algn="ctr">
+              <a:solidFill>
+                <a:schemeClr val="accent5"/>
+              </a:solidFill>
+              <a:prstDash val="solid"/>
+              <a:round/>
+              <a:headEnd type="none" w="med" len="med"/>
+              <a:tailEnd type="arrow" w="med" len="med"/>
+            </a:ln>
+          </p:spPr>
+          <p:style>
+            <a:lnRef idx="0">
+              <a:scrgbClr r="0" g="0" b="0"/>
+            </a:lnRef>
+            <a:fillRef idx="0">
+              <a:scrgbClr r="0" g="0" b="0"/>
+            </a:fillRef>
+            <a:effectRef idx="0">
+              <a:scrgbClr r="0" g="0" b="0"/>
+            </a:effectRef>
+            <a:fontRef idx="minor">
+              <a:schemeClr val="tx1"/>
+            </a:fontRef>
+          </p:style>
+        </p:cxnSp>
+        <p:sp>
+          <p:nvSpPr>
+            <p:cNvPr id="1055" name="ZoneTexte 1054">
+              <a:extLst>
+                <a:ext uri="{FF2B5EF4-FFF2-40B4-BE49-F238E27FC236}">
+                  <a16:creationId xmlns:a16="http://schemas.microsoft.com/office/drawing/2014/main" id="{437513F7-B020-EE0D-FC62-325F62114269}"/>
+                </a:ext>
+              </a:extLst>
+            </p:cNvPr>
+            <p:cNvSpPr txBox="1"/>
+            <p:nvPr/>
+          </p:nvSpPr>
+          <p:spPr>
+            <a:xfrm>
+              <a:off x="10257940" y="1156538"/>
+              <a:ext cx="788549" cy="307777"/>
+            </a:xfrm>
+            <a:prstGeom prst="rect">
+              <a:avLst/>
+            </a:prstGeom>
+            <a:noFill/>
+          </p:spPr>
+          <p:txBody>
+            <a:bodyPr wrap="none" rtlCol="0">
+              <a:spAutoFit/>
+            </a:bodyPr>
+            <a:lstStyle/>
+            <a:p>
+              <a:r>
+                <a:rPr lang="fr-FR" sz="1400" dirty="0"/>
+                <a:t>Monitor</a:t>
+              </a:r>
+            </a:p>
+          </p:txBody>
+        </p:sp>
+      </p:grpSp>
+      <p:grpSp>
+        <p:nvGrpSpPr>
+          <p:cNvPr id="1056" name="Groupe 1055">
+            <a:extLst>
+              <a:ext uri="{FF2B5EF4-FFF2-40B4-BE49-F238E27FC236}">
+                <a16:creationId xmlns:a16="http://schemas.microsoft.com/office/drawing/2014/main" id="{DD082217-C311-0AD0-6BA3-21B33E4D28B3}"/>
+              </a:ext>
+            </a:extLst>
+          </p:cNvPr>
+          <p:cNvGrpSpPr/>
+          <p:nvPr/>
+        </p:nvGrpSpPr>
+        <p:grpSpPr>
+          <a:xfrm>
+            <a:off x="279144" y="735044"/>
+            <a:ext cx="836191" cy="943922"/>
+            <a:chOff x="370749" y="3635157"/>
+            <a:chExt cx="836191" cy="943922"/>
+          </a:xfrm>
+        </p:grpSpPr>
+        <p:pic>
+          <p:nvPicPr>
+            <p:cNvPr id="1057" name="Graphique 1056" descr="Base de données avec un remplissage uni">
+              <a:extLst>
+                <a:ext uri="{FF2B5EF4-FFF2-40B4-BE49-F238E27FC236}">
+                  <a16:creationId xmlns:a16="http://schemas.microsoft.com/office/drawing/2014/main" id="{F546EFFA-FA39-650B-A66A-852A46E9F879}"/>
+                </a:ext>
+              </a:extLst>
+            </p:cNvPr>
+            <p:cNvPicPr>
+              <a:picLocks noChangeAspect="1"/>
+            </p:cNvPicPr>
+            <p:nvPr/>
+          </p:nvPicPr>
+          <p:blipFill>
+            <a:blip r:embed="rId7">
+              <a:extLst>
+                <a:ext uri="{96DAC541-7B7A-43D3-8B79-37D633B846F1}">
+                  <asvg:svgBlip xmlns:asvg="http://schemas.microsoft.com/office/drawing/2016/SVG/main" r:embed="rId8"/>
+                </a:ext>
+              </a:extLst>
+            </a:blip>
+            <a:stretch>
+              <a:fillRect/>
+            </a:stretch>
+          </p:blipFill>
+          <p:spPr>
+            <a:xfrm>
+              <a:off x="395662" y="3856926"/>
+              <a:ext cx="722153" cy="722153"/>
+            </a:xfrm>
+            <a:prstGeom prst="rect">
+              <a:avLst/>
+            </a:prstGeom>
+          </p:spPr>
+        </p:pic>
+        <p:sp>
+          <p:nvSpPr>
+            <p:cNvPr id="1058" name="ZoneTexte 1057">
+              <a:extLst>
+                <a:ext uri="{FF2B5EF4-FFF2-40B4-BE49-F238E27FC236}">
+                  <a16:creationId xmlns:a16="http://schemas.microsoft.com/office/drawing/2014/main" id="{ACFB823E-9F7B-C7FB-F084-8563D3481E14}"/>
+                </a:ext>
+              </a:extLst>
+            </p:cNvPr>
+            <p:cNvSpPr txBox="1"/>
+            <p:nvPr/>
+          </p:nvSpPr>
+          <p:spPr>
+            <a:xfrm>
+              <a:off x="370749" y="3635157"/>
+              <a:ext cx="836191" cy="338554"/>
+            </a:xfrm>
+            <a:prstGeom prst="rect">
+              <a:avLst/>
+            </a:prstGeom>
+            <a:noFill/>
+          </p:spPr>
+          <p:txBody>
+            <a:bodyPr wrap="none" rtlCol="0">
+              <a:spAutoFit/>
+            </a:bodyPr>
+            <a:lstStyle/>
+            <a:p>
+              <a:r>
+                <a:rPr lang="fr-FR" sz="1600" dirty="0">
+                  <a:solidFill>
+                    <a:schemeClr val="accent6">
+                      <a:lumMod val="75000"/>
+                    </a:schemeClr>
+                  </a:solidFill>
+                </a:rPr>
+                <a:t>Images</a:t>
+              </a:r>
+            </a:p>
+          </p:txBody>
+        </p:sp>
+      </p:grpSp>
+      <p:grpSp>
+        <p:nvGrpSpPr>
+          <p:cNvPr id="1059" name="Groupe 1058">
+            <a:extLst>
+              <a:ext uri="{FF2B5EF4-FFF2-40B4-BE49-F238E27FC236}">
+                <a16:creationId xmlns:a16="http://schemas.microsoft.com/office/drawing/2014/main" id="{A6B0F6F7-D56D-CF9F-47AD-E284F3CED3BF}"/>
+              </a:ext>
+            </a:extLst>
+          </p:cNvPr>
+          <p:cNvGrpSpPr/>
+          <p:nvPr/>
+        </p:nvGrpSpPr>
+        <p:grpSpPr>
+          <a:xfrm>
+            <a:off x="8475181" y="726936"/>
+            <a:ext cx="1914898" cy="914400"/>
+            <a:chOff x="8631844" y="767946"/>
+            <a:chExt cx="1914898" cy="914400"/>
+          </a:xfrm>
+        </p:grpSpPr>
+        <p:pic>
+          <p:nvPicPr>
+            <p:cNvPr id="1060" name="Graphique 1059" descr="Homme avec un remplissage uni">
+              <a:extLst>
+                <a:ext uri="{FF2B5EF4-FFF2-40B4-BE49-F238E27FC236}">
+                  <a16:creationId xmlns:a16="http://schemas.microsoft.com/office/drawing/2014/main" id="{ECDD4F71-D824-D7DF-E6F1-235A531D2658}"/>
+                </a:ext>
+              </a:extLst>
+            </p:cNvPr>
+            <p:cNvPicPr>
+              <a:picLocks noChangeAspect="1"/>
+            </p:cNvPicPr>
+            <p:nvPr/>
+          </p:nvPicPr>
+          <p:blipFill>
+            <a:blip r:embed="rId11">
+              <a:extLst>
+                <a:ext uri="{96DAC541-7B7A-43D3-8B79-37D633B846F1}">
+                  <asvg:svgBlip xmlns:asvg="http://schemas.microsoft.com/office/drawing/2016/SVG/main" r:embed="rId12"/>
+                </a:ext>
+              </a:extLst>
+            </a:blip>
+            <a:stretch>
+              <a:fillRect/>
+            </a:stretch>
+          </p:blipFill>
+          <p:spPr>
+            <a:xfrm>
+              <a:off x="8631844" y="767946"/>
+              <a:ext cx="914400" cy="914400"/>
+            </a:xfrm>
+            <a:prstGeom prst="rect">
+              <a:avLst/>
+            </a:prstGeom>
+          </p:spPr>
+        </p:pic>
+        <p:sp>
+          <p:nvSpPr>
+            <p:cNvPr id="1061" name="ZoneTexte 1060">
+              <a:extLst>
+                <a:ext uri="{FF2B5EF4-FFF2-40B4-BE49-F238E27FC236}">
+                  <a16:creationId xmlns:a16="http://schemas.microsoft.com/office/drawing/2014/main" id="{9D219B32-3DD1-000F-E0A1-AF77DCC55AE2}"/>
+                </a:ext>
+              </a:extLst>
+            </p:cNvPr>
+            <p:cNvSpPr txBox="1"/>
+            <p:nvPr/>
+          </p:nvSpPr>
+          <p:spPr>
+            <a:xfrm>
+              <a:off x="9301276" y="1304309"/>
+              <a:ext cx="1245466" cy="369332"/>
+            </a:xfrm>
+            <a:prstGeom prst="rect">
+              <a:avLst/>
+            </a:prstGeom>
+            <a:noFill/>
+          </p:spPr>
+          <p:txBody>
+            <a:bodyPr wrap="square" rtlCol="0">
+              <a:spAutoFit/>
+            </a:bodyPr>
+            <a:lstStyle/>
+            <a:p>
+              <a:r>
+                <a:rPr lang="fr-FR" b="1" dirty="0"/>
+                <a:t>ADMIN</a:t>
+              </a:r>
+            </a:p>
+          </p:txBody>
+        </p:sp>
+      </p:grpSp>
+      <p:grpSp>
+        <p:nvGrpSpPr>
+          <p:cNvPr id="1067" name="Groupe 1066">
+            <a:extLst>
+              <a:ext uri="{FF2B5EF4-FFF2-40B4-BE49-F238E27FC236}">
+                <a16:creationId xmlns:a16="http://schemas.microsoft.com/office/drawing/2014/main" id="{6E42FDA4-E0CB-18CB-8C90-D0F8E0D9FE13}"/>
+              </a:ext>
+            </a:extLst>
+          </p:cNvPr>
+          <p:cNvGrpSpPr/>
+          <p:nvPr/>
+        </p:nvGrpSpPr>
+        <p:grpSpPr>
+          <a:xfrm>
+            <a:off x="1468026" y="1620480"/>
+            <a:ext cx="1038939" cy="705823"/>
+            <a:chOff x="1448884" y="1583698"/>
+            <a:chExt cx="1038939" cy="705823"/>
+          </a:xfrm>
+        </p:grpSpPr>
+        <p:cxnSp>
+          <p:nvCxnSpPr>
+            <p:cNvPr id="1062" name="Connecteur droit avec flèche 1061">
+              <a:extLst>
+                <a:ext uri="{FF2B5EF4-FFF2-40B4-BE49-F238E27FC236}">
+                  <a16:creationId xmlns:a16="http://schemas.microsoft.com/office/drawing/2014/main" id="{BF121829-43E0-7C2E-82A8-1AEF48811542}"/>
+                </a:ext>
+              </a:extLst>
+            </p:cNvPr>
+            <p:cNvCxnSpPr>
+              <a:cxnSpLocks/>
+            </p:cNvCxnSpPr>
+            <p:nvPr/>
+          </p:nvCxnSpPr>
+          <p:spPr>
+            <a:xfrm flipH="1" flipV="1">
+              <a:off x="1464186" y="1583698"/>
+              <a:ext cx="4555" cy="705823"/>
+            </a:xfrm>
+            <a:prstGeom prst="straightConnector1">
+              <a:avLst/>
+            </a:prstGeom>
+            <a:ln w="19050" cap="flat" cmpd="sng" algn="ctr">
+              <a:solidFill>
+                <a:schemeClr val="accent5"/>
+              </a:solidFill>
+              <a:prstDash val="dash"/>
+              <a:round/>
+              <a:headEnd type="none" w="med" len="med"/>
+              <a:tailEnd type="arrow" w="med" len="med"/>
+            </a:ln>
+          </p:spPr>
+          <p:style>
+            <a:lnRef idx="0">
+              <a:scrgbClr r="0" g="0" b="0"/>
+            </a:lnRef>
+            <a:fillRef idx="0">
+              <a:scrgbClr r="0" g="0" b="0"/>
+            </a:fillRef>
+            <a:effectRef idx="0">
+              <a:scrgbClr r="0" g="0" b="0"/>
+            </a:effectRef>
+            <a:fontRef idx="minor">
+              <a:schemeClr val="tx1"/>
+            </a:fontRef>
+          </p:style>
+        </p:cxnSp>
+        <p:sp>
+          <p:nvSpPr>
+            <p:cNvPr id="1066" name="ZoneTexte 1065">
+              <a:extLst>
+                <a:ext uri="{FF2B5EF4-FFF2-40B4-BE49-F238E27FC236}">
+                  <a16:creationId xmlns:a16="http://schemas.microsoft.com/office/drawing/2014/main" id="{56BF8512-142C-511A-3F2A-42F3438D4CAC}"/>
+                </a:ext>
+              </a:extLst>
+            </p:cNvPr>
+            <p:cNvSpPr txBox="1"/>
+            <p:nvPr/>
+          </p:nvSpPr>
+          <p:spPr>
+            <a:xfrm>
+              <a:off x="1448884" y="1740319"/>
+              <a:ext cx="1038939" cy="307777"/>
+            </a:xfrm>
+            <a:prstGeom prst="rect">
+              <a:avLst/>
+            </a:prstGeom>
+            <a:noFill/>
+          </p:spPr>
+          <p:txBody>
+            <a:bodyPr wrap="none" rtlCol="0">
+              <a:spAutoFit/>
+            </a:bodyPr>
+            <a:lstStyle/>
+            <a:p>
+              <a:r>
+                <a:rPr lang="fr-FR" sz="1400" dirty="0" err="1"/>
+                <a:t>Predictions</a:t>
+              </a:r>
+              <a:endParaRPr lang="fr-FR" sz="1400" dirty="0"/>
+            </a:p>
+          </p:txBody>
+        </p:sp>
+      </p:grpSp>
+      <p:grpSp>
+        <p:nvGrpSpPr>
+          <p:cNvPr id="1069" name="Groupe 1068">
+            <a:extLst>
+              <a:ext uri="{FF2B5EF4-FFF2-40B4-BE49-F238E27FC236}">
+                <a16:creationId xmlns:a16="http://schemas.microsoft.com/office/drawing/2014/main" id="{E376833F-C7F5-EB4A-BC2B-1424C520CD86}"/>
+              </a:ext>
+            </a:extLst>
+          </p:cNvPr>
+          <p:cNvGrpSpPr/>
+          <p:nvPr/>
+        </p:nvGrpSpPr>
+        <p:grpSpPr>
+          <a:xfrm>
+            <a:off x="876278" y="1649697"/>
+            <a:ext cx="489972" cy="681771"/>
+            <a:chOff x="10480726" y="1070863"/>
+            <a:chExt cx="489972" cy="671329"/>
+          </a:xfrm>
+        </p:grpSpPr>
+        <p:cxnSp>
+          <p:nvCxnSpPr>
+            <p:cNvPr id="1070" name="Connecteur droit avec flèche 1069">
+              <a:extLst>
+                <a:ext uri="{FF2B5EF4-FFF2-40B4-BE49-F238E27FC236}">
+                  <a16:creationId xmlns:a16="http://schemas.microsoft.com/office/drawing/2014/main" id="{64E4C1F9-5F6E-4B21-BD53-5810D85820AB}"/>
+                </a:ext>
+              </a:extLst>
+            </p:cNvPr>
+            <p:cNvCxnSpPr>
+              <a:cxnSpLocks/>
+            </p:cNvCxnSpPr>
+            <p:nvPr/>
+          </p:nvCxnSpPr>
+          <p:spPr>
+            <a:xfrm>
+              <a:off x="10970698" y="1070863"/>
+              <a:ext cx="0" cy="671329"/>
+            </a:xfrm>
+            <a:prstGeom prst="straightConnector1">
+              <a:avLst/>
+            </a:prstGeom>
+            <a:ln w="19050" cap="flat" cmpd="sng" algn="ctr">
+              <a:solidFill>
+                <a:schemeClr val="accent5"/>
+              </a:solidFill>
+              <a:prstDash val="solid"/>
+              <a:round/>
+              <a:headEnd type="none" w="med" len="med"/>
+              <a:tailEnd type="arrow" w="med" len="med"/>
+            </a:ln>
+          </p:spPr>
+          <p:style>
+            <a:lnRef idx="0">
+              <a:scrgbClr r="0" g="0" b="0"/>
+            </a:lnRef>
+            <a:fillRef idx="0">
+              <a:scrgbClr r="0" g="0" b="0"/>
+            </a:fillRef>
+            <a:effectRef idx="0">
+              <a:scrgbClr r="0" g="0" b="0"/>
+            </a:effectRef>
+            <a:fontRef idx="minor">
+              <a:schemeClr val="tx1"/>
+            </a:fontRef>
+          </p:style>
+        </p:cxnSp>
+        <p:sp>
+          <p:nvSpPr>
+            <p:cNvPr id="1071" name="ZoneTexte 1070">
+              <a:extLst>
+                <a:ext uri="{FF2B5EF4-FFF2-40B4-BE49-F238E27FC236}">
+                  <a16:creationId xmlns:a16="http://schemas.microsoft.com/office/drawing/2014/main" id="{BC510DFC-CF17-9886-17E4-EEB4AB3AD0A8}"/>
+                </a:ext>
+              </a:extLst>
+            </p:cNvPr>
+            <p:cNvSpPr txBox="1"/>
+            <p:nvPr/>
+          </p:nvSpPr>
+          <p:spPr>
+            <a:xfrm>
+              <a:off x="10480726" y="1191651"/>
+              <a:ext cx="452368" cy="303063"/>
+            </a:xfrm>
+            <a:prstGeom prst="rect">
+              <a:avLst/>
+            </a:prstGeom>
+            <a:noFill/>
+          </p:spPr>
+          <p:txBody>
+            <a:bodyPr wrap="none" rtlCol="0">
+              <a:spAutoFit/>
+            </a:bodyPr>
+            <a:lstStyle/>
+            <a:p>
+              <a:r>
+                <a:rPr lang="fr-FR" sz="1400" dirty="0" err="1"/>
+                <a:t>Get</a:t>
+              </a:r>
+              <a:endParaRPr lang="fr-FR" sz="1400" dirty="0"/>
+            </a:p>
+          </p:txBody>
+        </p:sp>
+      </p:grpSp>
+      <p:grpSp>
+        <p:nvGrpSpPr>
+          <p:cNvPr id="1072" name="Groupe 1071">
+            <a:extLst>
+              <a:ext uri="{FF2B5EF4-FFF2-40B4-BE49-F238E27FC236}">
+                <a16:creationId xmlns:a16="http://schemas.microsoft.com/office/drawing/2014/main" id="{F170B750-87B5-EC8D-8405-64F693DFAFAE}"/>
+              </a:ext>
+            </a:extLst>
+          </p:cNvPr>
+          <p:cNvGrpSpPr/>
+          <p:nvPr/>
+        </p:nvGrpSpPr>
+        <p:grpSpPr>
+          <a:xfrm>
+            <a:off x="7806113" y="1708705"/>
+            <a:ext cx="818109" cy="671329"/>
+            <a:chOff x="10257940" y="1022096"/>
+            <a:chExt cx="818109" cy="671329"/>
+          </a:xfrm>
+        </p:grpSpPr>
+        <p:cxnSp>
+          <p:nvCxnSpPr>
+            <p:cNvPr id="1073" name="Connecteur droit avec flèche 1072">
+              <a:extLst>
+                <a:ext uri="{FF2B5EF4-FFF2-40B4-BE49-F238E27FC236}">
+                  <a16:creationId xmlns:a16="http://schemas.microsoft.com/office/drawing/2014/main" id="{E1CAC9B5-0FEC-8D9A-7068-ABE60DB5F504}"/>
+                </a:ext>
+              </a:extLst>
+            </p:cNvPr>
+            <p:cNvCxnSpPr>
+              <a:cxnSpLocks/>
+            </p:cNvCxnSpPr>
+            <p:nvPr/>
+          </p:nvCxnSpPr>
+          <p:spPr>
+            <a:xfrm>
+              <a:off x="10307639" y="1022096"/>
+              <a:ext cx="0" cy="671329"/>
+            </a:xfrm>
+            <a:prstGeom prst="straightConnector1">
+              <a:avLst/>
+            </a:prstGeom>
+            <a:ln w="19050" cap="flat" cmpd="sng" algn="ctr">
+              <a:solidFill>
+                <a:schemeClr val="accent5"/>
+              </a:solidFill>
+              <a:prstDash val="solid"/>
+              <a:round/>
+              <a:headEnd type="none" w="med" len="med"/>
+              <a:tailEnd type="arrow" w="med" len="med"/>
+            </a:ln>
+          </p:spPr>
+          <p:style>
+            <a:lnRef idx="0">
+              <a:scrgbClr r="0" g="0" b="0"/>
+            </a:lnRef>
+            <a:fillRef idx="0">
+              <a:scrgbClr r="0" g="0" b="0"/>
+            </a:fillRef>
+            <a:effectRef idx="0">
+              <a:scrgbClr r="0" g="0" b="0"/>
+            </a:effectRef>
+            <a:fontRef idx="minor">
+              <a:schemeClr val="tx1"/>
+            </a:fontRef>
+          </p:style>
+        </p:cxnSp>
+        <p:sp>
+          <p:nvSpPr>
+            <p:cNvPr id="1074" name="ZoneTexte 1073">
+              <a:extLst>
+                <a:ext uri="{FF2B5EF4-FFF2-40B4-BE49-F238E27FC236}">
+                  <a16:creationId xmlns:a16="http://schemas.microsoft.com/office/drawing/2014/main" id="{C446AE97-CD23-69A4-7270-4117B739FE95}"/>
+                </a:ext>
+              </a:extLst>
+            </p:cNvPr>
+            <p:cNvSpPr txBox="1"/>
+            <p:nvPr/>
+          </p:nvSpPr>
+          <p:spPr>
+            <a:xfrm>
+              <a:off x="10257940" y="1156538"/>
+              <a:ext cx="818109" cy="523220"/>
+            </a:xfrm>
+            <a:prstGeom prst="rect">
+              <a:avLst/>
+            </a:prstGeom>
+            <a:noFill/>
+          </p:spPr>
+          <p:txBody>
+            <a:bodyPr wrap="none" rtlCol="0">
+              <a:spAutoFit/>
+            </a:bodyPr>
+            <a:lstStyle/>
+            <a:p>
+              <a:r>
+                <a:rPr lang="fr-FR" sz="1400" dirty="0"/>
+                <a:t>Manage</a:t>
+              </a:r>
+            </a:p>
+            <a:p>
+              <a:r>
+                <a:rPr lang="fr-FR" sz="1400" dirty="0"/>
+                <a:t>images</a:t>
+              </a:r>
+            </a:p>
+          </p:txBody>
+        </p:sp>
+      </p:grpSp>
     </p:spTree>
     <p:extLst>
       <p:ext uri="{BB962C8B-B14F-4D97-AF65-F5344CB8AC3E}">
@@ -17513,6 +20383,591 @@
   <p:clrMapOvr>
     <a:masterClrMapping/>
   </p:clrMapOvr>
+  <p:timing>
+    <p:tnLst>
+      <p:par>
+        <p:cTn id="1" dur="indefinite" restart="never" nodeType="tmRoot">
+          <p:childTnLst>
+            <p:seq concurrent="1" nextAc="seek">
+              <p:cTn id="2" dur="indefinite" nodeType="mainSeq">
+                <p:childTnLst>
+                  <p:par>
+                    <p:cTn id="3" fill="hold">
+                      <p:stCondLst>
+                        <p:cond delay="indefinite"/>
+                      </p:stCondLst>
+                      <p:childTnLst>
+                        <p:par>
+                          <p:cTn id="4" fill="hold">
+                            <p:stCondLst>
+                              <p:cond delay="0"/>
+                            </p:stCondLst>
+                            <p:childTnLst>
+                              <p:par>
+                                <p:cTn id="5" presetID="1" presetClass="entr" presetSubtype="0" fill="hold" nodeType="clickEffect">
+                                  <p:stCondLst>
+                                    <p:cond delay="0"/>
+                                  </p:stCondLst>
+                                  <p:childTnLst>
+                                    <p:set>
+                                      <p:cBhvr>
+                                        <p:cTn id="6" dur="1" fill="hold">
+                                          <p:stCondLst>
+                                            <p:cond delay="0"/>
+                                          </p:stCondLst>
+                                        </p:cTn>
+                                        <p:tgtEl>
+                                          <p:spTgt spid="1024"/>
+                                        </p:tgtEl>
+                                        <p:attrNameLst>
+                                          <p:attrName>style.visibility</p:attrName>
+                                        </p:attrNameLst>
+                                      </p:cBhvr>
+                                      <p:to>
+                                        <p:strVal val="visible"/>
+                                      </p:to>
+                                    </p:set>
+                                  </p:childTnLst>
+                                </p:cTn>
+                              </p:par>
+                              <p:par>
+                                <p:cTn id="7" presetID="1" presetClass="entr" presetSubtype="0" fill="hold" nodeType="withEffect">
+                                  <p:stCondLst>
+                                    <p:cond delay="0"/>
+                                  </p:stCondLst>
+                                  <p:childTnLst>
+                                    <p:set>
+                                      <p:cBhvr>
+                                        <p:cTn id="8" dur="1" fill="hold">
+                                          <p:stCondLst>
+                                            <p:cond delay="0"/>
+                                          </p:stCondLst>
+                                        </p:cTn>
+                                        <p:tgtEl>
+                                          <p:spTgt spid="1056"/>
+                                        </p:tgtEl>
+                                        <p:attrNameLst>
+                                          <p:attrName>style.visibility</p:attrName>
+                                        </p:attrNameLst>
+                                      </p:cBhvr>
+                                      <p:to>
+                                        <p:strVal val="visible"/>
+                                      </p:to>
+                                    </p:set>
+                                  </p:childTnLst>
+                                </p:cTn>
+                              </p:par>
+                            </p:childTnLst>
+                          </p:cTn>
+                        </p:par>
+                      </p:childTnLst>
+                    </p:cTn>
+                  </p:par>
+                  <p:par>
+                    <p:cTn id="9" fill="hold">
+                      <p:stCondLst>
+                        <p:cond delay="indefinite"/>
+                      </p:stCondLst>
+                      <p:childTnLst>
+                        <p:par>
+                          <p:cTn id="10" fill="hold">
+                            <p:stCondLst>
+                              <p:cond delay="0"/>
+                            </p:stCondLst>
+                            <p:childTnLst>
+                              <p:par>
+                                <p:cTn id="11" presetID="1" presetClass="entr" presetSubtype="0" fill="hold" nodeType="clickEffect">
+                                  <p:stCondLst>
+                                    <p:cond delay="0"/>
+                                  </p:stCondLst>
+                                  <p:childTnLst>
+                                    <p:set>
+                                      <p:cBhvr>
+                                        <p:cTn id="12" dur="1" fill="hold">
+                                          <p:stCondLst>
+                                            <p:cond delay="0"/>
+                                          </p:stCondLst>
+                                        </p:cTn>
+                                        <p:tgtEl>
+                                          <p:spTgt spid="1067"/>
+                                        </p:tgtEl>
+                                        <p:attrNameLst>
+                                          <p:attrName>style.visibility</p:attrName>
+                                        </p:attrNameLst>
+                                      </p:cBhvr>
+                                      <p:to>
+                                        <p:strVal val="visible"/>
+                                      </p:to>
+                                    </p:set>
+                                  </p:childTnLst>
+                                </p:cTn>
+                              </p:par>
+                              <p:par>
+                                <p:cTn id="13" presetID="1" presetClass="entr" presetSubtype="0" fill="hold" nodeType="withEffect">
+                                  <p:stCondLst>
+                                    <p:cond delay="0"/>
+                                  </p:stCondLst>
+                                  <p:childTnLst>
+                                    <p:set>
+                                      <p:cBhvr>
+                                        <p:cTn id="14" dur="1" fill="hold">
+                                          <p:stCondLst>
+                                            <p:cond delay="0"/>
+                                          </p:stCondLst>
+                                        </p:cTn>
+                                        <p:tgtEl>
+                                          <p:spTgt spid="1069"/>
+                                        </p:tgtEl>
+                                        <p:attrNameLst>
+                                          <p:attrName>style.visibility</p:attrName>
+                                        </p:attrNameLst>
+                                      </p:cBhvr>
+                                      <p:to>
+                                        <p:strVal val="visible"/>
+                                      </p:to>
+                                    </p:set>
+                                  </p:childTnLst>
+                                </p:cTn>
+                              </p:par>
+                            </p:childTnLst>
+                          </p:cTn>
+                        </p:par>
+                      </p:childTnLst>
+                    </p:cTn>
+                  </p:par>
+                  <p:par>
+                    <p:cTn id="15" fill="hold">
+                      <p:stCondLst>
+                        <p:cond delay="indefinite"/>
+                      </p:stCondLst>
+                      <p:childTnLst>
+                        <p:par>
+                          <p:cTn id="16" fill="hold">
+                            <p:stCondLst>
+                              <p:cond delay="0"/>
+                            </p:stCondLst>
+                            <p:childTnLst>
+                              <p:par>
+                                <p:cTn id="17" presetID="1" presetClass="entr" presetSubtype="0" fill="hold" nodeType="clickEffect">
+                                  <p:stCondLst>
+                                    <p:cond delay="0"/>
+                                  </p:stCondLst>
+                                  <p:childTnLst>
+                                    <p:set>
+                                      <p:cBhvr>
+                                        <p:cTn id="18" dur="1" fill="hold">
+                                          <p:stCondLst>
+                                            <p:cond delay="0"/>
+                                          </p:stCondLst>
+                                        </p:cTn>
+                                        <p:tgtEl>
+                                          <p:spTgt spid="1028"/>
+                                        </p:tgtEl>
+                                        <p:attrNameLst>
+                                          <p:attrName>style.visibility</p:attrName>
+                                        </p:attrNameLst>
+                                      </p:cBhvr>
+                                      <p:to>
+                                        <p:strVal val="visible"/>
+                                      </p:to>
+                                    </p:set>
+                                  </p:childTnLst>
+                                </p:cTn>
+                              </p:par>
+                              <p:par>
+                                <p:cTn id="19" presetID="1" presetClass="entr" presetSubtype="0" fill="hold" grpId="0" nodeType="withEffect">
+                                  <p:stCondLst>
+                                    <p:cond delay="0"/>
+                                  </p:stCondLst>
+                                  <p:childTnLst>
+                                    <p:set>
+                                      <p:cBhvr>
+                                        <p:cTn id="20" dur="1" fill="hold">
+                                          <p:stCondLst>
+                                            <p:cond delay="0"/>
+                                          </p:stCondLst>
+                                        </p:cTn>
+                                        <p:tgtEl>
+                                          <p:spTgt spid="16"/>
+                                        </p:tgtEl>
+                                        <p:attrNameLst>
+                                          <p:attrName>style.visibility</p:attrName>
+                                        </p:attrNameLst>
+                                      </p:cBhvr>
+                                      <p:to>
+                                        <p:strVal val="visible"/>
+                                      </p:to>
+                                    </p:set>
+                                  </p:childTnLst>
+                                </p:cTn>
+                              </p:par>
+                            </p:childTnLst>
+                          </p:cTn>
+                        </p:par>
+                      </p:childTnLst>
+                    </p:cTn>
+                  </p:par>
+                  <p:par>
+                    <p:cTn id="21" fill="hold">
+                      <p:stCondLst>
+                        <p:cond delay="indefinite"/>
+                      </p:stCondLst>
+                      <p:childTnLst>
+                        <p:par>
+                          <p:cTn id="22" fill="hold">
+                            <p:stCondLst>
+                              <p:cond delay="0"/>
+                            </p:stCondLst>
+                            <p:childTnLst>
+                              <p:par>
+                                <p:cTn id="23" presetID="1" presetClass="entr" presetSubtype="0" fill="hold" grpId="0" nodeType="clickEffect">
+                                  <p:stCondLst>
+                                    <p:cond delay="0"/>
+                                  </p:stCondLst>
+                                  <p:childTnLst>
+                                    <p:set>
+                                      <p:cBhvr>
+                                        <p:cTn id="24" dur="1" fill="hold">
+                                          <p:stCondLst>
+                                            <p:cond delay="0"/>
+                                          </p:stCondLst>
+                                        </p:cTn>
+                                        <p:tgtEl>
+                                          <p:spTgt spid="1032"/>
+                                        </p:tgtEl>
+                                        <p:attrNameLst>
+                                          <p:attrName>style.visibility</p:attrName>
+                                        </p:attrNameLst>
+                                      </p:cBhvr>
+                                      <p:to>
+                                        <p:strVal val="visible"/>
+                                      </p:to>
+                                    </p:set>
+                                  </p:childTnLst>
+                                </p:cTn>
+                              </p:par>
+                              <p:par>
+                                <p:cTn id="25" presetID="1" presetClass="entr" presetSubtype="0" fill="hold" nodeType="withEffect">
+                                  <p:stCondLst>
+                                    <p:cond delay="0"/>
+                                  </p:stCondLst>
+                                  <p:childTnLst>
+                                    <p:set>
+                                      <p:cBhvr>
+                                        <p:cTn id="26" dur="1" fill="hold">
+                                          <p:stCondLst>
+                                            <p:cond delay="0"/>
+                                          </p:stCondLst>
+                                        </p:cTn>
+                                        <p:tgtEl>
+                                          <p:spTgt spid="1072"/>
+                                        </p:tgtEl>
+                                        <p:attrNameLst>
+                                          <p:attrName>style.visibility</p:attrName>
+                                        </p:attrNameLst>
+                                      </p:cBhvr>
+                                      <p:to>
+                                        <p:strVal val="visible"/>
+                                      </p:to>
+                                    </p:set>
+                                  </p:childTnLst>
+                                </p:cTn>
+                              </p:par>
+                            </p:childTnLst>
+                          </p:cTn>
+                        </p:par>
+                      </p:childTnLst>
+                    </p:cTn>
+                  </p:par>
+                  <p:par>
+                    <p:cTn id="27" fill="hold">
+                      <p:stCondLst>
+                        <p:cond delay="indefinite"/>
+                      </p:stCondLst>
+                      <p:childTnLst>
+                        <p:par>
+                          <p:cTn id="28" fill="hold">
+                            <p:stCondLst>
+                              <p:cond delay="0"/>
+                            </p:stCondLst>
+                            <p:childTnLst>
+                              <p:par>
+                                <p:cTn id="29" presetID="1" presetClass="entr" presetSubtype="0" fill="hold" nodeType="clickEffect">
+                                  <p:stCondLst>
+                                    <p:cond delay="0"/>
+                                  </p:stCondLst>
+                                  <p:childTnLst>
+                                    <p:set>
+                                      <p:cBhvr>
+                                        <p:cTn id="30" dur="1" fill="hold">
+                                          <p:stCondLst>
+                                            <p:cond delay="0"/>
+                                          </p:stCondLst>
+                                        </p:cTn>
+                                        <p:tgtEl>
+                                          <p:spTgt spid="43"/>
+                                        </p:tgtEl>
+                                        <p:attrNameLst>
+                                          <p:attrName>style.visibility</p:attrName>
+                                        </p:attrNameLst>
+                                      </p:cBhvr>
+                                      <p:to>
+                                        <p:strVal val="visible"/>
+                                      </p:to>
+                                    </p:set>
+                                  </p:childTnLst>
+                                </p:cTn>
+                              </p:par>
+                              <p:par>
+                                <p:cTn id="31" presetID="1" presetClass="entr" presetSubtype="0" fill="hold" grpId="0" nodeType="withEffect">
+                                  <p:stCondLst>
+                                    <p:cond delay="0"/>
+                                  </p:stCondLst>
+                                  <p:childTnLst>
+                                    <p:set>
+                                      <p:cBhvr>
+                                        <p:cTn id="32" dur="1" fill="hold">
+                                          <p:stCondLst>
+                                            <p:cond delay="0"/>
+                                          </p:stCondLst>
+                                        </p:cTn>
+                                        <p:tgtEl>
+                                          <p:spTgt spid="40"/>
+                                        </p:tgtEl>
+                                        <p:attrNameLst>
+                                          <p:attrName>style.visibility</p:attrName>
+                                        </p:attrNameLst>
+                                      </p:cBhvr>
+                                      <p:to>
+                                        <p:strVal val="visible"/>
+                                      </p:to>
+                                    </p:set>
+                                  </p:childTnLst>
+                                </p:cTn>
+                              </p:par>
+                              <p:par>
+                                <p:cTn id="33" presetID="1" presetClass="entr" presetSubtype="0" fill="hold" nodeType="withEffect">
+                                  <p:stCondLst>
+                                    <p:cond delay="0"/>
+                                  </p:stCondLst>
+                                  <p:childTnLst>
+                                    <p:set>
+                                      <p:cBhvr>
+                                        <p:cTn id="34" dur="1" fill="hold">
+                                          <p:stCondLst>
+                                            <p:cond delay="0"/>
+                                          </p:stCondLst>
+                                        </p:cTn>
+                                        <p:tgtEl>
+                                          <p:spTgt spid="36"/>
+                                        </p:tgtEl>
+                                        <p:attrNameLst>
+                                          <p:attrName>style.visibility</p:attrName>
+                                        </p:attrNameLst>
+                                      </p:cBhvr>
+                                      <p:to>
+                                        <p:strVal val="visible"/>
+                                      </p:to>
+                                    </p:set>
+                                  </p:childTnLst>
+                                </p:cTn>
+                              </p:par>
+                            </p:childTnLst>
+                          </p:cTn>
+                        </p:par>
+                      </p:childTnLst>
+                    </p:cTn>
+                  </p:par>
+                  <p:par>
+                    <p:cTn id="35" fill="hold">
+                      <p:stCondLst>
+                        <p:cond delay="indefinite"/>
+                      </p:stCondLst>
+                      <p:childTnLst>
+                        <p:par>
+                          <p:cTn id="36" fill="hold">
+                            <p:stCondLst>
+                              <p:cond delay="0"/>
+                            </p:stCondLst>
+                            <p:childTnLst>
+                              <p:par>
+                                <p:cTn id="37" presetID="1" presetClass="entr" presetSubtype="0" fill="hold" nodeType="clickEffect">
+                                  <p:stCondLst>
+                                    <p:cond delay="0"/>
+                                  </p:stCondLst>
+                                  <p:childTnLst>
+                                    <p:set>
+                                      <p:cBhvr>
+                                        <p:cTn id="38" dur="1" fill="hold">
+                                          <p:stCondLst>
+                                            <p:cond delay="0"/>
+                                          </p:stCondLst>
+                                        </p:cTn>
+                                        <p:tgtEl>
+                                          <p:spTgt spid="1068"/>
+                                        </p:tgtEl>
+                                        <p:attrNameLst>
+                                          <p:attrName>style.visibility</p:attrName>
+                                        </p:attrNameLst>
+                                      </p:cBhvr>
+                                      <p:to>
+                                        <p:strVal val="visible"/>
+                                      </p:to>
+                                    </p:set>
+                                  </p:childTnLst>
+                                </p:cTn>
+                              </p:par>
+                            </p:childTnLst>
+                          </p:cTn>
+                        </p:par>
+                      </p:childTnLst>
+                    </p:cTn>
+                  </p:par>
+                  <p:par>
+                    <p:cTn id="39" fill="hold">
+                      <p:stCondLst>
+                        <p:cond delay="indefinite"/>
+                      </p:stCondLst>
+                      <p:childTnLst>
+                        <p:par>
+                          <p:cTn id="40" fill="hold">
+                            <p:stCondLst>
+                              <p:cond delay="0"/>
+                            </p:stCondLst>
+                            <p:childTnLst>
+                              <p:par>
+                                <p:cTn id="41" presetID="1" presetClass="entr" presetSubtype="0" fill="hold" nodeType="clickEffect">
+                                  <p:stCondLst>
+                                    <p:cond delay="0"/>
+                                  </p:stCondLst>
+                                  <p:childTnLst>
+                                    <p:set>
+                                      <p:cBhvr>
+                                        <p:cTn id="42" dur="1" fill="hold">
+                                          <p:stCondLst>
+                                            <p:cond delay="0"/>
+                                          </p:stCondLst>
+                                        </p:cTn>
+                                        <p:tgtEl>
+                                          <p:spTgt spid="49"/>
+                                        </p:tgtEl>
+                                        <p:attrNameLst>
+                                          <p:attrName>style.visibility</p:attrName>
+                                        </p:attrNameLst>
+                                      </p:cBhvr>
+                                      <p:to>
+                                        <p:strVal val="visible"/>
+                                      </p:to>
+                                    </p:set>
+                                  </p:childTnLst>
+                                </p:cTn>
+                              </p:par>
+                              <p:par>
+                                <p:cTn id="43" presetID="1" presetClass="entr" presetSubtype="0" fill="hold" grpId="0" nodeType="withEffect">
+                                  <p:stCondLst>
+                                    <p:cond delay="0"/>
+                                  </p:stCondLst>
+                                  <p:childTnLst>
+                                    <p:set>
+                                      <p:cBhvr>
+                                        <p:cTn id="44" dur="1" fill="hold">
+                                          <p:stCondLst>
+                                            <p:cond delay="0"/>
+                                          </p:stCondLst>
+                                        </p:cTn>
+                                        <p:tgtEl>
+                                          <p:spTgt spid="41"/>
+                                        </p:tgtEl>
+                                        <p:attrNameLst>
+                                          <p:attrName>style.visibility</p:attrName>
+                                        </p:attrNameLst>
+                                      </p:cBhvr>
+                                      <p:to>
+                                        <p:strVal val="visible"/>
+                                      </p:to>
+                                    </p:set>
+                                  </p:childTnLst>
+                                </p:cTn>
+                              </p:par>
+                            </p:childTnLst>
+                          </p:cTn>
+                        </p:par>
+                      </p:childTnLst>
+                    </p:cTn>
+                  </p:par>
+                  <p:par>
+                    <p:cTn id="45" fill="hold">
+                      <p:stCondLst>
+                        <p:cond delay="indefinite"/>
+                      </p:stCondLst>
+                      <p:childTnLst>
+                        <p:par>
+                          <p:cTn id="46" fill="hold">
+                            <p:stCondLst>
+                              <p:cond delay="0"/>
+                            </p:stCondLst>
+                            <p:childTnLst>
+                              <p:par>
+                                <p:cTn id="47" presetID="1" presetClass="entr" presetSubtype="0" fill="hold" nodeType="clickEffect">
+                                  <p:stCondLst>
+                                    <p:cond delay="0"/>
+                                  </p:stCondLst>
+                                  <p:childTnLst>
+                                    <p:set>
+                                      <p:cBhvr>
+                                        <p:cTn id="48" dur="1" fill="hold">
+                                          <p:stCondLst>
+                                            <p:cond delay="0"/>
+                                          </p:stCondLst>
+                                        </p:cTn>
+                                        <p:tgtEl>
+                                          <p:spTgt spid="1053"/>
+                                        </p:tgtEl>
+                                        <p:attrNameLst>
+                                          <p:attrName>style.visibility</p:attrName>
+                                        </p:attrNameLst>
+                                      </p:cBhvr>
+                                      <p:to>
+                                        <p:strVal val="visible"/>
+                                      </p:to>
+                                    </p:set>
+                                  </p:childTnLst>
+                                </p:cTn>
+                              </p:par>
+                            </p:childTnLst>
+                          </p:cTn>
+                        </p:par>
+                      </p:childTnLst>
+                    </p:cTn>
+                  </p:par>
+                </p:childTnLst>
+              </p:cTn>
+              <p:prevCondLst>
+                <p:cond evt="onPrev" delay="0">
+                  <p:tgtEl>
+                    <p:sldTgt/>
+                  </p:tgtEl>
+                </p:cond>
+              </p:prevCondLst>
+              <p:nextCondLst>
+                <p:cond evt="onNext" delay="0">
+                  <p:tgtEl>
+                    <p:sldTgt/>
+                  </p:tgtEl>
+                </p:cond>
+              </p:nextCondLst>
+            </p:seq>
+          </p:childTnLst>
+        </p:cTn>
+      </p:par>
+    </p:tnLst>
+    <p:bldLst>
+      <p:bldP spid="16" grpId="0" animBg="1"/>
+      <p:bldP spid="40" grpId="0" animBg="1"/>
+      <p:bldP spid="41" grpId="0" animBg="1"/>
+      <p:bldP spid="1032" grpId="0" animBg="1"/>
+    </p:bldLst>
+  </p:timing>
 </p:sld>
 </file>
 
@@ -17728,12 +21183,8 @@
           </a:p>
           <a:p>
             <a:r>
-              <a:rPr lang="fr-FR"/>
-              <a:t>Pipeline Prédiction </a:t>
-            </a:r>
-            <a:r>
               <a:rPr lang="fr-FR" dirty="0"/>
-              <a:t>&amp; Feedback User</a:t>
+              <a:t>Pipeline Prédiction &amp; Feedback User</a:t>
             </a:r>
           </a:p>
           <a:p>
@@ -17744,29 +21195,6 @@
             <a:r>
               <a:rPr lang="fr-FR" dirty="0" err="1"/>
               <a:t>MLOps</a:t>
-            </a:r>
-            <a:r>
-              <a:rPr lang="fr-FR" dirty="0"/>
-              <a:t> (CI/CD, </a:t>
-            </a:r>
-            <a:r>
-              <a:rPr lang="fr-FR" dirty="0" err="1"/>
-              <a:t>Kubernetes</a:t>
-            </a:r>
-            <a:r>
-              <a:rPr lang="fr-FR" dirty="0"/>
-              <a:t>, Sécurisation)</a:t>
-            </a:r>
-          </a:p>
-          <a:p>
-            <a:pPr lvl="1"/>
-            <a:r>
-              <a:rPr lang="fr-FR" dirty="0"/>
-              <a:t>Ajouter un slide sur le versioning entre Repo Code et Repo </a:t>
-            </a:r>
-            <a:r>
-              <a:rPr lang="fr-FR" dirty="0" err="1"/>
-              <a:t>Deploiement</a:t>
             </a:r>
             <a:endParaRPr lang="fr-FR" dirty="0"/>
           </a:p>
@@ -19049,35 +22477,6 @@
 </file>
 
 <file path=customXml/item1.xml><?xml version="1.0" encoding="utf-8"?>
-<p:properties xmlns:p="http://schemas.microsoft.com/office/2006/metadata/properties" xmlns:xsi="http://www.w3.org/2001/XMLSchema-instance" xmlns:pc="http://schemas.microsoft.com/office/infopath/2007/PartnerControls">
-  <documentManagement>
-    <_ip_UnifiedCompliancePolicyUIAction xmlns="http://schemas.microsoft.com/sharepoint/v3" xsi:nil="true"/>
-    <Image xmlns="71af3243-3dd4-4a8d-8c0d-dd76da1f02a5">
-      <Url xsi:nil="true"/>
-      <Description xsi:nil="true"/>
-    </Image>
-    <Status xmlns="71af3243-3dd4-4a8d-8c0d-dd76da1f02a5">Not started</Status>
-    <Background xmlns="71af3243-3dd4-4a8d-8c0d-dd76da1f02a5">false</Background>
-    <_ip_UnifiedCompliancePolicyProperties xmlns="http://schemas.microsoft.com/sharepoint/v3" xsi:nil="true"/>
-    <ImageTagsTaxHTField xmlns="71af3243-3dd4-4a8d-8c0d-dd76da1f02a5">
-      <Terms xmlns="http://schemas.microsoft.com/office/infopath/2007/PartnerControls"/>
-    </ImageTagsTaxHTField>
-    <TaxCatchAll xmlns="230e9df3-be65-4c73-a93b-d1236ebd677e" xsi:nil="true"/>
-    <MediaServiceKeyPoints xmlns="71af3243-3dd4-4a8d-8c0d-dd76da1f02a5" xsi:nil="true"/>
-  </documentManagement>
-</p:properties>
-</file>
-
-<file path=customXml/item2.xml><?xml version="1.0" encoding="utf-8"?>
-<?mso-contentType ?>
-<FormTemplates xmlns="http://schemas.microsoft.com/sharepoint/v3/contenttype/forms">
-  <Display>DocumentLibraryForm</Display>
-  <Edit>DocumentLibraryForm</Edit>
-  <New>DocumentLibraryForm</New>
-</FormTemplates>
-</file>
-
-<file path=customXml/item3.xml><?xml version="1.0" encoding="utf-8"?>
 <ct:contentTypeSchema xmlns:ct="http://schemas.microsoft.com/office/2006/metadata/contentType" xmlns:ma="http://schemas.microsoft.com/office/2006/metadata/properties/metaAttributes" ct:_="" ma:_="" ma:contentTypeName="Document" ma:contentTypeID="0x01010079F111ED35F8CC479449609E8A0923A6" ma:contentTypeVersion="27" ma:contentTypeDescription="Create a new document." ma:contentTypeScope="" ma:versionID="c6f9a84f66a9c8b9a21755b9ffafb945">
   <xsd:schema xmlns:xsd="http://www.w3.org/2001/XMLSchema" xmlns:xs="http://www.w3.org/2001/XMLSchema" xmlns:p="http://schemas.microsoft.com/office/2006/metadata/properties" xmlns:ns1="http://schemas.microsoft.com/sharepoint/v3" xmlns:ns2="71af3243-3dd4-4a8d-8c0d-dd76da1f02a5" xmlns:ns3="16c05727-aa75-4e4a-9b5f-8a80a1165891" xmlns:ns4="230e9df3-be65-4c73-a93b-d1236ebd677e" targetNamespace="http://schemas.microsoft.com/office/2006/metadata/properties" ma:root="true" ma:fieldsID="27df39e3e7036dff54f89ddd5805ce72" ns1:_="" ns2:_="" ns3:_="" ns4:_="">
     <xsd:import namespace="http://schemas.microsoft.com/sharepoint/v3"/>
@@ -19383,27 +22782,36 @@
 </ct:contentTypeSchema>
 </file>
 
-<file path=customXml/itemProps1.xml><?xml version="1.0" encoding="utf-8"?>
-<ds:datastoreItem xmlns:ds="http://schemas.openxmlformats.org/officeDocument/2006/customXml" ds:itemID="{6EA97235-BEC4-4F82-87A8-2F5DAD53B5F9}">
-  <ds:schemaRefs>
-    <ds:schemaRef ds:uri="http://schemas.microsoft.com/office/2006/metadata/properties"/>
-    <ds:schemaRef ds:uri="http://schemas.microsoft.com/office/infopath/2007/PartnerControls"/>
-    <ds:schemaRef ds:uri="http://schemas.microsoft.com/sharepoint/v3"/>
-    <ds:schemaRef ds:uri="71af3243-3dd4-4a8d-8c0d-dd76da1f02a5"/>
-    <ds:schemaRef ds:uri="230e9df3-be65-4c73-a93b-d1236ebd677e"/>
-  </ds:schemaRefs>
-</ds:datastoreItem>
+<file path=customXml/item2.xml><?xml version="1.0" encoding="utf-8"?>
+<?mso-contentType ?>
+<FormTemplates xmlns="http://schemas.microsoft.com/sharepoint/v3/contenttype/forms">
+  <Display>DocumentLibraryForm</Display>
+  <Edit>DocumentLibraryForm</Edit>
+  <New>DocumentLibraryForm</New>
+</FormTemplates>
 </file>
 
-<file path=customXml/itemProps2.xml><?xml version="1.0" encoding="utf-8"?>
-<ds:datastoreItem xmlns:ds="http://schemas.openxmlformats.org/officeDocument/2006/customXml" ds:itemID="{79BF405E-7930-4D5C-ABB3-493E9D6D6CEA}">
-  <ds:schemaRefs>
-    <ds:schemaRef ds:uri="http://schemas.microsoft.com/sharepoint/v3/contenttype/forms"/>
-  </ds:schemaRefs>
-</ds:datastoreItem>
+<file path=customXml/item3.xml><?xml version="1.0" encoding="utf-8"?>
+<p:properties xmlns:p="http://schemas.microsoft.com/office/2006/metadata/properties" xmlns:xsi="http://www.w3.org/2001/XMLSchema-instance" xmlns:pc="http://schemas.microsoft.com/office/infopath/2007/PartnerControls">
+  <documentManagement>
+    <_ip_UnifiedCompliancePolicyUIAction xmlns="http://schemas.microsoft.com/sharepoint/v3" xsi:nil="true"/>
+    <Image xmlns="71af3243-3dd4-4a8d-8c0d-dd76da1f02a5">
+      <Url xsi:nil="true"/>
+      <Description xsi:nil="true"/>
+    </Image>
+    <Status xmlns="71af3243-3dd4-4a8d-8c0d-dd76da1f02a5">Not started</Status>
+    <Background xmlns="71af3243-3dd4-4a8d-8c0d-dd76da1f02a5">false</Background>
+    <_ip_UnifiedCompliancePolicyProperties xmlns="http://schemas.microsoft.com/sharepoint/v3" xsi:nil="true"/>
+    <ImageTagsTaxHTField xmlns="71af3243-3dd4-4a8d-8c0d-dd76da1f02a5">
+      <Terms xmlns="http://schemas.microsoft.com/office/infopath/2007/PartnerControls"/>
+    </ImageTagsTaxHTField>
+    <TaxCatchAll xmlns="230e9df3-be65-4c73-a93b-d1236ebd677e" xsi:nil="true"/>
+    <MediaServiceKeyPoints xmlns="71af3243-3dd4-4a8d-8c0d-dd76da1f02a5" xsi:nil="true"/>
+  </documentManagement>
+</p:properties>
 </file>
 
-<file path=customXml/itemProps3.xml><?xml version="1.0" encoding="utf-8"?>
+<file path=customXml/itemProps1.xml><?xml version="1.0" encoding="utf-8"?>
 <ds:datastoreItem xmlns:ds="http://schemas.openxmlformats.org/officeDocument/2006/customXml" ds:itemID="{2C1F447F-FAA8-4106-988B-648F3C8EDB2D}">
   <ds:schemaRefs>
     <ds:schemaRef ds:uri="http://schemas.microsoft.com/office/2006/metadata/contentType"/>
@@ -19424,6 +22832,26 @@
 </ds:datastoreItem>
 </file>
 
+<file path=customXml/itemProps2.xml><?xml version="1.0" encoding="utf-8"?>
+<ds:datastoreItem xmlns:ds="http://schemas.openxmlformats.org/officeDocument/2006/customXml" ds:itemID="{79BF405E-7930-4D5C-ABB3-493E9D6D6CEA}">
+  <ds:schemaRefs>
+    <ds:schemaRef ds:uri="http://schemas.microsoft.com/sharepoint/v3/contenttype/forms"/>
+  </ds:schemaRefs>
+</ds:datastoreItem>
+</file>
+
+<file path=customXml/itemProps3.xml><?xml version="1.0" encoding="utf-8"?>
+<ds:datastoreItem xmlns:ds="http://schemas.openxmlformats.org/officeDocument/2006/customXml" ds:itemID="{6EA97235-BEC4-4F82-87A8-2F5DAD53B5F9}">
+  <ds:schemaRefs>
+    <ds:schemaRef ds:uri="http://schemas.microsoft.com/office/2006/metadata/properties"/>
+    <ds:schemaRef ds:uri="http://schemas.microsoft.com/office/infopath/2007/PartnerControls"/>
+    <ds:schemaRef ds:uri="http://schemas.microsoft.com/sharepoint/v3"/>
+    <ds:schemaRef ds:uri="71af3243-3dd4-4a8d-8c0d-dd76da1f02a5"/>
+    <ds:schemaRef ds:uri="230e9df3-be65-4c73-a93b-d1236ebd677e"/>
+  </ds:schemaRefs>
+</ds:datastoreItem>
+</file>
+
 <file path=docMetadata/LabelInfo.xml><?xml version="1.0" encoding="utf-8"?>
 <clbl:labelList xmlns:clbl="http://schemas.microsoft.com/office/2020/mipLabelMetadata"/>
 </file>
</xml_diff>

<commit_message>
Améliorations des slides suite à notre call de dimanche
</commit_message>
<xml_diff>
--- a/report/Projet_classification_MLOps_Partie1_Eddie.pptx
+++ b/report/Projet_classification_MLOps_Partie1_Eddie.pptx
@@ -5,18 +5,19 @@
     <p:sldMasterId id="2147483666" r:id="rId4"/>
   </p:sldMasterIdLst>
   <p:notesMasterIdLst>
-    <p:notesMasterId r:id="rId11"/>
+    <p:notesMasterId r:id="rId12"/>
   </p:notesMasterIdLst>
   <p:handoutMasterIdLst>
-    <p:handoutMasterId r:id="rId12"/>
+    <p:handoutMasterId r:id="rId13"/>
   </p:handoutMasterIdLst>
   <p:sldIdLst>
     <p:sldId id="256" r:id="rId5"/>
     <p:sldId id="289" r:id="rId6"/>
     <p:sldId id="284" r:id="rId7"/>
     <p:sldId id="286" r:id="rId8"/>
-    <p:sldId id="290" r:id="rId9"/>
-    <p:sldId id="285" r:id="rId10"/>
+    <p:sldId id="291" r:id="rId9"/>
+    <p:sldId id="290" r:id="rId10"/>
+    <p:sldId id="285" r:id="rId11"/>
   </p:sldIdLst>
   <p:sldSz cx="12192000" cy="6858000"/>
   <p:notesSz cx="6858000" cy="9144000"/>
@@ -243,7 +244,7 @@
           <a:p>
             <a:fld id="{F352A77B-D33C-49B3-A83C-450AA2ED72B3}" type="datetimeFigureOut">
               <a:rPr lang="en-US" smtClean="0"/>
-              <a:t>2/13/2025</a:t>
+              <a:t>2/16/2025</a:t>
             </a:fld>
             <a:endParaRPr lang="en-US" dirty="0"/>
           </a:p>
@@ -420,7 +421,7 @@
           <a:p>
             <a:fld id="{E38D8F9A-F5CB-4EF8-A859-ED5E107B9763}" type="datetimeFigureOut">
               <a:rPr lang="en-US" smtClean="0"/>
-              <a:t>2/13/2025</a:t>
+              <a:t>2/16/2025</a:t>
             </a:fld>
             <a:endParaRPr lang="en-US" dirty="0"/>
           </a:p>
@@ -17124,15 +17125,12 @@
           <a:p>
             <a:pPr lvl="2"/>
             <a:r>
+              <a:rPr lang="fr-FR"/>
+              <a:t> NLP </a:t>
+            </a:r>
+            <a:r>
               <a:rPr lang="fr-FR" dirty="0"/>
-              <a:t> CV : Computer Vision</a:t>
-            </a:r>
-          </a:p>
-          <a:p>
-            <a:pPr lvl="2"/>
-            <a:r>
-              <a:rPr lang="fr-FR" dirty="0"/>
-              <a:t> NLP : Natural </a:t>
+              <a:t>: Natural </a:t>
             </a:r>
             <a:r>
               <a:rPr lang="fr-FR" dirty="0" err="1"/>
@@ -17804,9 +17802,9 @@
         <p:grpSpPr>
           <a:xfrm>
             <a:off x="7780546" y="2380193"/>
-            <a:ext cx="4114800" cy="1013870"/>
+            <a:ext cx="4114800" cy="1014514"/>
             <a:chOff x="2731654" y="2135928"/>
-            <a:chExt cx="4114800" cy="1013870"/>
+            <a:chExt cx="4114800" cy="1014514"/>
           </a:xfrm>
         </p:grpSpPr>
         <p:grpSp>
@@ -17824,9 +17822,9 @@
           <p:grpSpPr>
             <a:xfrm>
               <a:off x="2731654" y="2135928"/>
-              <a:ext cx="4114800" cy="1013870"/>
+              <a:ext cx="4114800" cy="1014514"/>
               <a:chOff x="3117818" y="1697484"/>
-              <a:chExt cx="4024682" cy="1013870"/>
+              <a:chExt cx="4024682" cy="1014514"/>
             </a:xfrm>
           </p:grpSpPr>
           <p:sp>
@@ -17903,7 +17901,7 @@
             </p:blipFill>
             <p:spPr>
               <a:xfrm>
-                <a:off x="6719253" y="2071994"/>
+                <a:off x="6719514" y="2315349"/>
                 <a:ext cx="396649" cy="396649"/>
               </a:xfrm>
               <a:prstGeom prst="rect">
@@ -18054,7 +18052,7 @@
         </p:nvGrpSpPr>
         <p:grpSpPr>
           <a:xfrm>
-            <a:off x="3491851" y="3471791"/>
+            <a:off x="5898582" y="2285565"/>
             <a:ext cx="1636568" cy="1354217"/>
             <a:chOff x="10430230" y="3528632"/>
             <a:chExt cx="1636568" cy="1354217"/>
@@ -18194,9 +18192,9 @@
           <p:nvPr/>
         </p:nvSpPr>
         <p:spPr>
-          <a:xfrm rot="5400000">
-            <a:off x="6268316" y="2925103"/>
-            <a:ext cx="242151" cy="2548950"/>
+          <a:xfrm rot="8913620">
+            <a:off x="7220012" y="3603374"/>
+            <a:ext cx="242151" cy="1265918"/>
           </a:xfrm>
           <a:prstGeom prst="downArrow">
             <a:avLst/>
@@ -18364,7 +18362,7 @@
         </p:nvGrpSpPr>
         <p:grpSpPr>
           <a:xfrm>
-            <a:off x="8615741" y="1718184"/>
+            <a:off x="7833462" y="1718184"/>
             <a:ext cx="547714" cy="671329"/>
             <a:chOff x="10257940" y="1022096"/>
             <a:chExt cx="547714" cy="671329"/>
@@ -18467,7 +18465,7 @@
         </p:nvGrpSpPr>
         <p:grpSpPr>
           <a:xfrm>
-            <a:off x="9306765" y="1718183"/>
+            <a:off x="10744604" y="1718184"/>
             <a:ext cx="1324530" cy="671329"/>
             <a:chOff x="10257940" y="1022096"/>
             <a:chExt cx="1324530" cy="671329"/>
@@ -18571,10 +18569,10 @@
         </p:nvGrpSpPr>
         <p:grpSpPr>
           <a:xfrm>
-            <a:off x="10631522" y="1643885"/>
-            <a:ext cx="1578098" cy="736150"/>
-            <a:chOff x="10421641" y="1652070"/>
-            <a:chExt cx="1578098" cy="736150"/>
+            <a:off x="9193151" y="1708785"/>
+            <a:ext cx="1581205" cy="671329"/>
+            <a:chOff x="10421641" y="1716891"/>
+            <a:chExt cx="1581205" cy="671329"/>
           </a:xfrm>
         </p:grpSpPr>
         <p:grpSp>
@@ -18591,10 +18589,10 @@
           </p:nvGrpSpPr>
           <p:grpSpPr>
             <a:xfrm>
-              <a:off x="10421641" y="1652070"/>
-              <a:ext cx="1495896" cy="736150"/>
-              <a:chOff x="10197912" y="963144"/>
-              <a:chExt cx="1495896" cy="736150"/>
+              <a:off x="10421641" y="1716891"/>
+              <a:ext cx="1507022" cy="671329"/>
+              <a:chOff x="10197912" y="1027965"/>
+              <a:chExt cx="1507022" cy="671329"/>
             </a:xfrm>
           </p:grpSpPr>
           <p:grpSp>
@@ -18715,7 +18713,7 @@
             </p:nvSpPr>
             <p:spPr>
               <a:xfrm>
-                <a:off x="10230715" y="963144"/>
+                <a:off x="10241841" y="1073898"/>
                 <a:ext cx="1463093" cy="307777"/>
               </a:xfrm>
               <a:prstGeom prst="rect">
@@ -18752,7 +18750,7 @@
           </p:nvSpPr>
           <p:spPr>
             <a:xfrm>
-              <a:off x="10454444" y="1926565"/>
+              <a:off x="10457551" y="2002222"/>
               <a:ext cx="1545295" cy="307777"/>
             </a:xfrm>
             <a:prstGeom prst="rect">
@@ -19479,7 +19477,7 @@
         </p:nvGrpSpPr>
         <p:grpSpPr>
           <a:xfrm>
-            <a:off x="5748969" y="678618"/>
+            <a:off x="4142054" y="686811"/>
             <a:ext cx="1914898" cy="914400"/>
             <a:chOff x="8631844" y="767946"/>
             <a:chExt cx="1914898" cy="914400"/>
@@ -19618,7 +19616,7 @@
         </p:nvGrpSpPr>
         <p:grpSpPr>
           <a:xfrm>
-            <a:off x="5266720" y="2342971"/>
+            <a:off x="3659805" y="2351164"/>
             <a:ext cx="1939528" cy="999802"/>
             <a:chOff x="5051560" y="1657093"/>
             <a:chExt cx="1939528" cy="999802"/>
@@ -19777,7 +19775,7 @@
         </p:nvGrpSpPr>
         <p:grpSpPr>
           <a:xfrm>
-            <a:off x="6114370" y="1637672"/>
+            <a:off x="4507455" y="1645865"/>
             <a:ext cx="788549" cy="705823"/>
             <a:chOff x="10257940" y="1022096"/>
             <a:chExt cx="788549" cy="671329"/>
@@ -20278,9 +20276,9 @@
         </p:nvGrpSpPr>
         <p:grpSpPr>
           <a:xfrm>
-            <a:off x="7806113" y="1708705"/>
+            <a:off x="8392059" y="1701912"/>
             <a:ext cx="818109" cy="671329"/>
-            <a:chOff x="10257940" y="1022096"/>
+            <a:chOff x="10248995" y="1022096"/>
             <a:chExt cx="818109" cy="671329"/>
           </a:xfrm>
         </p:grpSpPr>
@@ -20345,7 +20343,7 @@
           </p:nvSpPr>
           <p:spPr>
             <a:xfrm>
-              <a:off x="10257940" y="1156538"/>
+              <a:off x="10248995" y="1074209"/>
               <a:ext cx="818109" cy="523220"/>
             </a:xfrm>
             <a:prstGeom prst="rect">
@@ -20373,6 +20371,53 @@
           </p:txBody>
         </p:sp>
       </p:grpSp>
+      <p:cxnSp>
+        <p:nvCxnSpPr>
+          <p:cNvPr id="6" name="Connecteur droit avec flèche 5">
+            <a:extLst>
+              <a:ext uri="{FF2B5EF4-FFF2-40B4-BE49-F238E27FC236}">
+                <a16:creationId xmlns:a16="http://schemas.microsoft.com/office/drawing/2014/main" id="{CF047A2B-EE31-13F0-7067-4FF4A00E7F2A}"/>
+              </a:ext>
+            </a:extLst>
+          </p:cNvPr>
+          <p:cNvCxnSpPr>
+            <a:cxnSpLocks/>
+          </p:cNvCxnSpPr>
+          <p:nvPr/>
+        </p:nvCxnSpPr>
+        <p:spPr>
+          <a:xfrm flipV="1">
+            <a:off x="6907635" y="1685190"/>
+            <a:ext cx="790180" cy="540967"/>
+          </a:xfrm>
+          <a:prstGeom prst="straightConnector1">
+            <a:avLst/>
+          </a:prstGeom>
+          <a:ln w="19050" cap="flat" cmpd="sng" algn="ctr">
+            <a:solidFill>
+              <a:schemeClr val="accent5"/>
+            </a:solidFill>
+            <a:prstDash val="dash"/>
+            <a:round/>
+            <a:headEnd type="none" w="med" len="med"/>
+            <a:tailEnd type="arrow" w="med" len="med"/>
+          </a:ln>
+        </p:spPr>
+        <p:style>
+          <a:lnRef idx="0">
+            <a:scrgbClr r="0" g="0" b="0"/>
+          </a:lnRef>
+          <a:fillRef idx="0">
+            <a:scrgbClr r="0" g="0" b="0"/>
+          </a:fillRef>
+          <a:effectRef idx="0">
+            <a:scrgbClr r="0" g="0" b="0"/>
+          </a:effectRef>
+          <a:fontRef idx="minor">
+            <a:schemeClr val="tx1"/>
+          </a:fontRef>
+        </p:style>
+      </p:cxnSp>
     </p:spTree>
     <p:extLst>
       <p:ext uri="{BB962C8B-B14F-4D97-AF65-F5344CB8AC3E}">
@@ -20817,6 +20862,33 @@
                                   </p:childTnLst>
                                 </p:cTn>
                               </p:par>
+                              <p:par>
+                                <p:cTn id="39" presetID="1" presetClass="entr" presetSubtype="0" fill="hold" nodeType="withEffect">
+                                  <p:stCondLst>
+                                    <p:cond delay="0"/>
+                                  </p:stCondLst>
+                                  <p:childTnLst>
+                                    <p:set>
+                                      <p:cBhvr>
+                                        <p:cTn id="40" dur="1" fill="hold">
+                                          <p:stCondLst>
+                                            <p:cond delay="0"/>
+                                          </p:stCondLst>
+                                        </p:cTn>
+                                        <p:tgtEl>
+                                          <p:spTgt spid="6"/>
+                                        </p:tgtEl>
+                                        <p:attrNameLst>
+                                          <p:attrName>style.visibility</p:attrName>
+                                        </p:attrNameLst>
+                                      </p:cBhvr>
+                                      <p:to>
+                                        <p:strVal val="visible"/>
+                                      </p:to>
+                                    </p:set>
+                                  </p:childTnLst>
+                                </p:cTn>
+                              </p:par>
                             </p:childTnLst>
                           </p:cTn>
                         </p:par>
@@ -20824,26 +20896,26 @@
                     </p:cTn>
                   </p:par>
                   <p:par>
-                    <p:cTn id="39" fill="hold">
+                    <p:cTn id="41" fill="hold">
                       <p:stCondLst>
                         <p:cond delay="indefinite"/>
                       </p:stCondLst>
                       <p:childTnLst>
                         <p:par>
-                          <p:cTn id="40" fill="hold">
+                          <p:cTn id="42" fill="hold">
                             <p:stCondLst>
                               <p:cond delay="0"/>
                             </p:stCondLst>
                             <p:childTnLst>
                               <p:par>
-                                <p:cTn id="41" presetID="1" presetClass="entr" presetSubtype="0" fill="hold" nodeType="clickEffect">
+                                <p:cTn id="43" presetID="1" presetClass="entr" presetSubtype="0" fill="hold" nodeType="clickEffect">
                                   <p:stCondLst>
                                     <p:cond delay="0"/>
                                   </p:stCondLst>
                                   <p:childTnLst>
                                     <p:set>
                                       <p:cBhvr>
-                                        <p:cTn id="42" dur="1" fill="hold">
+                                        <p:cTn id="44" dur="1" fill="hold">
                                           <p:stCondLst>
                                             <p:cond delay="0"/>
                                           </p:stCondLst>
@@ -20863,14 +20935,14 @@
                                 </p:cTn>
                               </p:par>
                               <p:par>
-                                <p:cTn id="43" presetID="1" presetClass="entr" presetSubtype="0" fill="hold" grpId="0" nodeType="withEffect">
+                                <p:cTn id="45" presetID="1" presetClass="entr" presetSubtype="0" fill="hold" grpId="0" nodeType="withEffect">
                                   <p:stCondLst>
                                     <p:cond delay="0"/>
                                   </p:stCondLst>
                                   <p:childTnLst>
                                     <p:set>
                                       <p:cBhvr>
-                                        <p:cTn id="44" dur="1" fill="hold">
+                                        <p:cTn id="46" dur="1" fill="hold">
                                           <p:stCondLst>
                                             <p:cond delay="0"/>
                                           </p:stCondLst>
@@ -20896,26 +20968,26 @@
                     </p:cTn>
                   </p:par>
                   <p:par>
-                    <p:cTn id="45" fill="hold">
+                    <p:cTn id="47" fill="hold">
                       <p:stCondLst>
                         <p:cond delay="indefinite"/>
                       </p:stCondLst>
                       <p:childTnLst>
                         <p:par>
-                          <p:cTn id="46" fill="hold">
+                          <p:cTn id="48" fill="hold">
                             <p:stCondLst>
                               <p:cond delay="0"/>
                             </p:stCondLst>
                             <p:childTnLst>
                               <p:par>
-                                <p:cTn id="47" presetID="1" presetClass="entr" presetSubtype="0" fill="hold" nodeType="clickEffect">
+                                <p:cTn id="49" presetID="1" presetClass="entr" presetSubtype="0" fill="hold" nodeType="clickEffect">
                                   <p:stCondLst>
                                     <p:cond delay="0"/>
                                   </p:stCondLst>
                                   <p:childTnLst>
                                     <p:set>
                                       <p:cBhvr>
-                                        <p:cTn id="48" dur="1" fill="hold">
+                                        <p:cTn id="50" dur="1" fill="hold">
                                           <p:stCondLst>
                                             <p:cond delay="0"/>
                                           </p:stCondLst>
@@ -20979,6 +21051,216 @@
         <p:cNvPr id="1" name="">
           <a:extLst>
             <a:ext uri="{FF2B5EF4-FFF2-40B4-BE49-F238E27FC236}">
+              <a16:creationId xmlns:a16="http://schemas.microsoft.com/office/drawing/2014/main" id="{CFEA5D44-5DD5-7D5E-6E74-8580E50879F9}"/>
+            </a:ext>
+          </a:extLst>
+        </p:cNvPr>
+        <p:cNvGrpSpPr/>
+        <p:nvPr/>
+      </p:nvGrpSpPr>
+      <p:grpSpPr>
+        <a:xfrm>
+          <a:off x="0" y="0"/>
+          <a:ext cx="0" cy="0"/>
+          <a:chOff x="0" y="0"/>
+          <a:chExt cx="0" cy="0"/>
+        </a:xfrm>
+      </p:grpSpPr>
+      <p:sp>
+        <p:nvSpPr>
+          <p:cNvPr id="2" name="Titre 1">
+            <a:extLst>
+              <a:ext uri="{FF2B5EF4-FFF2-40B4-BE49-F238E27FC236}">
+                <a16:creationId xmlns:a16="http://schemas.microsoft.com/office/drawing/2014/main" id="{175DFD04-3CD8-8A91-4EC0-CC12740D3E67}"/>
+              </a:ext>
+            </a:extLst>
+          </p:cNvPr>
+          <p:cNvSpPr>
+            <a:spLocks noGrp="1"/>
+          </p:cNvSpPr>
+          <p:nvPr>
+            <p:ph type="title"/>
+          </p:nvPr>
+        </p:nvSpPr>
+        <p:spPr>
+          <a:xfrm>
+            <a:off x="838200" y="222062"/>
+            <a:ext cx="10963274" cy="583781"/>
+          </a:xfrm>
+        </p:spPr>
+        <p:txBody>
+          <a:bodyPr/>
+          <a:lstStyle/>
+          <a:p>
+            <a:r>
+              <a:rPr lang="fr-FR" dirty="0"/>
+              <a:t>Démo</a:t>
+            </a:r>
+            <a:endParaRPr lang="en-US" dirty="0"/>
+          </a:p>
+        </p:txBody>
+      </p:sp>
+      <p:sp>
+        <p:nvSpPr>
+          <p:cNvPr id="3" name="Espace réservé de la date 2">
+            <a:extLst>
+              <a:ext uri="{FF2B5EF4-FFF2-40B4-BE49-F238E27FC236}">
+                <a16:creationId xmlns:a16="http://schemas.microsoft.com/office/drawing/2014/main" id="{8CDBC0DD-81BE-C619-6D94-294A94A11AF8}"/>
+              </a:ext>
+            </a:extLst>
+          </p:cNvPr>
+          <p:cNvSpPr>
+            <a:spLocks noGrp="1"/>
+          </p:cNvSpPr>
+          <p:nvPr>
+            <p:ph type="dt" sz="half" idx="10"/>
+          </p:nvPr>
+        </p:nvSpPr>
+        <p:spPr>
+          <a:xfrm>
+            <a:off x="838200" y="6356350"/>
+            <a:ext cx="2743200" cy="365125"/>
+          </a:xfrm>
+        </p:spPr>
+        <p:txBody>
+          <a:bodyPr/>
+          <a:lstStyle/>
+          <a:p>
+            <a:r>
+              <a:rPr lang="en-US"/>
+              <a:t>2024</a:t>
+            </a:r>
+            <a:endParaRPr lang="en-US" dirty="0"/>
+          </a:p>
+        </p:txBody>
+      </p:sp>
+      <p:sp>
+        <p:nvSpPr>
+          <p:cNvPr id="4" name="Espace réservé du pied de page 3">
+            <a:extLst>
+              <a:ext uri="{FF2B5EF4-FFF2-40B4-BE49-F238E27FC236}">
+                <a16:creationId xmlns:a16="http://schemas.microsoft.com/office/drawing/2014/main" id="{EA54689C-93DA-4F92-4919-13D5E1A129AF}"/>
+              </a:ext>
+            </a:extLst>
+          </p:cNvPr>
+          <p:cNvSpPr>
+            <a:spLocks noGrp="1"/>
+          </p:cNvSpPr>
+          <p:nvPr>
+            <p:ph type="ftr" sz="quarter" idx="11"/>
+          </p:nvPr>
+        </p:nvSpPr>
+        <p:spPr>
+          <a:xfrm>
+            <a:off x="4038600" y="6356350"/>
+            <a:ext cx="4114800" cy="365125"/>
+          </a:xfrm>
+        </p:spPr>
+        <p:txBody>
+          <a:bodyPr/>
+          <a:lstStyle/>
+          <a:p>
+            <a:r>
+              <a:rPr lang="en-US"/>
+              <a:t>Projet classification de documents</a:t>
+            </a:r>
+            <a:endParaRPr lang="en-US" dirty="0"/>
+          </a:p>
+        </p:txBody>
+      </p:sp>
+      <p:sp>
+        <p:nvSpPr>
+          <p:cNvPr id="5" name="Espace réservé du numéro de diapositive 4">
+            <a:extLst>
+              <a:ext uri="{FF2B5EF4-FFF2-40B4-BE49-F238E27FC236}">
+                <a16:creationId xmlns:a16="http://schemas.microsoft.com/office/drawing/2014/main" id="{255ABB50-16DF-C8FD-3181-C44ABE001DFB}"/>
+              </a:ext>
+            </a:extLst>
+          </p:cNvPr>
+          <p:cNvSpPr>
+            <a:spLocks noGrp="1"/>
+          </p:cNvSpPr>
+          <p:nvPr>
+            <p:ph type="sldNum" sz="quarter" idx="12"/>
+          </p:nvPr>
+        </p:nvSpPr>
+        <p:spPr>
+          <a:xfrm>
+            <a:off x="8610600" y="6356350"/>
+            <a:ext cx="2743200" cy="365125"/>
+          </a:xfrm>
+        </p:spPr>
+        <p:txBody>
+          <a:bodyPr/>
+          <a:lstStyle/>
+          <a:p>
+            <a:fld id="{B5CEABB6-07DC-46E8-9B57-56EC44A396E5}" type="slidenum">
+              <a:rPr lang="en-US" smtClean="0"/>
+              <a:pPr/>
+              <a:t>5</a:t>
+            </a:fld>
+            <a:endParaRPr lang="en-US" dirty="0"/>
+          </a:p>
+        </p:txBody>
+      </p:sp>
+      <p:sp>
+        <p:nvSpPr>
+          <p:cNvPr id="6" name="Espace réservé du contenu 5">
+            <a:extLst>
+              <a:ext uri="{FF2B5EF4-FFF2-40B4-BE49-F238E27FC236}">
+                <a16:creationId xmlns:a16="http://schemas.microsoft.com/office/drawing/2014/main" id="{BE79C5BA-6054-1CFF-E12B-B1A0C802D7BB}"/>
+              </a:ext>
+            </a:extLst>
+          </p:cNvPr>
+          <p:cNvSpPr>
+            <a:spLocks noGrp="1"/>
+          </p:cNvSpPr>
+          <p:nvPr>
+            <p:ph sz="quarter" idx="16"/>
+          </p:nvPr>
+        </p:nvSpPr>
+        <p:spPr>
+          <a:xfrm>
+            <a:off x="838200" y="1198562"/>
+            <a:ext cx="11114988" cy="5079689"/>
+          </a:xfrm>
+        </p:spPr>
+        <p:txBody>
+          <a:bodyPr/>
+          <a:lstStyle/>
+          <a:p>
+            <a:r>
+              <a:rPr lang="fr-FR" dirty="0"/>
+              <a:t>Démo de cas d’usage User et Admin</a:t>
+            </a:r>
+          </a:p>
+          <a:p>
+            <a:pPr lvl="1"/>
+            <a:endParaRPr lang="fr-FR" sz="1600" dirty="0"/>
+          </a:p>
+        </p:txBody>
+      </p:sp>
+    </p:spTree>
+    <p:extLst>
+      <p:ext uri="{BB962C8B-B14F-4D97-AF65-F5344CB8AC3E}">
+        <p14:creationId xmlns:p14="http://schemas.microsoft.com/office/powerpoint/2010/main" val="3653420627"/>
+      </p:ext>
+    </p:extLst>
+  </p:cSld>
+  <p:clrMapOvr>
+    <a:masterClrMapping/>
+  </p:clrMapOvr>
+</p:sld>
+</file>
+
+<file path=ppt/slides/slide6.xml><?xml version="1.0" encoding="utf-8"?>
+<p:sld xmlns:a="http://schemas.openxmlformats.org/drawingml/2006/main" xmlns:r="http://schemas.openxmlformats.org/officeDocument/2006/relationships" xmlns:p="http://schemas.openxmlformats.org/presentationml/2006/main">
+  <p:cSld>
+    <p:spTree>
+      <p:nvGrpSpPr>
+        <p:cNvPr id="1" name="">
+          <a:extLst>
+            <a:ext uri="{FF2B5EF4-FFF2-40B4-BE49-F238E27FC236}">
               <a16:creationId xmlns:a16="http://schemas.microsoft.com/office/drawing/2014/main" id="{04497FF6-186B-0CFC-1F4B-026E356933F1}"/>
             </a:ext>
           </a:extLst>
@@ -21125,7 +21407,7 @@
             <a:fld id="{B5CEABB6-07DC-46E8-9B57-56EC44A396E5}" type="slidenum">
               <a:rPr lang="en-US" smtClean="0"/>
               <a:pPr/>
-              <a:t>5</a:t>
+              <a:t>6</a:t>
             </a:fld>
             <a:endParaRPr lang="en-US" dirty="0"/>
           </a:p>
@@ -21206,7 +21488,7 @@
 </p:sld>
 </file>
 
-<file path=ppt/slides/slide6.xml><?xml version="1.0" encoding="utf-8"?>
+<file path=ppt/slides/slide7.xml><?xml version="1.0" encoding="utf-8"?>
 <p:sld xmlns:a="http://schemas.openxmlformats.org/drawingml/2006/main" xmlns:r="http://schemas.openxmlformats.org/officeDocument/2006/relationships" xmlns:p="http://schemas.openxmlformats.org/presentationml/2006/main">
   <p:cSld>
     <p:spTree>
@@ -21360,7 +21642,7 @@
             <a:fld id="{B5CEABB6-07DC-46E8-9B57-56EC44A396E5}" type="slidenum">
               <a:rPr lang="en-US" smtClean="0"/>
               <a:pPr/>
-              <a:t>6</a:t>
+              <a:t>7</a:t>
             </a:fld>
             <a:endParaRPr lang="en-US" dirty="0"/>
           </a:p>

</xml_diff>

<commit_message>
mise à jour de slide + 1ere video de 4 min
</commit_message>
<xml_diff>
--- a/report/Projet_classification_MLOps_Partie1_Eddie.pptx
+++ b/report/Projet_classification_MLOps_Partie1_Eddie.pptx
@@ -244,7 +244,7 @@
           <a:p>
             <a:fld id="{F352A77B-D33C-49B3-A83C-450AA2ED72B3}" type="datetimeFigureOut">
               <a:rPr lang="en-US" smtClean="0"/>
-              <a:t>2/16/2025</a:t>
+              <a:t>2/21/2025</a:t>
             </a:fld>
             <a:endParaRPr lang="en-US" dirty="0"/>
           </a:p>
@@ -421,7 +421,7 @@
           <a:p>
             <a:fld id="{E38D8F9A-F5CB-4EF8-A859-ED5E107B9763}" type="datetimeFigureOut">
               <a:rPr lang="en-US" smtClean="0"/>
-              <a:t>2/16/2025</a:t>
+              <a:t>2/21/2025</a:t>
             </a:fld>
             <a:endParaRPr lang="en-US" dirty="0"/>
           </a:p>
@@ -21094,7 +21094,7 @@
           <a:p>
             <a:r>
               <a:rPr lang="fr-FR" dirty="0"/>
-              <a:t>Démonstration</a:t>
+              <a:t>Scénario de démo</a:t>
             </a:r>
             <a:endParaRPr lang="en-US" dirty="0"/>
           </a:p>
@@ -21222,7 +21222,7 @@
         <p:spPr>
           <a:xfrm>
             <a:off x="838200" y="1198562"/>
-            <a:ext cx="11114988" cy="5079689"/>
+            <a:ext cx="10634221" cy="5315360"/>
           </a:xfrm>
         </p:spPr>
         <p:txBody>
@@ -21231,8 +21231,173 @@
           <a:p>
             <a:r>
               <a:rPr lang="fr-FR" dirty="0"/>
-              <a:t>Démo de cas d’usage User et Admin</a:t>
-            </a:r>
+              <a:t>Démo de cas d’usage User</a:t>
+            </a:r>
+          </a:p>
+          <a:p>
+            <a:pPr marL="971550" lvl="1" indent="-514350">
+              <a:buFont typeface="+mj-lt"/>
+              <a:buAutoNum type="arabicPeriod"/>
+            </a:pPr>
+            <a:r>
+              <a:rPr lang="fr-FR" dirty="0"/>
+              <a:t>User lance une prédiction sur quelques images</a:t>
+            </a:r>
+          </a:p>
+          <a:p>
+            <a:pPr marL="971550" lvl="1" indent="-514350">
+              <a:buFont typeface="+mj-lt"/>
+              <a:buAutoNum type="arabicPeriod"/>
+            </a:pPr>
+            <a:r>
+              <a:rPr lang="fr-FR" dirty="0"/>
+              <a:t>User récupère les prédictions en asynchrone sur ces images</a:t>
+            </a:r>
+          </a:p>
+          <a:p>
+            <a:pPr lvl="2"/>
+            <a:r>
+              <a:rPr lang="fr-FR" dirty="0"/>
+              <a:t>User vérifie les prédictions et fait quelques corrections de prédiction</a:t>
+            </a:r>
+          </a:p>
+          <a:p>
+            <a:pPr marL="228600" marR="0" lvl="0" indent="-228600" algn="l" defTabSz="914400" rtl="0" eaLnBrk="1" fontAlgn="auto" latinLnBrk="0" hangingPunct="1">
+              <a:lnSpc>
+                <a:spcPct val="90000"/>
+              </a:lnSpc>
+              <a:spcBef>
+                <a:spcPts val="1000"/>
+              </a:spcBef>
+              <a:spcAft>
+                <a:spcPts val="0"/>
+              </a:spcAft>
+              <a:buClrTx/>
+              <a:buSzTx/>
+              <a:buFont typeface="Arial" panose="020B0604020202020204" pitchFamily="34" charset="0"/>
+              <a:buChar char="•"/>
+              <a:tabLst/>
+              <a:defRPr/>
+            </a:pPr>
+            <a:r>
+              <a:rPr kumimoji="0" lang="fr-FR" sz="2800" b="0" i="0" u="none" strike="noStrike" kern="1200" cap="none" spc="0" normalizeH="0" baseline="0" noProof="0" dirty="0">
+                <a:ln>
+                  <a:noFill/>
+                </a:ln>
+                <a:solidFill>
+                  <a:prstClr val="black"/>
+                </a:solidFill>
+                <a:effectLst/>
+                <a:uLnTx/>
+                <a:uFillTx/>
+                <a:latin typeface="Tenorite"/>
+                <a:ea typeface="+mn-ea"/>
+                <a:cs typeface="+mn-cs"/>
+              </a:rPr>
+              <a:t>Démo de cas d’usage Admin</a:t>
+            </a:r>
+          </a:p>
+          <a:p>
+            <a:pPr marL="971550" lvl="1" indent="-514350">
+              <a:buFont typeface="+mj-lt"/>
+              <a:buAutoNum type="arabicPeriod"/>
+            </a:pPr>
+            <a:r>
+              <a:rPr lang="fr-FR" dirty="0"/>
+              <a:t>Admin a été informé que des prédictions ont </a:t>
+            </a:r>
+            <a:r>
+              <a:rPr lang="fr-FR"/>
+              <a:t>été corrigées</a:t>
+            </a:r>
+            <a:endParaRPr lang="fr-FR" dirty="0"/>
+          </a:p>
+          <a:p>
+            <a:pPr marL="971550" lvl="1" indent="-514350">
+              <a:buFont typeface="+mj-lt"/>
+              <a:buAutoNum type="arabicPeriod"/>
+            </a:pPr>
+            <a:r>
+              <a:rPr lang="fr-FR" dirty="0"/>
+              <a:t>Admin ajoute ces images de prédiction corrigées au jeu d’entrainement</a:t>
+            </a:r>
+          </a:p>
+          <a:p>
+            <a:pPr marL="971550" lvl="1" indent="-514350">
+              <a:buFont typeface="+mj-lt"/>
+              <a:buAutoNum type="arabicPeriod"/>
+            </a:pPr>
+            <a:r>
+              <a:rPr lang="fr-FR" dirty="0"/>
+              <a:t>Admin lance un entrainement avec ces nouvelles images et patiente</a:t>
+            </a:r>
+          </a:p>
+          <a:p>
+            <a:pPr marL="971550" lvl="1" indent="-514350">
+              <a:buFont typeface="+mj-lt"/>
+              <a:buAutoNum type="arabicPeriod"/>
+            </a:pPr>
+            <a:r>
+              <a:rPr lang="fr-FR" dirty="0"/>
+              <a:t>Admin surveille les dockers de la pipeline Training avec </a:t>
+            </a:r>
+            <a:r>
+              <a:rPr lang="fr-FR" dirty="0" err="1"/>
+              <a:t>Grafana</a:t>
+            </a:r>
+            <a:endParaRPr lang="fr-FR" dirty="0"/>
+          </a:p>
+          <a:p>
+            <a:pPr marL="971550" lvl="1" indent="-514350">
+              <a:buFont typeface="+mj-lt"/>
+              <a:buAutoNum type="arabicPeriod"/>
+            </a:pPr>
+            <a:r>
+              <a:rPr lang="fr-FR" dirty="0"/>
+              <a:t>Admin regarde les performances du dernier entrainement</a:t>
+            </a:r>
+          </a:p>
+          <a:p>
+            <a:pPr marL="971550" lvl="1" indent="-514350">
+              <a:buFont typeface="+mj-lt"/>
+              <a:buAutoNum type="arabicPeriod"/>
+            </a:pPr>
+            <a:r>
+              <a:rPr lang="fr-FR" dirty="0"/>
+              <a:t>Admin compare les performances des différents modèles historiques, et il choisit le meilleur environnement (</a:t>
+            </a:r>
+            <a:r>
+              <a:rPr lang="fr-FR" dirty="0" err="1"/>
+              <a:t>données+modèles</a:t>
+            </a:r>
+            <a:r>
+              <a:rPr lang="fr-FR" dirty="0"/>
+              <a:t>) et le restaure </a:t>
+            </a:r>
+          </a:p>
+          <a:p>
+            <a:pPr marL="971550" lvl="1" indent="-514350">
+              <a:buFont typeface="+mj-lt"/>
+              <a:buAutoNum type="arabicPeriod"/>
+            </a:pPr>
+            <a:r>
+              <a:rPr lang="fr-FR" dirty="0"/>
+              <a:t>Admin enregistre le modèle qui sera utilisé pour les futures prédictions</a:t>
+            </a:r>
+          </a:p>
+          <a:p>
+            <a:pPr marL="971550" lvl="1" indent="-514350">
+              <a:buFont typeface="+mj-lt"/>
+              <a:buAutoNum type="arabicPeriod"/>
+            </a:pPr>
+            <a:endParaRPr lang="fr-FR" dirty="0"/>
+          </a:p>
+          <a:p>
+            <a:pPr marL="971550" lvl="1" indent="-514350">
+              <a:buFont typeface="+mj-lt"/>
+              <a:buAutoNum type="arabicPeriod"/>
+            </a:pPr>
+            <a:endParaRPr lang="fr-FR" dirty="0"/>
           </a:p>
           <a:p>
             <a:pPr lvl="1"/>
@@ -21250,6 +21415,382 @@
   <p:clrMapOvr>
     <a:masterClrMapping/>
   </p:clrMapOvr>
+  <p:timing>
+    <p:tnLst>
+      <p:par>
+        <p:cTn id="1" dur="indefinite" restart="never" nodeType="tmRoot">
+          <p:childTnLst>
+            <p:seq concurrent="1" nextAc="seek">
+              <p:cTn id="2" dur="indefinite" nodeType="mainSeq">
+                <p:childTnLst>
+                  <p:par>
+                    <p:cTn id="3" fill="hold">
+                      <p:stCondLst>
+                        <p:cond delay="indefinite"/>
+                      </p:stCondLst>
+                      <p:childTnLst>
+                        <p:par>
+                          <p:cTn id="4" fill="hold">
+                            <p:stCondLst>
+                              <p:cond delay="0"/>
+                            </p:stCondLst>
+                            <p:childTnLst>
+                              <p:par>
+                                <p:cTn id="5" presetID="1" presetClass="entr" presetSubtype="0" fill="hold" nodeType="clickEffect">
+                                  <p:stCondLst>
+                                    <p:cond delay="0"/>
+                                  </p:stCondLst>
+                                  <p:childTnLst>
+                                    <p:set>
+                                      <p:cBhvr>
+                                        <p:cTn id="6" dur="1" fill="hold">
+                                          <p:stCondLst>
+                                            <p:cond delay="0"/>
+                                          </p:stCondLst>
+                                        </p:cTn>
+                                        <p:tgtEl>
+                                          <p:spTgt spid="6">
+                                            <p:txEl>
+                                              <p:pRg st="1" end="1"/>
+                                            </p:txEl>
+                                          </p:spTgt>
+                                        </p:tgtEl>
+                                        <p:attrNameLst>
+                                          <p:attrName>style.visibility</p:attrName>
+                                        </p:attrNameLst>
+                                      </p:cBhvr>
+                                      <p:to>
+                                        <p:strVal val="visible"/>
+                                      </p:to>
+                                    </p:set>
+                                  </p:childTnLst>
+                                </p:cTn>
+                              </p:par>
+                              <p:par>
+                                <p:cTn id="7" presetID="1" presetClass="entr" presetSubtype="0" fill="hold" nodeType="withEffect">
+                                  <p:stCondLst>
+                                    <p:cond delay="0"/>
+                                  </p:stCondLst>
+                                  <p:childTnLst>
+                                    <p:set>
+                                      <p:cBhvr>
+                                        <p:cTn id="8" dur="1" fill="hold">
+                                          <p:stCondLst>
+                                            <p:cond delay="0"/>
+                                          </p:stCondLst>
+                                        </p:cTn>
+                                        <p:tgtEl>
+                                          <p:spTgt spid="6">
+                                            <p:txEl>
+                                              <p:pRg st="2" end="2"/>
+                                            </p:txEl>
+                                          </p:spTgt>
+                                        </p:tgtEl>
+                                        <p:attrNameLst>
+                                          <p:attrName>style.visibility</p:attrName>
+                                        </p:attrNameLst>
+                                      </p:cBhvr>
+                                      <p:to>
+                                        <p:strVal val="visible"/>
+                                      </p:to>
+                                    </p:set>
+                                  </p:childTnLst>
+                                </p:cTn>
+                              </p:par>
+                              <p:par>
+                                <p:cTn id="9" presetID="1" presetClass="entr" presetSubtype="0" fill="hold" nodeType="withEffect">
+                                  <p:stCondLst>
+                                    <p:cond delay="0"/>
+                                  </p:stCondLst>
+                                  <p:childTnLst>
+                                    <p:set>
+                                      <p:cBhvr>
+                                        <p:cTn id="10" dur="1" fill="hold">
+                                          <p:stCondLst>
+                                            <p:cond delay="0"/>
+                                          </p:stCondLst>
+                                        </p:cTn>
+                                        <p:tgtEl>
+                                          <p:spTgt spid="6">
+                                            <p:txEl>
+                                              <p:pRg st="3" end="3"/>
+                                            </p:txEl>
+                                          </p:spTgt>
+                                        </p:tgtEl>
+                                        <p:attrNameLst>
+                                          <p:attrName>style.visibility</p:attrName>
+                                        </p:attrNameLst>
+                                      </p:cBhvr>
+                                      <p:to>
+                                        <p:strVal val="visible"/>
+                                      </p:to>
+                                    </p:set>
+                                  </p:childTnLst>
+                                </p:cTn>
+                              </p:par>
+                            </p:childTnLst>
+                          </p:cTn>
+                        </p:par>
+                      </p:childTnLst>
+                    </p:cTn>
+                  </p:par>
+                  <p:par>
+                    <p:cTn id="11" fill="hold">
+                      <p:stCondLst>
+                        <p:cond delay="indefinite"/>
+                      </p:stCondLst>
+                      <p:childTnLst>
+                        <p:par>
+                          <p:cTn id="12" fill="hold">
+                            <p:stCondLst>
+                              <p:cond delay="0"/>
+                            </p:stCondLst>
+                            <p:childTnLst>
+                              <p:par>
+                                <p:cTn id="13" presetID="1" presetClass="entr" presetSubtype="0" fill="hold" nodeType="clickEffect">
+                                  <p:stCondLst>
+                                    <p:cond delay="0"/>
+                                  </p:stCondLst>
+                                  <p:childTnLst>
+                                    <p:set>
+                                      <p:cBhvr>
+                                        <p:cTn id="14" dur="1" fill="hold">
+                                          <p:stCondLst>
+                                            <p:cond delay="0"/>
+                                          </p:stCondLst>
+                                        </p:cTn>
+                                        <p:tgtEl>
+                                          <p:spTgt spid="6">
+                                            <p:txEl>
+                                              <p:pRg st="5" end="5"/>
+                                            </p:txEl>
+                                          </p:spTgt>
+                                        </p:tgtEl>
+                                        <p:attrNameLst>
+                                          <p:attrName>style.visibility</p:attrName>
+                                        </p:attrNameLst>
+                                      </p:cBhvr>
+                                      <p:to>
+                                        <p:strVal val="visible"/>
+                                      </p:to>
+                                    </p:set>
+                                  </p:childTnLst>
+                                </p:cTn>
+                              </p:par>
+                              <p:par>
+                                <p:cTn id="15" presetID="1" presetClass="entr" presetSubtype="0" fill="hold" nodeType="withEffect">
+                                  <p:stCondLst>
+                                    <p:cond delay="0"/>
+                                  </p:stCondLst>
+                                  <p:childTnLst>
+                                    <p:set>
+                                      <p:cBhvr>
+                                        <p:cTn id="16" dur="1" fill="hold">
+                                          <p:stCondLst>
+                                            <p:cond delay="0"/>
+                                          </p:stCondLst>
+                                        </p:cTn>
+                                        <p:tgtEl>
+                                          <p:spTgt spid="6">
+                                            <p:txEl>
+                                              <p:pRg st="6" end="6"/>
+                                            </p:txEl>
+                                          </p:spTgt>
+                                        </p:tgtEl>
+                                        <p:attrNameLst>
+                                          <p:attrName>style.visibility</p:attrName>
+                                        </p:attrNameLst>
+                                      </p:cBhvr>
+                                      <p:to>
+                                        <p:strVal val="visible"/>
+                                      </p:to>
+                                    </p:set>
+                                  </p:childTnLst>
+                                </p:cTn>
+                              </p:par>
+                              <p:par>
+                                <p:cTn id="17" presetID="1" presetClass="entr" presetSubtype="0" fill="hold" nodeType="withEffect">
+                                  <p:stCondLst>
+                                    <p:cond delay="0"/>
+                                  </p:stCondLst>
+                                  <p:childTnLst>
+                                    <p:set>
+                                      <p:cBhvr>
+                                        <p:cTn id="18" dur="1" fill="hold">
+                                          <p:stCondLst>
+                                            <p:cond delay="0"/>
+                                          </p:stCondLst>
+                                        </p:cTn>
+                                        <p:tgtEl>
+                                          <p:spTgt spid="6">
+                                            <p:txEl>
+                                              <p:pRg st="7" end="7"/>
+                                            </p:txEl>
+                                          </p:spTgt>
+                                        </p:tgtEl>
+                                        <p:attrNameLst>
+                                          <p:attrName>style.visibility</p:attrName>
+                                        </p:attrNameLst>
+                                      </p:cBhvr>
+                                      <p:to>
+                                        <p:strVal val="visible"/>
+                                      </p:to>
+                                    </p:set>
+                                  </p:childTnLst>
+                                </p:cTn>
+                              </p:par>
+                              <p:par>
+                                <p:cTn id="19" presetID="1" presetClass="entr" presetSubtype="0" fill="hold" nodeType="withEffect">
+                                  <p:stCondLst>
+                                    <p:cond delay="0"/>
+                                  </p:stCondLst>
+                                  <p:childTnLst>
+                                    <p:set>
+                                      <p:cBhvr>
+                                        <p:cTn id="20" dur="1" fill="hold">
+                                          <p:stCondLst>
+                                            <p:cond delay="0"/>
+                                          </p:stCondLst>
+                                        </p:cTn>
+                                        <p:tgtEl>
+                                          <p:spTgt spid="6">
+                                            <p:txEl>
+                                              <p:pRg st="8" end="8"/>
+                                            </p:txEl>
+                                          </p:spTgt>
+                                        </p:tgtEl>
+                                        <p:attrNameLst>
+                                          <p:attrName>style.visibility</p:attrName>
+                                        </p:attrNameLst>
+                                      </p:cBhvr>
+                                      <p:to>
+                                        <p:strVal val="visible"/>
+                                      </p:to>
+                                    </p:set>
+                                  </p:childTnLst>
+                                </p:cTn>
+                              </p:par>
+                              <p:par>
+                                <p:cTn id="21" presetID="1" presetClass="entr" presetSubtype="0" fill="hold" nodeType="withEffect">
+                                  <p:stCondLst>
+                                    <p:cond delay="0"/>
+                                  </p:stCondLst>
+                                  <p:childTnLst>
+                                    <p:set>
+                                      <p:cBhvr>
+                                        <p:cTn id="22" dur="1" fill="hold">
+                                          <p:stCondLst>
+                                            <p:cond delay="0"/>
+                                          </p:stCondLst>
+                                        </p:cTn>
+                                        <p:tgtEl>
+                                          <p:spTgt spid="6">
+                                            <p:txEl>
+                                              <p:pRg st="9" end="9"/>
+                                            </p:txEl>
+                                          </p:spTgt>
+                                        </p:tgtEl>
+                                        <p:attrNameLst>
+                                          <p:attrName>style.visibility</p:attrName>
+                                        </p:attrNameLst>
+                                      </p:cBhvr>
+                                      <p:to>
+                                        <p:strVal val="visible"/>
+                                      </p:to>
+                                    </p:set>
+                                  </p:childTnLst>
+                                </p:cTn>
+                              </p:par>
+                              <p:par>
+                                <p:cTn id="23" presetID="1" presetClass="entr" presetSubtype="0" fill="hold" nodeType="withEffect">
+                                  <p:stCondLst>
+                                    <p:cond delay="0"/>
+                                  </p:stCondLst>
+                                  <p:childTnLst>
+                                    <p:set>
+                                      <p:cBhvr>
+                                        <p:cTn id="24" dur="1" fill="hold">
+                                          <p:stCondLst>
+                                            <p:cond delay="0"/>
+                                          </p:stCondLst>
+                                        </p:cTn>
+                                        <p:tgtEl>
+                                          <p:spTgt spid="6">
+                                            <p:txEl>
+                                              <p:pRg st="10" end="10"/>
+                                            </p:txEl>
+                                          </p:spTgt>
+                                        </p:tgtEl>
+                                        <p:attrNameLst>
+                                          <p:attrName>style.visibility</p:attrName>
+                                        </p:attrNameLst>
+                                      </p:cBhvr>
+                                      <p:to>
+                                        <p:strVal val="visible"/>
+                                      </p:to>
+                                    </p:set>
+                                  </p:childTnLst>
+                                </p:cTn>
+                              </p:par>
+                              <p:par>
+                                <p:cTn id="25" presetID="1" presetClass="entr" presetSubtype="0" fill="hold" nodeType="withEffect">
+                                  <p:stCondLst>
+                                    <p:cond delay="0"/>
+                                  </p:stCondLst>
+                                  <p:childTnLst>
+                                    <p:set>
+                                      <p:cBhvr>
+                                        <p:cTn id="26" dur="1" fill="hold">
+                                          <p:stCondLst>
+                                            <p:cond delay="0"/>
+                                          </p:stCondLst>
+                                        </p:cTn>
+                                        <p:tgtEl>
+                                          <p:spTgt spid="6">
+                                            <p:txEl>
+                                              <p:pRg st="11" end="11"/>
+                                            </p:txEl>
+                                          </p:spTgt>
+                                        </p:tgtEl>
+                                        <p:attrNameLst>
+                                          <p:attrName>style.visibility</p:attrName>
+                                        </p:attrNameLst>
+                                      </p:cBhvr>
+                                      <p:to>
+                                        <p:strVal val="visible"/>
+                                      </p:to>
+                                    </p:set>
+                                  </p:childTnLst>
+                                </p:cTn>
+                              </p:par>
+                            </p:childTnLst>
+                          </p:cTn>
+                        </p:par>
+                      </p:childTnLst>
+                    </p:cTn>
+                  </p:par>
+                </p:childTnLst>
+              </p:cTn>
+              <p:prevCondLst>
+                <p:cond evt="onPrev" delay="0">
+                  <p:tgtEl>
+                    <p:sldTgt/>
+                  </p:tgtEl>
+                </p:cond>
+              </p:prevCondLst>
+              <p:nextCondLst>
+                <p:cond evt="onNext" delay="0">
+                  <p:tgtEl>
+                    <p:sldTgt/>
+                  </p:tgtEl>
+                </p:cond>
+              </p:nextCondLst>
+            </p:seq>
+          </p:childTnLst>
+        </p:cTn>
+      </p:par>
+    </p:tnLst>
+  </p:timing>
 </p:sld>
 </file>
 
@@ -22752,12 +23293,23 @@
 </file>
 
 <file path=customXml/item1.xml><?xml version="1.0" encoding="utf-8"?>
-<?mso-contentType ?>
-<FormTemplates xmlns="http://schemas.microsoft.com/sharepoint/v3/contenttype/forms">
-  <Display>DocumentLibraryForm</Display>
-  <Edit>DocumentLibraryForm</Edit>
-  <New>DocumentLibraryForm</New>
-</FormTemplates>
+<p:properties xmlns:p="http://schemas.microsoft.com/office/2006/metadata/properties" xmlns:xsi="http://www.w3.org/2001/XMLSchema-instance" xmlns:pc="http://schemas.microsoft.com/office/infopath/2007/PartnerControls">
+  <documentManagement>
+    <_ip_UnifiedCompliancePolicyUIAction xmlns="http://schemas.microsoft.com/sharepoint/v3" xsi:nil="true"/>
+    <Image xmlns="71af3243-3dd4-4a8d-8c0d-dd76da1f02a5">
+      <Url xsi:nil="true"/>
+      <Description xsi:nil="true"/>
+    </Image>
+    <Status xmlns="71af3243-3dd4-4a8d-8c0d-dd76da1f02a5">Not started</Status>
+    <Background xmlns="71af3243-3dd4-4a8d-8c0d-dd76da1f02a5">false</Background>
+    <_ip_UnifiedCompliancePolicyProperties xmlns="http://schemas.microsoft.com/sharepoint/v3" xsi:nil="true"/>
+    <ImageTagsTaxHTField xmlns="71af3243-3dd4-4a8d-8c0d-dd76da1f02a5">
+      <Terms xmlns="http://schemas.microsoft.com/office/infopath/2007/PartnerControls"/>
+    </ImageTagsTaxHTField>
+    <TaxCatchAll xmlns="230e9df3-be65-4c73-a93b-d1236ebd677e" xsi:nil="true"/>
+    <MediaServiceKeyPoints xmlns="71af3243-3dd4-4a8d-8c0d-dd76da1f02a5" xsi:nil="true"/>
+  </documentManagement>
+</p:properties>
 </file>
 
 <file path=customXml/item2.xml><?xml version="1.0" encoding="utf-8"?>
@@ -23067,29 +23619,22 @@
 </file>
 
 <file path=customXml/item3.xml><?xml version="1.0" encoding="utf-8"?>
-<p:properties xmlns:p="http://schemas.microsoft.com/office/2006/metadata/properties" xmlns:xsi="http://www.w3.org/2001/XMLSchema-instance" xmlns:pc="http://schemas.microsoft.com/office/infopath/2007/PartnerControls">
-  <documentManagement>
-    <_ip_UnifiedCompliancePolicyUIAction xmlns="http://schemas.microsoft.com/sharepoint/v3" xsi:nil="true"/>
-    <Image xmlns="71af3243-3dd4-4a8d-8c0d-dd76da1f02a5">
-      <Url xsi:nil="true"/>
-      <Description xsi:nil="true"/>
-    </Image>
-    <Status xmlns="71af3243-3dd4-4a8d-8c0d-dd76da1f02a5">Not started</Status>
-    <Background xmlns="71af3243-3dd4-4a8d-8c0d-dd76da1f02a5">false</Background>
-    <_ip_UnifiedCompliancePolicyProperties xmlns="http://schemas.microsoft.com/sharepoint/v3" xsi:nil="true"/>
-    <ImageTagsTaxHTField xmlns="71af3243-3dd4-4a8d-8c0d-dd76da1f02a5">
-      <Terms xmlns="http://schemas.microsoft.com/office/infopath/2007/PartnerControls"/>
-    </ImageTagsTaxHTField>
-    <TaxCatchAll xmlns="230e9df3-be65-4c73-a93b-d1236ebd677e" xsi:nil="true"/>
-    <MediaServiceKeyPoints xmlns="71af3243-3dd4-4a8d-8c0d-dd76da1f02a5" xsi:nil="true"/>
-  </documentManagement>
-</p:properties>
+<?mso-contentType ?>
+<FormTemplates xmlns="http://schemas.microsoft.com/sharepoint/v3/contenttype/forms">
+  <Display>DocumentLibraryForm</Display>
+  <Edit>DocumentLibraryForm</Edit>
+  <New>DocumentLibraryForm</New>
+</FormTemplates>
 </file>
 
 <file path=customXml/itemProps1.xml><?xml version="1.0" encoding="utf-8"?>
-<ds:datastoreItem xmlns:ds="http://schemas.openxmlformats.org/officeDocument/2006/customXml" ds:itemID="{79BF405E-7930-4D5C-ABB3-493E9D6D6CEA}">
+<ds:datastoreItem xmlns:ds="http://schemas.openxmlformats.org/officeDocument/2006/customXml" ds:itemID="{6EA97235-BEC4-4F82-87A8-2F5DAD53B5F9}">
   <ds:schemaRefs>
-    <ds:schemaRef ds:uri="http://schemas.microsoft.com/sharepoint/v3/contenttype/forms"/>
+    <ds:schemaRef ds:uri="http://schemas.microsoft.com/office/2006/metadata/properties"/>
+    <ds:schemaRef ds:uri="http://schemas.microsoft.com/office/infopath/2007/PartnerControls"/>
+    <ds:schemaRef ds:uri="http://schemas.microsoft.com/sharepoint/v3"/>
+    <ds:schemaRef ds:uri="71af3243-3dd4-4a8d-8c0d-dd76da1f02a5"/>
+    <ds:schemaRef ds:uri="230e9df3-be65-4c73-a93b-d1236ebd677e"/>
   </ds:schemaRefs>
 </ds:datastoreItem>
 </file>
@@ -23116,13 +23661,9 @@
 </file>
 
 <file path=customXml/itemProps3.xml><?xml version="1.0" encoding="utf-8"?>
-<ds:datastoreItem xmlns:ds="http://schemas.openxmlformats.org/officeDocument/2006/customXml" ds:itemID="{6EA97235-BEC4-4F82-87A8-2F5DAD53B5F9}">
+<ds:datastoreItem xmlns:ds="http://schemas.openxmlformats.org/officeDocument/2006/customXml" ds:itemID="{79BF405E-7930-4D5C-ABB3-493E9D6D6CEA}">
   <ds:schemaRefs>
-    <ds:schemaRef ds:uri="http://schemas.microsoft.com/office/2006/metadata/properties"/>
-    <ds:schemaRef ds:uri="http://schemas.microsoft.com/office/infopath/2007/PartnerControls"/>
-    <ds:schemaRef ds:uri="http://schemas.microsoft.com/sharepoint/v3"/>
-    <ds:schemaRef ds:uri="71af3243-3dd4-4a8d-8c0d-dd76da1f02a5"/>
-    <ds:schemaRef ds:uri="230e9df3-be65-4c73-a93b-d1236ebd677e"/>
+    <ds:schemaRef ds:uri="http://schemas.microsoft.com/sharepoint/v3/contenttype/forms"/>
   </ds:schemaRefs>
 </ds:datastoreItem>
 </file>

</xml_diff>